<commit_message>
Revise some material and add motion efficts.
</commit_message>
<xml_diff>
--- a/project/slides/NodeXL_system_architecture.pptx
+++ b/project/slides/NodeXL_system_architecture.pptx
@@ -9,7 +9,7 @@
   </p:notesMasterIdLst>
   <p:sldIdLst>
     <p:sldId id="272" r:id="rId2"/>
-    <p:sldId id="258" r:id="rId3"/>
+    <p:sldId id="279" r:id="rId3"/>
     <p:sldId id="259" r:id="rId4"/>
     <p:sldId id="273" r:id="rId5"/>
     <p:sldId id="274" r:id="rId6"/>
@@ -197,7 +197,7 @@
           <a:p>
             <a:fld id="{CC729DA5-2D78-4A47-97CC-B030F74B2B94}" type="datetimeFigureOut">
               <a:rPr lang="zh-TW" altLang="en-US" smtClean="0"/>
-              <a:t>2014/4/19</a:t>
+              <a:t>2014/4/20</a:t>
             </a:fld>
             <a:endParaRPr lang="zh-TW" altLang="en-US"/>
           </a:p>
@@ -844,7 +844,7 @@
           <a:p>
             <a:fld id="{AA48FDDF-DFFB-4099-A1BD-D3F248BA1021}" type="datetimeFigureOut">
               <a:rPr lang="zh-TW" altLang="en-US" smtClean="0"/>
-              <a:t>2014/4/19</a:t>
+              <a:t>2014/4/20</a:t>
             </a:fld>
             <a:endParaRPr lang="zh-TW" altLang="en-US"/>
           </a:p>
@@ -1157,7 +1157,7 @@
           <a:p>
             <a:fld id="{AA48FDDF-DFFB-4099-A1BD-D3F248BA1021}" type="datetimeFigureOut">
               <a:rPr lang="zh-TW" altLang="en-US" smtClean="0"/>
-              <a:t>2014/4/19</a:t>
+              <a:t>2014/4/20</a:t>
             </a:fld>
             <a:endParaRPr lang="zh-TW" altLang="en-US"/>
           </a:p>
@@ -1342,7 +1342,7 @@
           <a:p>
             <a:fld id="{AA48FDDF-DFFB-4099-A1BD-D3F248BA1021}" type="datetimeFigureOut">
               <a:rPr lang="zh-TW" altLang="en-US" smtClean="0"/>
-              <a:t>2014/4/19</a:t>
+              <a:t>2014/4/20</a:t>
             </a:fld>
             <a:endParaRPr lang="zh-TW" altLang="en-US"/>
           </a:p>
@@ -1517,7 +1517,7 @@
           <a:p>
             <a:fld id="{AA48FDDF-DFFB-4099-A1BD-D3F248BA1021}" type="datetimeFigureOut">
               <a:rPr lang="zh-TW" altLang="en-US" smtClean="0"/>
-              <a:t>2014/4/19</a:t>
+              <a:t>2014/4/20</a:t>
             </a:fld>
             <a:endParaRPr lang="zh-TW" altLang="en-US"/>
           </a:p>
@@ -1785,7 +1785,7 @@
           <a:p>
             <a:fld id="{AA48FDDF-DFFB-4099-A1BD-D3F248BA1021}" type="datetimeFigureOut">
               <a:rPr lang="zh-TW" altLang="en-US" smtClean="0"/>
-              <a:t>2014/4/19</a:t>
+              <a:t>2014/4/20</a:t>
             </a:fld>
             <a:endParaRPr lang="zh-TW" altLang="en-US"/>
           </a:p>
@@ -2253,7 +2253,7 @@
           <a:p>
             <a:fld id="{AA48FDDF-DFFB-4099-A1BD-D3F248BA1021}" type="datetimeFigureOut">
               <a:rPr lang="zh-TW" altLang="en-US" smtClean="0"/>
-              <a:t>2014/4/19</a:t>
+              <a:t>2014/4/20</a:t>
             </a:fld>
             <a:endParaRPr lang="zh-TW" altLang="en-US"/>
           </a:p>
@@ -2742,7 +2742,7 @@
           <a:p>
             <a:fld id="{AA48FDDF-DFFB-4099-A1BD-D3F248BA1021}" type="datetimeFigureOut">
               <a:rPr lang="zh-TW" altLang="en-US" smtClean="0"/>
-              <a:t>2014/4/19</a:t>
+              <a:t>2014/4/20</a:t>
             </a:fld>
             <a:endParaRPr lang="zh-TW" altLang="en-US"/>
           </a:p>
@@ -2868,7 +2868,7 @@
           <a:p>
             <a:fld id="{AA48FDDF-DFFB-4099-A1BD-D3F248BA1021}" type="datetimeFigureOut">
               <a:rPr lang="zh-TW" altLang="en-US" smtClean="0"/>
-              <a:t>2014/4/19</a:t>
+              <a:t>2014/4/20</a:t>
             </a:fld>
             <a:endParaRPr lang="zh-TW" altLang="en-US"/>
           </a:p>
@@ -3012,7 +3012,7 @@
           <a:p>
             <a:fld id="{AA48FDDF-DFFB-4099-A1BD-D3F248BA1021}" type="datetimeFigureOut">
               <a:rPr lang="zh-TW" altLang="en-US" smtClean="0"/>
-              <a:t>2014/4/19</a:t>
+              <a:t>2014/4/20</a:t>
             </a:fld>
             <a:endParaRPr lang="zh-TW" altLang="en-US"/>
           </a:p>
@@ -3334,7 +3334,7 @@
           <a:p>
             <a:fld id="{AA48FDDF-DFFB-4099-A1BD-D3F248BA1021}" type="datetimeFigureOut">
               <a:rPr lang="zh-TW" altLang="en-US" smtClean="0"/>
-              <a:t>2014/4/19</a:t>
+              <a:t>2014/4/20</a:t>
             </a:fld>
             <a:endParaRPr lang="zh-TW" altLang="en-US"/>
           </a:p>
@@ -3468,7 +3468,7 @@
           <a:p>
             <a:fld id="{AA48FDDF-DFFB-4099-A1BD-D3F248BA1021}" type="datetimeFigureOut">
               <a:rPr lang="zh-TW" altLang="en-US" smtClean="0"/>
-              <a:t>2014/4/19</a:t>
+              <a:t>2014/4/20</a:t>
             </a:fld>
             <a:endParaRPr lang="zh-TW" altLang="en-US"/>
           </a:p>
@@ -4249,7 +4249,7 @@
           <a:p>
             <a:fld id="{AA48FDDF-DFFB-4099-A1BD-D3F248BA1021}" type="datetimeFigureOut">
               <a:rPr lang="zh-TW" altLang="en-US" smtClean="0"/>
-              <a:t>2014/4/19</a:t>
+              <a:t>2014/4/20</a:t>
             </a:fld>
             <a:endParaRPr lang="zh-TW" altLang="en-US"/>
           </a:p>
@@ -5412,7 +5412,7 @@
         <p:spPr>
           <a:xfrm>
             <a:off x="899592" y="2123564"/>
-            <a:ext cx="1224136" cy="584775"/>
+            <a:ext cx="1008112" cy="584775"/>
           </a:xfrm>
           <a:prstGeom prst="rect">
             <a:avLst/>
@@ -5433,20 +5433,13 @@
               </a:rPr>
               <a:t>選擇</a:t>
             </a:r>
-            <a:endParaRPr lang="en-US" altLang="zh-TW" sz="1600" dirty="0" smtClean="0">
-              <a:latin typeface="Times New Roman" panose="02020603050405020304" pitchFamily="18" charset="0"/>
-              <a:ea typeface="標楷體" panose="03000509000000000000" pitchFamily="65" charset="-120"/>
-              <a:cs typeface="Times New Roman" panose="02020603050405020304" pitchFamily="18" charset="0"/>
-            </a:endParaRPr>
-          </a:p>
-          <a:p>
             <a:r>
               <a:rPr lang="zh-TW" altLang="en-US" sz="1600" dirty="0" smtClean="0">
                 <a:latin typeface="Times New Roman" panose="02020603050405020304" pitchFamily="18" charset="0"/>
                 <a:ea typeface="標楷體" panose="03000509000000000000" pitchFamily="65" charset="-120"/>
                 <a:cs typeface="Times New Roman" panose="02020603050405020304" pitchFamily="18" charset="0"/>
               </a:rPr>
-              <a:t>需要條件</a:t>
+              <a:t>下載內容</a:t>
             </a:r>
             <a:endParaRPr lang="zh-TW" altLang="en-US" sz="1600" dirty="0">
               <a:latin typeface="Times New Roman" panose="02020603050405020304" pitchFamily="18" charset="0"/>
@@ -5458,14 +5451,14 @@
       </p:sp>
       <p:sp>
         <p:nvSpPr>
-          <p:cNvPr id="36" name="文字方塊 35"/>
+          <p:cNvPr id="41" name="文字方塊 40"/>
           <p:cNvSpPr txBox="1"/>
           <p:nvPr/>
         </p:nvSpPr>
         <p:spPr>
           <a:xfrm>
-            <a:off x="3635896" y="1475492"/>
-            <a:ext cx="1656184" cy="584775"/>
+            <a:off x="35496" y="899428"/>
+            <a:ext cx="2232248" cy="584775"/>
           </a:xfrm>
           <a:prstGeom prst="rect">
             <a:avLst/>
@@ -5478,315 +5471,16 @@
           </a:bodyPr>
           <a:lstStyle/>
           <a:p>
-            <a:r>
-              <a:rPr lang="en-US" altLang="zh-TW" sz="1600" dirty="0" smtClean="0">
-                <a:latin typeface="Times New Roman" panose="02020603050405020304" pitchFamily="18" charset="0"/>
-                <a:ea typeface="標楷體" panose="03000509000000000000" pitchFamily="65" charset="-120"/>
-                <a:cs typeface="Times New Roman" panose="02020603050405020304" pitchFamily="18" charset="0"/>
-              </a:rPr>
-              <a:t>*</a:t>
-            </a:r>
+            <a:pPr marL="342900" indent="-342900">
+              <a:buAutoNum type="arabicPeriod"/>
+            </a:pPr>
             <a:r>
               <a:rPr lang="zh-TW" altLang="en-US" sz="1600" dirty="0" smtClean="0">
                 <a:latin typeface="Times New Roman" panose="02020603050405020304" pitchFamily="18" charset="0"/>
                 <a:ea typeface="標楷體" panose="03000509000000000000" pitchFamily="65" charset="-120"/>
                 <a:cs typeface="Times New Roman" panose="02020603050405020304" pitchFamily="18" charset="0"/>
               </a:rPr>
-              <a:t>原本存</a:t>
-            </a:r>
-            <a:r>
-              <a:rPr lang="en-US" altLang="zh-TW" sz="1600" dirty="0" smtClean="0">
-                <a:latin typeface="Times New Roman" panose="02020603050405020304" pitchFamily="18" charset="0"/>
-                <a:ea typeface="標楷體" panose="03000509000000000000" pitchFamily="65" charset="-120"/>
-                <a:cs typeface="Times New Roman" panose="02020603050405020304" pitchFamily="18" charset="0"/>
-              </a:rPr>
-              <a:t>Excel</a:t>
-            </a:r>
-          </a:p>
-          <a:p>
-            <a:r>
-              <a:rPr lang="en-US" altLang="zh-TW" sz="1600" dirty="0" smtClean="0">
-                <a:latin typeface="Times New Roman" panose="02020603050405020304" pitchFamily="18" charset="0"/>
-                <a:ea typeface="標楷體" panose="03000509000000000000" pitchFamily="65" charset="-120"/>
-                <a:cs typeface="Times New Roman" panose="02020603050405020304" pitchFamily="18" charset="0"/>
-              </a:rPr>
-              <a:t>=&gt; </a:t>
-            </a:r>
-            <a:r>
-              <a:rPr lang="zh-TW" altLang="en-US" sz="1600" dirty="0" smtClean="0">
-                <a:latin typeface="Times New Roman" panose="02020603050405020304" pitchFamily="18" charset="0"/>
-                <a:ea typeface="標楷體" panose="03000509000000000000" pitchFamily="65" charset="-120"/>
-                <a:cs typeface="Times New Roman" panose="02020603050405020304" pitchFamily="18" charset="0"/>
-              </a:rPr>
-              <a:t>存成</a:t>
-            </a:r>
-            <a:r>
-              <a:rPr lang="en-US" altLang="zh-TW" sz="1600" dirty="0" smtClean="0">
-                <a:latin typeface="Times New Roman" panose="02020603050405020304" pitchFamily="18" charset="0"/>
-                <a:ea typeface="標楷體" panose="03000509000000000000" pitchFamily="65" charset="-120"/>
-                <a:cs typeface="Times New Roman" panose="02020603050405020304" pitchFamily="18" charset="0"/>
-              </a:rPr>
-              <a:t>Database</a:t>
-            </a:r>
-          </a:p>
-        </p:txBody>
-      </p:sp>
-      <p:sp>
-        <p:nvSpPr>
-          <p:cNvPr id="38" name="文字方塊 37"/>
-          <p:cNvSpPr txBox="1"/>
-          <p:nvPr/>
-        </p:nvSpPr>
-        <p:spPr>
-          <a:xfrm>
-            <a:off x="3635896" y="2627620"/>
-            <a:ext cx="1728192" cy="830997"/>
-          </a:xfrm>
-          <a:prstGeom prst="rect">
-            <a:avLst/>
-          </a:prstGeom>
-          <a:noFill/>
-        </p:spPr>
-        <p:txBody>
-          <a:bodyPr wrap="square" rtlCol="0">
-            <a:spAutoFit/>
-          </a:bodyPr>
-          <a:lstStyle/>
-          <a:p>
-            <a:r>
-              <a:rPr lang="en-US" altLang="zh-TW" sz="1600" dirty="0" smtClean="0">
-                <a:latin typeface="Times New Roman" panose="02020603050405020304" pitchFamily="18" charset="0"/>
-                <a:ea typeface="標楷體" panose="03000509000000000000" pitchFamily="65" charset="-120"/>
-                <a:cs typeface="Times New Roman" panose="02020603050405020304" pitchFamily="18" charset="0"/>
-              </a:rPr>
-              <a:t>*</a:t>
-            </a:r>
-            <a:r>
-              <a:rPr lang="zh-TW" altLang="en-US" sz="1600" dirty="0" smtClean="0">
-                <a:latin typeface="Times New Roman" panose="02020603050405020304" pitchFamily="18" charset="0"/>
-                <a:ea typeface="標楷體" panose="03000509000000000000" pitchFamily="65" charset="-120"/>
-                <a:cs typeface="Times New Roman" panose="02020603050405020304" pitchFamily="18" charset="0"/>
-              </a:rPr>
-              <a:t>從 </a:t>
-            </a:r>
-            <a:r>
-              <a:rPr lang="en-US" altLang="zh-TW" sz="1600" dirty="0" smtClean="0">
-                <a:latin typeface="Times New Roman" panose="02020603050405020304" pitchFamily="18" charset="0"/>
-                <a:ea typeface="標楷體" panose="03000509000000000000" pitchFamily="65" charset="-120"/>
-                <a:cs typeface="Times New Roman" panose="02020603050405020304" pitchFamily="18" charset="0"/>
-              </a:rPr>
-              <a:t>DB load </a:t>
-            </a:r>
-            <a:r>
-              <a:rPr lang="zh-TW" altLang="en-US" sz="1600" dirty="0" smtClean="0">
-                <a:latin typeface="Times New Roman" panose="02020603050405020304" pitchFamily="18" charset="0"/>
-                <a:ea typeface="標楷體" panose="03000509000000000000" pitchFamily="65" charset="-120"/>
-                <a:cs typeface="Times New Roman" panose="02020603050405020304" pitchFamily="18" charset="0"/>
-              </a:rPr>
-              <a:t>資料</a:t>
-            </a:r>
-            <a:endParaRPr lang="en-US" altLang="zh-TW" sz="1600" dirty="0" smtClean="0">
-              <a:latin typeface="Times New Roman" panose="02020603050405020304" pitchFamily="18" charset="0"/>
-              <a:ea typeface="標楷體" panose="03000509000000000000" pitchFamily="65" charset="-120"/>
-              <a:cs typeface="Times New Roman" panose="02020603050405020304" pitchFamily="18" charset="0"/>
-            </a:endParaRPr>
-          </a:p>
-          <a:p>
-            <a:r>
-              <a:rPr lang="zh-TW" altLang="en-US" sz="1600" dirty="0" smtClean="0">
-                <a:latin typeface="Times New Roman" panose="02020603050405020304" pitchFamily="18" charset="0"/>
-                <a:ea typeface="標楷體" panose="03000509000000000000" pitchFamily="65" charset="-120"/>
-                <a:cs typeface="Times New Roman" panose="02020603050405020304" pitchFamily="18" charset="0"/>
-              </a:rPr>
-              <a:t>選擇需要的欄位</a:t>
-            </a:r>
-            <a:endParaRPr lang="en-US" altLang="zh-TW" sz="1600" dirty="0" smtClean="0">
-              <a:latin typeface="Times New Roman" panose="02020603050405020304" pitchFamily="18" charset="0"/>
-              <a:ea typeface="標楷體" panose="03000509000000000000" pitchFamily="65" charset="-120"/>
-              <a:cs typeface="Times New Roman" panose="02020603050405020304" pitchFamily="18" charset="0"/>
-            </a:endParaRPr>
-          </a:p>
-          <a:p>
-            <a:r>
-              <a:rPr lang="zh-TW" altLang="en-US" sz="1600" dirty="0" smtClean="0">
-                <a:latin typeface="Times New Roman" panose="02020603050405020304" pitchFamily="18" charset="0"/>
-                <a:ea typeface="標楷體" panose="03000509000000000000" pitchFamily="65" charset="-120"/>
-                <a:cs typeface="Times New Roman" panose="02020603050405020304" pitchFamily="18" charset="0"/>
-              </a:rPr>
-              <a:t>形成</a:t>
-            </a:r>
-            <a:r>
-              <a:rPr lang="en-US" altLang="zh-TW" sz="1600" dirty="0" smtClean="0">
-                <a:latin typeface="Times New Roman" panose="02020603050405020304" pitchFamily="18" charset="0"/>
-                <a:ea typeface="標楷體" panose="03000509000000000000" pitchFamily="65" charset="-120"/>
-                <a:cs typeface="Times New Roman" panose="02020603050405020304" pitchFamily="18" charset="0"/>
-              </a:rPr>
-              <a:t>Matrix</a:t>
-            </a:r>
-            <a:endParaRPr lang="zh-TW" altLang="en-US" sz="1600" dirty="0">
-              <a:latin typeface="Times New Roman" panose="02020603050405020304" pitchFamily="18" charset="0"/>
-              <a:ea typeface="標楷體" panose="03000509000000000000" pitchFamily="65" charset="-120"/>
-              <a:cs typeface="Times New Roman" panose="02020603050405020304" pitchFamily="18" charset="0"/>
-            </a:endParaRPr>
-          </a:p>
-        </p:txBody>
-      </p:sp>
-      <p:sp>
-        <p:nvSpPr>
-          <p:cNvPr id="39" name="文字方塊 38"/>
-          <p:cNvSpPr txBox="1"/>
-          <p:nvPr/>
-        </p:nvSpPr>
-        <p:spPr>
-          <a:xfrm>
-            <a:off x="3635896" y="3851756"/>
-            <a:ext cx="1584176" cy="584775"/>
-          </a:xfrm>
-          <a:prstGeom prst="rect">
-            <a:avLst/>
-          </a:prstGeom>
-          <a:noFill/>
-        </p:spPr>
-        <p:txBody>
-          <a:bodyPr wrap="square" rtlCol="0">
-            <a:spAutoFit/>
-          </a:bodyPr>
-          <a:lstStyle/>
-          <a:p>
-            <a:r>
-              <a:rPr lang="en-US" altLang="zh-TW" sz="1600" dirty="0" smtClean="0">
-                <a:latin typeface="Times New Roman" panose="02020603050405020304" pitchFamily="18" charset="0"/>
-                <a:ea typeface="標楷體" panose="03000509000000000000" pitchFamily="65" charset="-120"/>
-                <a:cs typeface="Times New Roman" panose="02020603050405020304" pitchFamily="18" charset="0"/>
-              </a:rPr>
-              <a:t>*</a:t>
-            </a:r>
-            <a:r>
-              <a:rPr lang="zh-TW" altLang="en-US" sz="1600" dirty="0" smtClean="0">
-                <a:latin typeface="Times New Roman" panose="02020603050405020304" pitchFamily="18" charset="0"/>
-                <a:ea typeface="標楷體" panose="03000509000000000000" pitchFamily="65" charset="-120"/>
-                <a:cs typeface="Times New Roman" panose="02020603050405020304" pitchFamily="18" charset="0"/>
-              </a:rPr>
-              <a:t>做</a:t>
-            </a:r>
-            <a:r>
-              <a:rPr lang="en-US" altLang="zh-TW" sz="1600" dirty="0" smtClean="0">
-                <a:latin typeface="Times New Roman" panose="02020603050405020304" pitchFamily="18" charset="0"/>
-                <a:ea typeface="標楷體" panose="03000509000000000000" pitchFamily="65" charset="-120"/>
-                <a:cs typeface="Times New Roman" panose="02020603050405020304" pitchFamily="18" charset="0"/>
-              </a:rPr>
-              <a:t>Matrix</a:t>
-            </a:r>
-            <a:r>
-              <a:rPr lang="zh-TW" altLang="en-US" sz="1600" dirty="0" smtClean="0">
-                <a:latin typeface="Times New Roman" panose="02020603050405020304" pitchFamily="18" charset="0"/>
-                <a:ea typeface="標楷體" panose="03000509000000000000" pitchFamily="65" charset="-120"/>
-                <a:cs typeface="Times New Roman" panose="02020603050405020304" pitchFamily="18" charset="0"/>
-              </a:rPr>
-              <a:t>加速運算</a:t>
-            </a:r>
-            <a:endParaRPr lang="zh-TW" altLang="en-US" sz="1600" dirty="0">
-              <a:latin typeface="Times New Roman" panose="02020603050405020304" pitchFamily="18" charset="0"/>
-              <a:ea typeface="標楷體" panose="03000509000000000000" pitchFamily="65" charset="-120"/>
-              <a:cs typeface="Times New Roman" panose="02020603050405020304" pitchFamily="18" charset="0"/>
-            </a:endParaRPr>
-          </a:p>
-        </p:txBody>
-      </p:sp>
-      <p:sp>
-        <p:nvSpPr>
-          <p:cNvPr id="40" name="文字方塊 39"/>
-          <p:cNvSpPr txBox="1"/>
-          <p:nvPr/>
-        </p:nvSpPr>
-        <p:spPr>
-          <a:xfrm>
-            <a:off x="3635896" y="5147900"/>
-            <a:ext cx="1728192" cy="338554"/>
-          </a:xfrm>
-          <a:prstGeom prst="rect">
-            <a:avLst/>
-          </a:prstGeom>
-          <a:noFill/>
-        </p:spPr>
-        <p:txBody>
-          <a:bodyPr wrap="square" rtlCol="0">
-            <a:spAutoFit/>
-          </a:bodyPr>
-          <a:lstStyle/>
-          <a:p>
-            <a:r>
-              <a:rPr lang="en-US" altLang="zh-TW" sz="1600" dirty="0" smtClean="0">
-                <a:latin typeface="Times New Roman" panose="02020603050405020304" pitchFamily="18" charset="0"/>
-                <a:ea typeface="標楷體" panose="03000509000000000000" pitchFamily="65" charset="-120"/>
-                <a:cs typeface="Times New Roman" panose="02020603050405020304" pitchFamily="18" charset="0"/>
-              </a:rPr>
-              <a:t>*</a:t>
-            </a:r>
-            <a:r>
-              <a:rPr lang="zh-TW" altLang="en-US" sz="1600" dirty="0" smtClean="0">
-                <a:latin typeface="Times New Roman" panose="02020603050405020304" pitchFamily="18" charset="0"/>
-                <a:ea typeface="標楷體" panose="03000509000000000000" pitchFamily="65" charset="-120"/>
-                <a:cs typeface="Times New Roman" panose="02020603050405020304" pitchFamily="18" charset="0"/>
-              </a:rPr>
-              <a:t>圖形表現</a:t>
-            </a:r>
-            <a:endParaRPr lang="zh-TW" altLang="en-US" sz="1600" dirty="0">
-              <a:latin typeface="Times New Roman" panose="02020603050405020304" pitchFamily="18" charset="0"/>
-              <a:ea typeface="標楷體" panose="03000509000000000000" pitchFamily="65" charset="-120"/>
-              <a:cs typeface="Times New Roman" panose="02020603050405020304" pitchFamily="18" charset="0"/>
-            </a:endParaRPr>
-          </a:p>
-        </p:txBody>
-      </p:sp>
-      <p:sp>
-        <p:nvSpPr>
-          <p:cNvPr id="41" name="文字方塊 40"/>
-          <p:cNvSpPr txBox="1"/>
-          <p:nvPr/>
-        </p:nvSpPr>
-        <p:spPr>
-          <a:xfrm>
-            <a:off x="35496" y="899428"/>
-            <a:ext cx="2232248" cy="584775"/>
-          </a:xfrm>
-          <a:prstGeom prst="rect">
-            <a:avLst/>
-          </a:prstGeom>
-          <a:noFill/>
-        </p:spPr>
-        <p:txBody>
-          <a:bodyPr wrap="square" rtlCol="0">
-            <a:spAutoFit/>
-          </a:bodyPr>
-          <a:lstStyle/>
-          <a:p>
-            <a:pPr marL="342900" indent="-342900">
-              <a:buAutoNum type="arabicPeriod"/>
-            </a:pPr>
-            <a:r>
-              <a:rPr lang="zh-TW" altLang="en-US" sz="1600" dirty="0" smtClean="0">
-                <a:latin typeface="Times New Roman" panose="02020603050405020304" pitchFamily="18" charset="0"/>
-                <a:ea typeface="標楷體" panose="03000509000000000000" pitchFamily="65" charset="-120"/>
-                <a:cs typeface="Times New Roman" panose="02020603050405020304" pitchFamily="18" charset="0"/>
-              </a:rPr>
-              <a:t>檢查 </a:t>
-            </a:r>
-            <a:r>
-              <a:rPr lang="en-US" altLang="zh-TW" sz="1600" dirty="0" smtClean="0">
-                <a:latin typeface="Times New Roman" panose="02020603050405020304" pitchFamily="18" charset="0"/>
-                <a:ea typeface="標楷體" panose="03000509000000000000" pitchFamily="65" charset="-120"/>
-                <a:cs typeface="Times New Roman" panose="02020603050405020304" pitchFamily="18" charset="0"/>
-              </a:rPr>
-              <a:t>key </a:t>
-            </a:r>
-            <a:r>
-              <a:rPr lang="zh-TW" altLang="en-US" sz="1600" dirty="0" smtClean="0">
-                <a:latin typeface="Times New Roman" panose="02020603050405020304" pitchFamily="18" charset="0"/>
-                <a:ea typeface="標楷體" panose="03000509000000000000" pitchFamily="65" charset="-120"/>
-                <a:cs typeface="Times New Roman" panose="02020603050405020304" pitchFamily="18" charset="0"/>
-              </a:rPr>
-              <a:t>重複</a:t>
+              <a:t>檢查內容重複</a:t>
             </a:r>
             <a:endParaRPr lang="en-US" altLang="zh-TW" sz="1600" dirty="0" smtClean="0">
               <a:latin typeface="Times New Roman" panose="02020603050405020304" pitchFamily="18" charset="0"/>
@@ -5822,1012 +5516,254 @@
           </a:p>
         </p:txBody>
       </p:sp>
-      <p:sp>
-        <p:nvSpPr>
-          <p:cNvPr id="42" name="文字方塊 41"/>
-          <p:cNvSpPr txBox="1"/>
+      <p:grpSp>
+        <p:nvGrpSpPr>
+          <p:cNvPr id="8" name="群組 7"/>
+          <p:cNvGrpSpPr/>
           <p:nvPr/>
-        </p:nvSpPr>
-        <p:spPr>
+        </p:nvGrpSpPr>
+        <p:grpSpPr>
           <a:xfrm>
-            <a:off x="5364088" y="1124744"/>
-            <a:ext cx="2448272" cy="400110"/>
-          </a:xfrm>
-          <a:prstGeom prst="rect">
-            <a:avLst/>
-          </a:prstGeom>
-          <a:noFill/>
-        </p:spPr>
-        <p:txBody>
-          <a:bodyPr wrap="square" rtlCol="0">
-            <a:spAutoFit/>
-          </a:bodyPr>
-          <a:lstStyle/>
-          <a:p>
-            <a:r>
-              <a:rPr lang="en-US" altLang="zh-TW" sz="2000" dirty="0" smtClean="0">
+            <a:off x="3635896" y="5013176"/>
+            <a:ext cx="5328592" cy="473278"/>
+            <a:chOff x="3635896" y="5013176"/>
+            <a:chExt cx="5328592" cy="473278"/>
+          </a:xfrm>
+        </p:grpSpPr>
+        <p:sp>
+          <p:nvSpPr>
+            <p:cNvPr id="40" name="文字方塊 39"/>
+            <p:cNvSpPr txBox="1"/>
+            <p:nvPr/>
+          </p:nvSpPr>
+          <p:spPr>
+            <a:xfrm>
+              <a:off x="3635896" y="5147900"/>
+              <a:ext cx="1728192" cy="338554"/>
+            </a:xfrm>
+            <a:prstGeom prst="rect">
+              <a:avLst/>
+            </a:prstGeom>
+            <a:noFill/>
+          </p:spPr>
+          <p:txBody>
+            <a:bodyPr wrap="square" rtlCol="0">
+              <a:spAutoFit/>
+            </a:bodyPr>
+            <a:lstStyle/>
+            <a:p>
+              <a:r>
+                <a:rPr lang="en-US" altLang="zh-TW" sz="1600" dirty="0" smtClean="0">
+                  <a:latin typeface="Times New Roman" panose="02020603050405020304" pitchFamily="18" charset="0"/>
+                  <a:ea typeface="標楷體" panose="03000509000000000000" pitchFamily="65" charset="-120"/>
+                  <a:cs typeface="Times New Roman" panose="02020603050405020304" pitchFamily="18" charset="0"/>
+                </a:rPr>
+                <a:t>*</a:t>
+              </a:r>
+              <a:r>
+                <a:rPr lang="zh-TW" altLang="en-US" sz="1600" dirty="0" smtClean="0">
+                  <a:latin typeface="Times New Roman" panose="02020603050405020304" pitchFamily="18" charset="0"/>
+                  <a:ea typeface="標楷體" panose="03000509000000000000" pitchFamily="65" charset="-120"/>
+                  <a:cs typeface="Times New Roman" panose="02020603050405020304" pitchFamily="18" charset="0"/>
+                </a:rPr>
+                <a:t>圖形表現</a:t>
+              </a:r>
+              <a:endParaRPr lang="zh-TW" altLang="en-US" sz="1600" dirty="0">
+                <a:latin typeface="Times New Roman" panose="02020603050405020304" pitchFamily="18" charset="0"/>
+                <a:ea typeface="標楷體" panose="03000509000000000000" pitchFamily="65" charset="-120"/>
+                <a:cs typeface="Times New Roman" panose="02020603050405020304" pitchFamily="18" charset="0"/>
+              </a:endParaRPr>
+            </a:p>
+          </p:txBody>
+        </p:sp>
+        <p:cxnSp>
+          <p:nvCxnSpPr>
+            <p:cNvPr id="49" name="直線接點 48"/>
+            <p:cNvCxnSpPr/>
+            <p:nvPr/>
+          </p:nvCxnSpPr>
+          <p:spPr>
+            <a:xfrm>
+              <a:off x="3635896" y="5013176"/>
+              <a:ext cx="5328592" cy="0"/>
+            </a:xfrm>
+            <a:prstGeom prst="line">
+              <a:avLst/>
+            </a:prstGeom>
+            <a:ln>
+              <a:prstDash val="dash"/>
+            </a:ln>
+          </p:spPr>
+          <p:style>
+            <a:lnRef idx="1">
+              <a:schemeClr val="accent2"/>
+            </a:lnRef>
+            <a:fillRef idx="0">
+              <a:schemeClr val="accent2"/>
+            </a:fillRef>
+            <a:effectRef idx="0">
+              <a:schemeClr val="accent2"/>
+            </a:effectRef>
+            <a:fontRef idx="minor">
+              <a:schemeClr val="tx1"/>
+            </a:fontRef>
+          </p:style>
+        </p:cxnSp>
+      </p:grpSp>
+      <p:grpSp>
+        <p:nvGrpSpPr>
+          <p:cNvPr id="9" name="群組 8"/>
+          <p:cNvGrpSpPr/>
+          <p:nvPr/>
+        </p:nvGrpSpPr>
+        <p:grpSpPr>
+          <a:xfrm>
+            <a:off x="3635896" y="3717032"/>
+            <a:ext cx="5328592" cy="792088"/>
+            <a:chOff x="3635896" y="3717032"/>
+            <a:chExt cx="5328592" cy="792088"/>
+          </a:xfrm>
+        </p:grpSpPr>
+        <p:sp>
+          <p:nvSpPr>
+            <p:cNvPr id="39" name="文字方塊 38"/>
+            <p:cNvSpPr txBox="1"/>
+            <p:nvPr/>
+          </p:nvSpPr>
+          <p:spPr>
+            <a:xfrm>
+              <a:off x="3635896" y="3851756"/>
+              <a:ext cx="1584176" cy="584775"/>
+            </a:xfrm>
+            <a:prstGeom prst="rect">
+              <a:avLst/>
+            </a:prstGeom>
+            <a:noFill/>
+          </p:spPr>
+          <p:txBody>
+            <a:bodyPr wrap="square" rtlCol="0">
+              <a:spAutoFit/>
+            </a:bodyPr>
+            <a:lstStyle/>
+            <a:p>
+              <a:r>
+                <a:rPr lang="en-US" altLang="zh-TW" sz="1600" dirty="0" smtClean="0">
+                  <a:latin typeface="Times New Roman" panose="02020603050405020304" pitchFamily="18" charset="0"/>
+                  <a:ea typeface="標楷體" panose="03000509000000000000" pitchFamily="65" charset="-120"/>
+                  <a:cs typeface="Times New Roman" panose="02020603050405020304" pitchFamily="18" charset="0"/>
+                </a:rPr>
+                <a:t>*</a:t>
+              </a:r>
+              <a:r>
+                <a:rPr lang="zh-TW" altLang="en-US" sz="1600" dirty="0" smtClean="0">
+                  <a:latin typeface="Times New Roman" panose="02020603050405020304" pitchFamily="18" charset="0"/>
+                  <a:ea typeface="標楷體" panose="03000509000000000000" pitchFamily="65" charset="-120"/>
+                  <a:cs typeface="Times New Roman" panose="02020603050405020304" pitchFamily="18" charset="0"/>
+                </a:rPr>
+                <a:t>做</a:t>
+              </a:r>
+              <a:r>
+                <a:rPr lang="en-US" altLang="zh-TW" sz="1600" dirty="0" smtClean="0">
+                  <a:latin typeface="Times New Roman" panose="02020603050405020304" pitchFamily="18" charset="0"/>
+                  <a:ea typeface="標楷體" panose="03000509000000000000" pitchFamily="65" charset="-120"/>
+                  <a:cs typeface="Times New Roman" panose="02020603050405020304" pitchFamily="18" charset="0"/>
+                </a:rPr>
+                <a:t>Matrix</a:t>
+              </a:r>
+              <a:r>
+                <a:rPr lang="zh-TW" altLang="en-US" sz="1600" dirty="0" smtClean="0">
+                  <a:latin typeface="Times New Roman" panose="02020603050405020304" pitchFamily="18" charset="0"/>
+                  <a:ea typeface="標楷體" panose="03000509000000000000" pitchFamily="65" charset="-120"/>
+                  <a:cs typeface="Times New Roman" panose="02020603050405020304" pitchFamily="18" charset="0"/>
+                </a:rPr>
+                <a:t>加速運算</a:t>
+              </a:r>
+              <a:endParaRPr lang="zh-TW" altLang="en-US" sz="1600" dirty="0">
+                <a:latin typeface="Times New Roman" panose="02020603050405020304" pitchFamily="18" charset="0"/>
+                <a:ea typeface="標楷體" panose="03000509000000000000" pitchFamily="65" charset="-120"/>
+                <a:cs typeface="Times New Roman" panose="02020603050405020304" pitchFamily="18" charset="0"/>
+              </a:endParaRPr>
+            </a:p>
+          </p:txBody>
+        </p:sp>
+        <p:cxnSp>
+          <p:nvCxnSpPr>
+            <p:cNvPr id="48" name="直線接點 47"/>
+            <p:cNvCxnSpPr/>
+            <p:nvPr/>
+          </p:nvCxnSpPr>
+          <p:spPr>
+            <a:xfrm>
+              <a:off x="3635896" y="3717032"/>
+              <a:ext cx="5328592" cy="0"/>
+            </a:xfrm>
+            <a:prstGeom prst="line">
+              <a:avLst/>
+            </a:prstGeom>
+            <a:ln>
+              <a:prstDash val="dash"/>
+            </a:ln>
+          </p:spPr>
+          <p:style>
+            <a:lnRef idx="1">
+              <a:schemeClr val="accent2"/>
+            </a:lnRef>
+            <a:fillRef idx="0">
+              <a:schemeClr val="accent2"/>
+            </a:fillRef>
+            <a:effectRef idx="0">
+              <a:schemeClr val="accent2"/>
+            </a:effectRef>
+            <a:fontRef idx="minor">
+              <a:schemeClr val="tx1"/>
+            </a:fontRef>
+          </p:style>
+        </p:cxnSp>
+        <p:sp>
+          <p:nvSpPr>
+            <p:cNvPr id="73" name="文字方塊 72"/>
+            <p:cNvSpPr txBox="1"/>
+            <p:nvPr/>
+          </p:nvSpPr>
+          <p:spPr>
+            <a:xfrm>
+              <a:off x="6444208" y="4170566"/>
+              <a:ext cx="1728192" cy="338554"/>
+            </a:xfrm>
+            <a:prstGeom prst="rect">
+              <a:avLst/>
+            </a:prstGeom>
+            <a:noFill/>
+          </p:spPr>
+          <p:txBody>
+            <a:bodyPr wrap="square" rtlCol="0">
+              <a:spAutoFit/>
+            </a:bodyPr>
+            <a:lstStyle/>
+            <a:p>
+              <a:r>
+                <a:rPr lang="en-US" altLang="zh-TW" sz="1600" dirty="0" smtClean="0">
+                  <a:solidFill>
+                    <a:srgbClr val="FF0000"/>
+                  </a:solidFill>
+                  <a:latin typeface="Times New Roman" panose="02020603050405020304" pitchFamily="18" charset="0"/>
+                  <a:ea typeface="標楷體" panose="03000509000000000000" pitchFamily="65" charset="-120"/>
+                  <a:cs typeface="Times New Roman" panose="02020603050405020304" pitchFamily="18" charset="0"/>
+                </a:rPr>
+                <a:t>More  matrices</a:t>
+              </a:r>
+              <a:endParaRPr lang="zh-TW" altLang="en-US" sz="1600" dirty="0">
                 <a:solidFill>
                   <a:srgbClr val="FF0000"/>
                 </a:solidFill>
                 <a:latin typeface="Times New Roman" panose="02020603050405020304" pitchFamily="18" charset="0"/>
                 <a:ea typeface="標楷體" panose="03000509000000000000" pitchFamily="65" charset="-120"/>
                 <a:cs typeface="Times New Roman" panose="02020603050405020304" pitchFamily="18" charset="0"/>
-              </a:rPr>
-              <a:t>Data Format Example</a:t>
-            </a:r>
-          </a:p>
-        </p:txBody>
-      </p:sp>
-      <p:graphicFrame>
-        <p:nvGraphicFramePr>
-          <p:cNvPr id="43" name="表格 42"/>
-          <p:cNvGraphicFramePr>
-            <a:graphicFrameLocks noGrp="1"/>
-          </p:cNvGraphicFramePr>
-          <p:nvPr>
-            <p:extLst>
-              <p:ext uri="{D42A27DB-BD31-4B8C-83A1-F6EECF244321}">
-                <p14:modId xmlns:p14="http://schemas.microsoft.com/office/powerpoint/2010/main" val="156725873"/>
-              </p:ext>
-            </p:extLst>
-          </p:nvPr>
-        </p:nvGraphicFramePr>
-        <p:xfrm>
-          <a:off x="5436096" y="1556792"/>
-          <a:ext cx="3600400" cy="304800"/>
-        </p:xfrm>
-        <a:graphic>
-          <a:graphicData uri="http://schemas.openxmlformats.org/drawingml/2006/table">
-            <a:tbl>
-              <a:tblPr firstRow="1" bandRow="1">
-                <a:tableStyleId>{5C22544A-7EE6-4342-B048-85BDC9FD1C3A}</a:tableStyleId>
-              </a:tblPr>
-              <a:tblGrid>
-                <a:gridCol w="900100"/>
-                <a:gridCol w="900100"/>
-                <a:gridCol w="900100"/>
-                <a:gridCol w="900100"/>
-              </a:tblGrid>
-              <a:tr h="0">
-                <a:tc>
-                  <a:txBody>
-                    <a:bodyPr/>
-                    <a:lstStyle/>
-                    <a:p>
-                      <a:pPr algn="ctr"/>
-                      <a:r>
-                        <a:rPr lang="en-US" altLang="zh-TW" sz="1400" b="0" dirty="0" smtClean="0">
-                          <a:solidFill>
-                            <a:srgbClr val="FF0000"/>
-                          </a:solidFill>
-                        </a:rPr>
-                        <a:t>ID</a:t>
-                      </a:r>
-                      <a:endParaRPr lang="zh-TW" altLang="en-US" sz="1400" b="0" dirty="0">
-                        <a:solidFill>
-                          <a:srgbClr val="FF0000"/>
-                        </a:solidFill>
-                      </a:endParaRPr>
-                    </a:p>
-                  </a:txBody>
-                  <a:tcPr>
-                    <a:lnL w="12700" cap="flat" cmpd="sng" algn="ctr">
-                      <a:solidFill>
-                        <a:schemeClr val="tx1"/>
-                      </a:solidFill>
-                      <a:prstDash val="solid"/>
-                      <a:round/>
-                      <a:headEnd type="none" w="med" len="med"/>
-                      <a:tailEnd type="none" w="med" len="med"/>
-                    </a:lnL>
-                    <a:lnR w="12700" cap="flat" cmpd="sng" algn="ctr">
-                      <a:solidFill>
-                        <a:schemeClr val="tx1"/>
-                      </a:solidFill>
-                      <a:prstDash val="solid"/>
-                      <a:round/>
-                      <a:headEnd type="none" w="med" len="med"/>
-                      <a:tailEnd type="none" w="med" len="med"/>
-                    </a:lnR>
-                    <a:lnT w="12700" cap="flat" cmpd="sng" algn="ctr">
-                      <a:solidFill>
-                        <a:schemeClr val="tx1"/>
-                      </a:solidFill>
-                      <a:prstDash val="solid"/>
-                      <a:round/>
-                      <a:headEnd type="none" w="med" len="med"/>
-                      <a:tailEnd type="none" w="med" len="med"/>
-                    </a:lnT>
-                    <a:lnB w="12700" cap="flat" cmpd="sng" algn="ctr">
-                      <a:solidFill>
-                        <a:schemeClr val="tx1"/>
-                      </a:solidFill>
-                      <a:prstDash val="solid"/>
-                      <a:round/>
-                      <a:headEnd type="none" w="med" len="med"/>
-                      <a:tailEnd type="none" w="med" len="med"/>
-                    </a:lnB>
-                    <a:noFill/>
-                  </a:tcPr>
-                </a:tc>
-                <a:tc>
-                  <a:txBody>
-                    <a:bodyPr/>
-                    <a:lstStyle/>
-                    <a:p>
-                      <a:pPr algn="ctr"/>
-                      <a:r>
-                        <a:rPr lang="en-US" altLang="zh-TW" sz="1400" b="0" dirty="0" smtClean="0">
-                          <a:solidFill>
-                            <a:srgbClr val="FF0000"/>
-                          </a:solidFill>
-                        </a:rPr>
-                        <a:t>Post</a:t>
-                      </a:r>
-                      <a:endParaRPr lang="zh-TW" altLang="en-US" sz="1400" b="0" dirty="0">
-                        <a:solidFill>
-                          <a:srgbClr val="FF0000"/>
-                        </a:solidFill>
-                      </a:endParaRPr>
-                    </a:p>
-                  </a:txBody>
-                  <a:tcPr>
-                    <a:lnL w="12700" cap="flat" cmpd="sng" algn="ctr">
-                      <a:solidFill>
-                        <a:schemeClr val="tx1"/>
-                      </a:solidFill>
-                      <a:prstDash val="solid"/>
-                      <a:round/>
-                      <a:headEnd type="none" w="med" len="med"/>
-                      <a:tailEnd type="none" w="med" len="med"/>
-                    </a:lnL>
-                    <a:lnR w="12700" cap="flat" cmpd="sng" algn="ctr">
-                      <a:solidFill>
-                        <a:schemeClr val="tx1"/>
-                      </a:solidFill>
-                      <a:prstDash val="solid"/>
-                      <a:round/>
-                      <a:headEnd type="none" w="med" len="med"/>
-                      <a:tailEnd type="none" w="med" len="med"/>
-                    </a:lnR>
-                    <a:lnT w="12700" cap="flat" cmpd="sng" algn="ctr">
-                      <a:solidFill>
-                        <a:schemeClr val="tx1"/>
-                      </a:solidFill>
-                      <a:prstDash val="solid"/>
-                      <a:round/>
-                      <a:headEnd type="none" w="med" len="med"/>
-                      <a:tailEnd type="none" w="med" len="med"/>
-                    </a:lnT>
-                    <a:lnB w="12700" cap="flat" cmpd="sng" algn="ctr">
-                      <a:solidFill>
-                        <a:schemeClr val="tx1"/>
-                      </a:solidFill>
-                      <a:prstDash val="solid"/>
-                      <a:round/>
-                      <a:headEnd type="none" w="med" len="med"/>
-                      <a:tailEnd type="none" w="med" len="med"/>
-                    </a:lnB>
-                    <a:noFill/>
-                  </a:tcPr>
-                </a:tc>
-                <a:tc>
-                  <a:txBody>
-                    <a:bodyPr/>
-                    <a:lstStyle/>
-                    <a:p>
-                      <a:pPr algn="ctr"/>
-                      <a:r>
-                        <a:rPr lang="en-US" altLang="zh-TW" sz="1400" b="0" dirty="0" smtClean="0">
-                          <a:solidFill>
-                            <a:srgbClr val="FF0000"/>
-                          </a:solidFill>
-                        </a:rPr>
-                        <a:t>Time </a:t>
-                      </a:r>
-                      <a:endParaRPr lang="zh-TW" altLang="en-US" sz="1400" b="0" dirty="0">
-                        <a:solidFill>
-                          <a:srgbClr val="FF0000"/>
-                        </a:solidFill>
-                      </a:endParaRPr>
-                    </a:p>
-                  </a:txBody>
-                  <a:tcPr>
-                    <a:lnL w="12700" cap="flat" cmpd="sng" algn="ctr">
-                      <a:solidFill>
-                        <a:schemeClr val="tx1"/>
-                      </a:solidFill>
-                      <a:prstDash val="solid"/>
-                      <a:round/>
-                      <a:headEnd type="none" w="med" len="med"/>
-                      <a:tailEnd type="none" w="med" len="med"/>
-                    </a:lnL>
-                    <a:lnR w="12700" cap="flat" cmpd="sng" algn="ctr">
-                      <a:solidFill>
-                        <a:schemeClr val="tx1"/>
-                      </a:solidFill>
-                      <a:prstDash val="solid"/>
-                      <a:round/>
-                      <a:headEnd type="none" w="med" len="med"/>
-                      <a:tailEnd type="none" w="med" len="med"/>
-                    </a:lnR>
-                    <a:lnT w="12700" cap="flat" cmpd="sng" algn="ctr">
-                      <a:solidFill>
-                        <a:schemeClr val="tx1"/>
-                      </a:solidFill>
-                      <a:prstDash val="solid"/>
-                      <a:round/>
-                      <a:headEnd type="none" w="med" len="med"/>
-                      <a:tailEnd type="none" w="med" len="med"/>
-                    </a:lnT>
-                    <a:lnB w="12700" cap="flat" cmpd="sng" algn="ctr">
-                      <a:solidFill>
-                        <a:schemeClr val="tx1"/>
-                      </a:solidFill>
-                      <a:prstDash val="solid"/>
-                      <a:round/>
-                      <a:headEnd type="none" w="med" len="med"/>
-                      <a:tailEnd type="none" w="med" len="med"/>
-                    </a:lnB>
-                    <a:noFill/>
-                  </a:tcPr>
-                </a:tc>
-                <a:tc>
-                  <a:txBody>
-                    <a:bodyPr/>
-                    <a:lstStyle/>
-                    <a:p>
-                      <a:pPr algn="ctr"/>
-                      <a:r>
-                        <a:rPr lang="en-US" altLang="zh-TW" sz="1400" b="0" dirty="0" smtClean="0">
-                          <a:solidFill>
-                            <a:srgbClr val="FF0000"/>
-                          </a:solidFill>
-                        </a:rPr>
-                        <a:t>Other…</a:t>
-                      </a:r>
-                      <a:endParaRPr lang="zh-TW" altLang="en-US" sz="1400" b="0" dirty="0">
-                        <a:solidFill>
-                          <a:srgbClr val="FF0000"/>
-                        </a:solidFill>
-                      </a:endParaRPr>
-                    </a:p>
-                  </a:txBody>
-                  <a:tcPr>
-                    <a:lnL w="12700" cap="flat" cmpd="sng" algn="ctr">
-                      <a:solidFill>
-                        <a:schemeClr val="tx1"/>
-                      </a:solidFill>
-                      <a:prstDash val="solid"/>
-                      <a:round/>
-                      <a:headEnd type="none" w="med" len="med"/>
-                      <a:tailEnd type="none" w="med" len="med"/>
-                    </a:lnL>
-                    <a:lnR w="12700" cap="flat" cmpd="sng" algn="ctr">
-                      <a:solidFill>
-                        <a:schemeClr val="tx1"/>
-                      </a:solidFill>
-                      <a:prstDash val="solid"/>
-                      <a:round/>
-                      <a:headEnd type="none" w="med" len="med"/>
-                      <a:tailEnd type="none" w="med" len="med"/>
-                    </a:lnR>
-                    <a:lnT w="12700" cap="flat" cmpd="sng" algn="ctr">
-                      <a:solidFill>
-                        <a:schemeClr val="tx1"/>
-                      </a:solidFill>
-                      <a:prstDash val="solid"/>
-                      <a:round/>
-                      <a:headEnd type="none" w="med" len="med"/>
-                      <a:tailEnd type="none" w="med" len="med"/>
-                    </a:lnT>
-                    <a:lnB w="12700" cap="flat" cmpd="sng" algn="ctr">
-                      <a:solidFill>
-                        <a:schemeClr val="tx1"/>
-                      </a:solidFill>
-                      <a:prstDash val="solid"/>
-                      <a:round/>
-                      <a:headEnd type="none" w="med" len="med"/>
-                      <a:tailEnd type="none" w="med" len="med"/>
-                    </a:lnB>
-                    <a:noFill/>
-                  </a:tcPr>
-                </a:tc>
-              </a:tr>
-            </a:tbl>
-          </a:graphicData>
-        </a:graphic>
-      </p:graphicFrame>
-      <p:sp>
-        <p:nvSpPr>
-          <p:cNvPr id="45" name="文字方塊 44"/>
-          <p:cNvSpPr txBox="1"/>
-          <p:nvPr/>
-        </p:nvSpPr>
-        <p:spPr>
-          <a:xfrm>
-            <a:off x="5364088" y="1866310"/>
-            <a:ext cx="2448272" cy="338554"/>
-          </a:xfrm>
-          <a:prstGeom prst="rect">
-            <a:avLst/>
-          </a:prstGeom>
-          <a:noFill/>
-        </p:spPr>
-        <p:txBody>
-          <a:bodyPr wrap="square" rtlCol="0">
-            <a:spAutoFit/>
-          </a:bodyPr>
-          <a:lstStyle/>
-          <a:p>
-            <a:r>
-              <a:rPr lang="en-US" altLang="zh-TW" sz="1600" dirty="0" smtClean="0">
-                <a:solidFill>
-                  <a:srgbClr val="FF0000"/>
-                </a:solidFill>
-                <a:latin typeface="Times New Roman" panose="02020603050405020304" pitchFamily="18" charset="0"/>
-                <a:ea typeface="標楷體" panose="03000509000000000000" pitchFamily="65" charset="-120"/>
-                <a:cs typeface="Times New Roman" panose="02020603050405020304" pitchFamily="18" charset="0"/>
-              </a:rPr>
-              <a:t>* depend on DB</a:t>
-            </a:r>
-          </a:p>
-        </p:txBody>
-      </p:sp>
-      <p:cxnSp>
-        <p:nvCxnSpPr>
-          <p:cNvPr id="47" name="直線接點 46"/>
-          <p:cNvCxnSpPr/>
-          <p:nvPr/>
-        </p:nvCxnSpPr>
-        <p:spPr>
-          <a:xfrm>
-            <a:off x="3635896" y="2420888"/>
-            <a:ext cx="5328592" cy="0"/>
-          </a:xfrm>
-          <a:prstGeom prst="line">
-            <a:avLst/>
-          </a:prstGeom>
-          <a:ln>
-            <a:prstDash val="dash"/>
-          </a:ln>
-        </p:spPr>
-        <p:style>
-          <a:lnRef idx="1">
-            <a:schemeClr val="accent2"/>
-          </a:lnRef>
-          <a:fillRef idx="0">
-            <a:schemeClr val="accent2"/>
-          </a:fillRef>
-          <a:effectRef idx="0">
-            <a:schemeClr val="accent2"/>
-          </a:effectRef>
-          <a:fontRef idx="minor">
-            <a:schemeClr val="tx1"/>
-          </a:fontRef>
-        </p:style>
-      </p:cxnSp>
-      <p:cxnSp>
-        <p:nvCxnSpPr>
-          <p:cNvPr id="48" name="直線接點 47"/>
-          <p:cNvCxnSpPr/>
-          <p:nvPr/>
-        </p:nvCxnSpPr>
-        <p:spPr>
-          <a:xfrm>
-            <a:off x="3635896" y="3717032"/>
-            <a:ext cx="5328592" cy="0"/>
-          </a:xfrm>
-          <a:prstGeom prst="line">
-            <a:avLst/>
-          </a:prstGeom>
-          <a:ln>
-            <a:prstDash val="dash"/>
-          </a:ln>
-        </p:spPr>
-        <p:style>
-          <a:lnRef idx="1">
-            <a:schemeClr val="accent2"/>
-          </a:lnRef>
-          <a:fillRef idx="0">
-            <a:schemeClr val="accent2"/>
-          </a:fillRef>
-          <a:effectRef idx="0">
-            <a:schemeClr val="accent2"/>
-          </a:effectRef>
-          <a:fontRef idx="minor">
-            <a:schemeClr val="tx1"/>
-          </a:fontRef>
-        </p:style>
-      </p:cxnSp>
-      <p:cxnSp>
-        <p:nvCxnSpPr>
-          <p:cNvPr id="49" name="直線接點 48"/>
-          <p:cNvCxnSpPr/>
-          <p:nvPr/>
-        </p:nvCxnSpPr>
-        <p:spPr>
-          <a:xfrm>
-            <a:off x="3635896" y="5013176"/>
-            <a:ext cx="5328592" cy="0"/>
-          </a:xfrm>
-          <a:prstGeom prst="line">
-            <a:avLst/>
-          </a:prstGeom>
-          <a:ln>
-            <a:prstDash val="dash"/>
-          </a:ln>
-        </p:spPr>
-        <p:style>
-          <a:lnRef idx="1">
-            <a:schemeClr val="accent2"/>
-          </a:lnRef>
-          <a:fillRef idx="0">
-            <a:schemeClr val="accent2"/>
-          </a:fillRef>
-          <a:effectRef idx="0">
-            <a:schemeClr val="accent2"/>
-          </a:effectRef>
-          <a:fontRef idx="minor">
-            <a:schemeClr val="tx1"/>
-          </a:fontRef>
-        </p:style>
-      </p:cxnSp>
-      <p:graphicFrame>
-        <p:nvGraphicFramePr>
-          <p:cNvPr id="50" name="表格 49"/>
-          <p:cNvGraphicFramePr>
-            <a:graphicFrameLocks noGrp="1"/>
-          </p:cNvGraphicFramePr>
-          <p:nvPr>
-            <p:extLst>
-              <p:ext uri="{D42A27DB-BD31-4B8C-83A1-F6EECF244321}">
-                <p14:modId xmlns:p14="http://schemas.microsoft.com/office/powerpoint/2010/main" val="1354058701"/>
-              </p:ext>
-            </p:extLst>
-          </p:nvPr>
-        </p:nvGraphicFramePr>
-        <p:xfrm>
-          <a:off x="6156177" y="2708920"/>
-          <a:ext cx="1008111" cy="822960"/>
-        </p:xfrm>
-        <a:graphic>
-          <a:graphicData uri="http://schemas.openxmlformats.org/drawingml/2006/table">
-            <a:tbl>
-              <a:tblPr firstRow="1" bandRow="1">
-                <a:tableStyleId>{5940675A-B579-460E-94D1-54222C63F5DA}</a:tableStyleId>
-              </a:tblPr>
-              <a:tblGrid>
-                <a:gridCol w="360039"/>
-                <a:gridCol w="360040"/>
-                <a:gridCol w="288032"/>
-              </a:tblGrid>
-              <a:tr h="216024">
-                <a:tc>
-                  <a:txBody>
-                    <a:bodyPr/>
-                    <a:lstStyle/>
-                    <a:p>
-                      <a:endParaRPr lang="zh-TW" altLang="en-US" sz="1200" dirty="0">
-                        <a:solidFill>
-                          <a:schemeClr val="tx1">
-                            <a:lumMod val="95000"/>
-                            <a:lumOff val="5000"/>
-                          </a:schemeClr>
-                        </a:solidFill>
-                      </a:endParaRPr>
-                    </a:p>
-                  </a:txBody>
-                  <a:tcPr/>
-                </a:tc>
-                <a:tc>
-                  <a:txBody>
-                    <a:bodyPr/>
-                    <a:lstStyle/>
-                    <a:p>
-                      <a:endParaRPr lang="zh-TW" altLang="en-US" sz="1200" dirty="0">
-                        <a:solidFill>
-                          <a:schemeClr val="tx1">
-                            <a:lumMod val="95000"/>
-                            <a:lumOff val="5000"/>
-                          </a:schemeClr>
-                        </a:solidFill>
-                      </a:endParaRPr>
-                    </a:p>
-                  </a:txBody>
-                  <a:tcPr/>
-                </a:tc>
-                <a:tc>
-                  <a:txBody>
-                    <a:bodyPr/>
-                    <a:lstStyle/>
-                    <a:p>
-                      <a:endParaRPr lang="zh-TW" altLang="en-US" sz="1200" dirty="0">
-                        <a:solidFill>
-                          <a:schemeClr val="tx1">
-                            <a:lumMod val="95000"/>
-                            <a:lumOff val="5000"/>
-                          </a:schemeClr>
-                        </a:solidFill>
-                      </a:endParaRPr>
-                    </a:p>
-                  </a:txBody>
-                  <a:tcPr/>
-                </a:tc>
-              </a:tr>
-              <a:tr h="240027">
-                <a:tc>
-                  <a:txBody>
-                    <a:bodyPr/>
-                    <a:lstStyle/>
-                    <a:p>
-                      <a:endParaRPr lang="zh-TW" altLang="en-US" sz="1200">
-                        <a:solidFill>
-                          <a:schemeClr val="tx1">
-                            <a:lumMod val="95000"/>
-                            <a:lumOff val="5000"/>
-                          </a:schemeClr>
-                        </a:solidFill>
-                      </a:endParaRPr>
-                    </a:p>
-                  </a:txBody>
-                  <a:tcPr/>
-                </a:tc>
-                <a:tc>
-                  <a:txBody>
-                    <a:bodyPr/>
-                    <a:lstStyle/>
-                    <a:p>
-                      <a:endParaRPr lang="zh-TW" altLang="en-US" sz="1200" dirty="0">
-                        <a:solidFill>
-                          <a:schemeClr val="tx1">
-                            <a:lumMod val="95000"/>
-                            <a:lumOff val="5000"/>
-                          </a:schemeClr>
-                        </a:solidFill>
-                      </a:endParaRPr>
-                    </a:p>
-                  </a:txBody>
-                  <a:tcPr/>
-                </a:tc>
-                <a:tc>
-                  <a:txBody>
-                    <a:bodyPr/>
-                    <a:lstStyle/>
-                    <a:p>
-                      <a:endParaRPr lang="zh-TW" altLang="en-US" sz="1200" dirty="0">
-                        <a:solidFill>
-                          <a:schemeClr val="tx1">
-                            <a:lumMod val="95000"/>
-                            <a:lumOff val="5000"/>
-                          </a:schemeClr>
-                        </a:solidFill>
-                      </a:endParaRPr>
-                    </a:p>
-                  </a:txBody>
-                  <a:tcPr/>
-                </a:tc>
-              </a:tr>
-              <a:tr h="240027">
-                <a:tc>
-                  <a:txBody>
-                    <a:bodyPr/>
-                    <a:lstStyle/>
-                    <a:p>
-                      <a:endParaRPr lang="zh-TW" altLang="en-US" sz="1200">
-                        <a:solidFill>
-                          <a:schemeClr val="tx1">
-                            <a:lumMod val="95000"/>
-                            <a:lumOff val="5000"/>
-                          </a:schemeClr>
-                        </a:solidFill>
-                      </a:endParaRPr>
-                    </a:p>
-                  </a:txBody>
-                  <a:tcPr/>
-                </a:tc>
-                <a:tc>
-                  <a:txBody>
-                    <a:bodyPr/>
-                    <a:lstStyle/>
-                    <a:p>
-                      <a:endParaRPr lang="zh-TW" altLang="en-US" sz="1200" dirty="0">
-                        <a:solidFill>
-                          <a:schemeClr val="tx1">
-                            <a:lumMod val="95000"/>
-                            <a:lumOff val="5000"/>
-                          </a:schemeClr>
-                        </a:solidFill>
-                      </a:endParaRPr>
-                    </a:p>
-                  </a:txBody>
-                  <a:tcPr/>
-                </a:tc>
-                <a:tc>
-                  <a:txBody>
-                    <a:bodyPr/>
-                    <a:lstStyle/>
-                    <a:p>
-                      <a:endParaRPr lang="zh-TW" altLang="en-US" sz="1200" dirty="0">
-                        <a:solidFill>
-                          <a:schemeClr val="tx1">
-                            <a:lumMod val="95000"/>
-                            <a:lumOff val="5000"/>
-                          </a:schemeClr>
-                        </a:solidFill>
-                      </a:endParaRPr>
-                    </a:p>
-                  </a:txBody>
-                  <a:tcPr/>
-                </a:tc>
-              </a:tr>
-            </a:tbl>
-          </a:graphicData>
-        </a:graphic>
-      </p:graphicFrame>
-      <p:sp>
-        <p:nvSpPr>
-          <p:cNvPr id="51" name="文字方塊 50"/>
-          <p:cNvSpPr txBox="1"/>
-          <p:nvPr/>
-        </p:nvSpPr>
-        <p:spPr>
-          <a:xfrm>
-            <a:off x="6156176" y="2420888"/>
-            <a:ext cx="2448272" cy="307777"/>
-          </a:xfrm>
-          <a:prstGeom prst="rect">
-            <a:avLst/>
-          </a:prstGeom>
-          <a:noFill/>
-        </p:spPr>
-        <p:txBody>
-          <a:bodyPr wrap="square" rtlCol="0">
-            <a:spAutoFit/>
-          </a:bodyPr>
-          <a:lstStyle/>
-          <a:p>
-            <a:r>
-              <a:rPr lang="en-US" altLang="zh-TW" sz="1400" dirty="0" smtClean="0">
-                <a:solidFill>
-                  <a:srgbClr val="FF0000"/>
-                </a:solidFill>
-                <a:latin typeface="Times New Roman" panose="02020603050405020304" pitchFamily="18" charset="0"/>
-                <a:ea typeface="標楷體" panose="03000509000000000000" pitchFamily="65" charset="-120"/>
-                <a:cs typeface="Times New Roman" panose="02020603050405020304" pitchFamily="18" charset="0"/>
-              </a:rPr>
-              <a:t>ID1  ID2  ID3  …..</a:t>
-            </a:r>
-          </a:p>
-        </p:txBody>
-      </p:sp>
-      <p:sp>
-        <p:nvSpPr>
-          <p:cNvPr id="52" name="文字方塊 51"/>
-          <p:cNvSpPr txBox="1"/>
-          <p:nvPr/>
-        </p:nvSpPr>
-        <p:spPr>
-          <a:xfrm>
-            <a:off x="5724128" y="2708920"/>
-            <a:ext cx="576064" cy="954107"/>
-          </a:xfrm>
-          <a:prstGeom prst="rect">
-            <a:avLst/>
-          </a:prstGeom>
-          <a:noFill/>
-        </p:spPr>
-        <p:txBody>
-          <a:bodyPr wrap="square" rtlCol="0">
-            <a:spAutoFit/>
-          </a:bodyPr>
-          <a:lstStyle/>
-          <a:p>
-            <a:r>
-              <a:rPr lang="en-US" altLang="zh-TW" sz="1400" dirty="0" smtClean="0">
-                <a:solidFill>
-                  <a:srgbClr val="FF0000"/>
-                </a:solidFill>
-                <a:latin typeface="Times New Roman" panose="02020603050405020304" pitchFamily="18" charset="0"/>
-                <a:ea typeface="標楷體" panose="03000509000000000000" pitchFamily="65" charset="-120"/>
-                <a:cs typeface="Times New Roman" panose="02020603050405020304" pitchFamily="18" charset="0"/>
-              </a:rPr>
-              <a:t>ID1</a:t>
-            </a:r>
-          </a:p>
-          <a:p>
-            <a:r>
-              <a:rPr lang="en-US" altLang="zh-TW" sz="1400" dirty="0" smtClean="0">
-                <a:solidFill>
-                  <a:srgbClr val="FF0000"/>
-                </a:solidFill>
-                <a:latin typeface="Times New Roman" panose="02020603050405020304" pitchFamily="18" charset="0"/>
-                <a:ea typeface="標楷體" panose="03000509000000000000" pitchFamily="65" charset="-120"/>
-                <a:cs typeface="Times New Roman" panose="02020603050405020304" pitchFamily="18" charset="0"/>
-              </a:rPr>
-              <a:t>ID2</a:t>
-            </a:r>
-          </a:p>
-          <a:p>
-            <a:r>
-              <a:rPr lang="en-US" altLang="zh-TW" sz="1400" dirty="0" smtClean="0">
-                <a:solidFill>
-                  <a:srgbClr val="FF0000"/>
-                </a:solidFill>
-                <a:latin typeface="Times New Roman" panose="02020603050405020304" pitchFamily="18" charset="0"/>
-                <a:ea typeface="標楷體" panose="03000509000000000000" pitchFamily="65" charset="-120"/>
-                <a:cs typeface="Times New Roman" panose="02020603050405020304" pitchFamily="18" charset="0"/>
-              </a:rPr>
-              <a:t>ID3</a:t>
-            </a:r>
-          </a:p>
-          <a:p>
-            <a:r>
-              <a:rPr lang="en-US" altLang="zh-TW" sz="1400" dirty="0" smtClean="0">
-                <a:solidFill>
-                  <a:srgbClr val="FF0000"/>
-                </a:solidFill>
-                <a:latin typeface="Times New Roman" panose="02020603050405020304" pitchFamily="18" charset="0"/>
-                <a:ea typeface="標楷體" panose="03000509000000000000" pitchFamily="65" charset="-120"/>
-                <a:cs typeface="Times New Roman" panose="02020603050405020304" pitchFamily="18" charset="0"/>
-              </a:rPr>
-              <a:t>…</a:t>
-            </a:r>
-          </a:p>
-        </p:txBody>
-      </p:sp>
-      <p:cxnSp>
-        <p:nvCxnSpPr>
-          <p:cNvPr id="53" name="直線單箭頭接點 52"/>
-          <p:cNvCxnSpPr/>
-          <p:nvPr/>
-        </p:nvCxnSpPr>
-        <p:spPr>
-          <a:xfrm flipV="1">
-            <a:off x="6156176" y="3501008"/>
-            <a:ext cx="0" cy="216024"/>
-          </a:xfrm>
-          <a:prstGeom prst="straightConnector1">
-            <a:avLst/>
-          </a:prstGeom>
-          <a:ln>
-            <a:headEnd type="none" w="med" len="med"/>
-            <a:tailEnd type="none" w="med" len="med"/>
-          </a:ln>
-        </p:spPr>
-        <p:style>
-          <a:lnRef idx="1">
-            <a:schemeClr val="dk1"/>
-          </a:lnRef>
-          <a:fillRef idx="0">
-            <a:schemeClr val="dk1"/>
-          </a:fillRef>
-          <a:effectRef idx="0">
-            <a:schemeClr val="dk1"/>
-          </a:effectRef>
-          <a:fontRef idx="minor">
-            <a:schemeClr val="tx1"/>
-          </a:fontRef>
-        </p:style>
-      </p:cxnSp>
-      <p:cxnSp>
-        <p:nvCxnSpPr>
-          <p:cNvPr id="58" name="直線單箭頭接點 57"/>
-          <p:cNvCxnSpPr/>
-          <p:nvPr/>
-        </p:nvCxnSpPr>
-        <p:spPr>
-          <a:xfrm flipV="1">
-            <a:off x="6516216" y="3501008"/>
-            <a:ext cx="0" cy="216024"/>
-          </a:xfrm>
-          <a:prstGeom prst="straightConnector1">
-            <a:avLst/>
-          </a:prstGeom>
-          <a:ln>
-            <a:headEnd type="none" w="med" len="med"/>
-            <a:tailEnd type="none" w="med" len="med"/>
-          </a:ln>
-        </p:spPr>
-        <p:style>
-          <a:lnRef idx="1">
-            <a:schemeClr val="dk1"/>
-          </a:lnRef>
-          <a:fillRef idx="0">
-            <a:schemeClr val="dk1"/>
-          </a:fillRef>
-          <a:effectRef idx="0">
-            <a:schemeClr val="dk1"/>
-          </a:effectRef>
-          <a:fontRef idx="minor">
-            <a:schemeClr val="tx1"/>
-          </a:fontRef>
-        </p:style>
-      </p:cxnSp>
-      <p:cxnSp>
-        <p:nvCxnSpPr>
-          <p:cNvPr id="59" name="直線單箭頭接點 58"/>
-          <p:cNvCxnSpPr/>
-          <p:nvPr/>
-        </p:nvCxnSpPr>
-        <p:spPr>
-          <a:xfrm flipV="1">
-            <a:off x="6876256" y="3501008"/>
-            <a:ext cx="0" cy="216024"/>
-          </a:xfrm>
-          <a:prstGeom prst="straightConnector1">
-            <a:avLst/>
-          </a:prstGeom>
-          <a:ln>
-            <a:headEnd type="none" w="med" len="med"/>
-            <a:tailEnd type="none" w="med" len="med"/>
-          </a:ln>
-        </p:spPr>
-        <p:style>
-          <a:lnRef idx="1">
-            <a:schemeClr val="dk1"/>
-          </a:lnRef>
-          <a:fillRef idx="0">
-            <a:schemeClr val="dk1"/>
-          </a:fillRef>
-          <a:effectRef idx="0">
-            <a:schemeClr val="dk1"/>
-          </a:effectRef>
-          <a:fontRef idx="minor">
-            <a:schemeClr val="tx1"/>
-          </a:fontRef>
-        </p:style>
-      </p:cxnSp>
-      <p:cxnSp>
-        <p:nvCxnSpPr>
-          <p:cNvPr id="60" name="直線單箭頭接點 59"/>
-          <p:cNvCxnSpPr/>
-          <p:nvPr/>
-        </p:nvCxnSpPr>
-        <p:spPr>
-          <a:xfrm flipH="1">
-            <a:off x="7164288" y="2708919"/>
-            <a:ext cx="360040" cy="1"/>
-          </a:xfrm>
-          <a:prstGeom prst="straightConnector1">
-            <a:avLst/>
-          </a:prstGeom>
-          <a:ln>
-            <a:headEnd type="none" w="med" len="med"/>
-            <a:tailEnd type="none" w="med" len="med"/>
-          </a:ln>
-        </p:spPr>
-        <p:style>
-          <a:lnRef idx="1">
-            <a:schemeClr val="dk1"/>
-          </a:lnRef>
-          <a:fillRef idx="0">
-            <a:schemeClr val="dk1"/>
-          </a:fillRef>
-          <a:effectRef idx="0">
-            <a:schemeClr val="dk1"/>
-          </a:effectRef>
-          <a:fontRef idx="minor">
-            <a:schemeClr val="tx1"/>
-          </a:fontRef>
-        </p:style>
-      </p:cxnSp>
-      <p:cxnSp>
-        <p:nvCxnSpPr>
-          <p:cNvPr id="68" name="直線單箭頭接點 67"/>
-          <p:cNvCxnSpPr/>
-          <p:nvPr/>
-        </p:nvCxnSpPr>
-        <p:spPr>
-          <a:xfrm>
-            <a:off x="7308304" y="2132856"/>
-            <a:ext cx="0" cy="360040"/>
-          </a:xfrm>
-          <a:prstGeom prst="straightConnector1">
-            <a:avLst/>
-          </a:prstGeom>
-          <a:ln w="19050">
-            <a:solidFill>
-              <a:srgbClr val="FF0000"/>
-            </a:solidFill>
-            <a:tailEnd type="arrow"/>
-          </a:ln>
-        </p:spPr>
-        <p:style>
-          <a:lnRef idx="1">
-            <a:schemeClr val="dk1"/>
-          </a:lnRef>
-          <a:fillRef idx="0">
-            <a:schemeClr val="dk1"/>
-          </a:fillRef>
-          <a:effectRef idx="0">
-            <a:schemeClr val="dk1"/>
-          </a:effectRef>
-          <a:fontRef idx="minor">
-            <a:schemeClr val="tx1"/>
-          </a:fontRef>
-        </p:style>
-      </p:cxnSp>
-      <p:sp>
-        <p:nvSpPr>
-          <p:cNvPr id="73" name="文字方塊 72"/>
-          <p:cNvSpPr txBox="1"/>
-          <p:nvPr/>
-        </p:nvSpPr>
-        <p:spPr>
-          <a:xfrm>
-            <a:off x="6444208" y="4170566"/>
-            <a:ext cx="1728192" cy="338554"/>
-          </a:xfrm>
-          <a:prstGeom prst="rect">
-            <a:avLst/>
-          </a:prstGeom>
-          <a:noFill/>
-        </p:spPr>
-        <p:txBody>
-          <a:bodyPr wrap="square" rtlCol="0">
-            <a:spAutoFit/>
-          </a:bodyPr>
-          <a:lstStyle/>
-          <a:p>
-            <a:r>
-              <a:rPr lang="en-US" altLang="zh-TW" sz="1600" dirty="0" smtClean="0">
-                <a:solidFill>
-                  <a:srgbClr val="FF0000"/>
-                </a:solidFill>
-                <a:latin typeface="Times New Roman" panose="02020603050405020304" pitchFamily="18" charset="0"/>
-                <a:ea typeface="標楷體" panose="03000509000000000000" pitchFamily="65" charset="-120"/>
-                <a:cs typeface="Times New Roman" panose="02020603050405020304" pitchFamily="18" charset="0"/>
-              </a:rPr>
-              <a:t>More  matrices</a:t>
-            </a:r>
-            <a:endParaRPr lang="zh-TW" altLang="en-US" sz="1600" dirty="0">
-              <a:solidFill>
-                <a:srgbClr val="FF0000"/>
-              </a:solidFill>
-              <a:latin typeface="Times New Roman" panose="02020603050405020304" pitchFamily="18" charset="0"/>
-              <a:ea typeface="標楷體" panose="03000509000000000000" pitchFamily="65" charset="-120"/>
-              <a:cs typeface="Times New Roman" panose="02020603050405020304" pitchFamily="18" charset="0"/>
-            </a:endParaRPr>
-          </a:p>
-        </p:txBody>
-      </p:sp>
-      <p:cxnSp>
-        <p:nvCxnSpPr>
-          <p:cNvPr id="74" name="直線單箭頭接點 73"/>
-          <p:cNvCxnSpPr/>
-          <p:nvPr/>
-        </p:nvCxnSpPr>
-        <p:spPr>
-          <a:xfrm>
-            <a:off x="7308304" y="3789040"/>
-            <a:ext cx="0" cy="360040"/>
-          </a:xfrm>
-          <a:prstGeom prst="straightConnector1">
-            <a:avLst/>
-          </a:prstGeom>
-          <a:ln w="19050">
-            <a:solidFill>
-              <a:srgbClr val="FF0000"/>
-            </a:solidFill>
-            <a:tailEnd type="arrow"/>
-          </a:ln>
-        </p:spPr>
-        <p:style>
-          <a:lnRef idx="1">
-            <a:schemeClr val="dk1"/>
-          </a:lnRef>
-          <a:fillRef idx="0">
-            <a:schemeClr val="dk1"/>
-          </a:fillRef>
-          <a:effectRef idx="0">
-            <a:schemeClr val="dk1"/>
-          </a:effectRef>
-          <a:fontRef idx="minor">
-            <a:schemeClr val="tx1"/>
-          </a:fontRef>
-        </p:style>
-      </p:cxnSp>
+              </a:endParaRPr>
+            </a:p>
+          </p:txBody>
+        </p:sp>
+      </p:grpSp>
       <p:cxnSp>
         <p:nvCxnSpPr>
           <p:cNvPr id="12" name="直線單箭頭接點 11"/>
@@ -7050,7 +5986,541 @@
           </a:fontRef>
         </p:style>
       </p:cxnSp>
+      <p:grpSp>
+        <p:nvGrpSpPr>
+          <p:cNvPr id="10" name="群組 9"/>
+          <p:cNvGrpSpPr/>
+          <p:nvPr/>
+        </p:nvGrpSpPr>
+        <p:grpSpPr>
+          <a:xfrm>
+            <a:off x="3635896" y="2402885"/>
+            <a:ext cx="5328592" cy="1242139"/>
+            <a:chOff x="3635896" y="2420888"/>
+            <a:chExt cx="5328592" cy="1242139"/>
+          </a:xfrm>
+        </p:grpSpPr>
+        <p:sp>
+          <p:nvSpPr>
+            <p:cNvPr id="38" name="文字方塊 37"/>
+            <p:cNvSpPr txBox="1"/>
+            <p:nvPr/>
+          </p:nvSpPr>
+          <p:spPr>
+            <a:xfrm>
+              <a:off x="3635896" y="2627620"/>
+              <a:ext cx="1728192" cy="830997"/>
+            </a:xfrm>
+            <a:prstGeom prst="rect">
+              <a:avLst/>
+            </a:prstGeom>
+            <a:noFill/>
+          </p:spPr>
+          <p:txBody>
+            <a:bodyPr wrap="square" rtlCol="0">
+              <a:spAutoFit/>
+            </a:bodyPr>
+            <a:lstStyle/>
+            <a:p>
+              <a:r>
+                <a:rPr lang="en-US" altLang="zh-TW" sz="1600" dirty="0" smtClean="0">
+                  <a:latin typeface="Times New Roman" panose="02020603050405020304" pitchFamily="18" charset="0"/>
+                  <a:ea typeface="標楷體" panose="03000509000000000000" pitchFamily="65" charset="-120"/>
+                  <a:cs typeface="Times New Roman" panose="02020603050405020304" pitchFamily="18" charset="0"/>
+                </a:rPr>
+                <a:t>*</a:t>
+              </a:r>
+              <a:r>
+                <a:rPr lang="zh-TW" altLang="en-US" sz="1600" dirty="0" smtClean="0">
+                  <a:latin typeface="Times New Roman" panose="02020603050405020304" pitchFamily="18" charset="0"/>
+                  <a:ea typeface="標楷體" panose="03000509000000000000" pitchFamily="65" charset="-120"/>
+                  <a:cs typeface="Times New Roman" panose="02020603050405020304" pitchFamily="18" charset="0"/>
+                </a:rPr>
+                <a:t>從 </a:t>
+              </a:r>
+              <a:r>
+                <a:rPr lang="en-US" altLang="zh-TW" sz="1600" dirty="0" smtClean="0">
+                  <a:latin typeface="Times New Roman" panose="02020603050405020304" pitchFamily="18" charset="0"/>
+                  <a:ea typeface="標楷體" panose="03000509000000000000" pitchFamily="65" charset="-120"/>
+                  <a:cs typeface="Times New Roman" panose="02020603050405020304" pitchFamily="18" charset="0"/>
+                </a:rPr>
+                <a:t>DB load </a:t>
+              </a:r>
+              <a:r>
+                <a:rPr lang="zh-TW" altLang="en-US" sz="1600" dirty="0" smtClean="0">
+                  <a:latin typeface="Times New Roman" panose="02020603050405020304" pitchFamily="18" charset="0"/>
+                  <a:ea typeface="標楷體" panose="03000509000000000000" pitchFamily="65" charset="-120"/>
+                  <a:cs typeface="Times New Roman" panose="02020603050405020304" pitchFamily="18" charset="0"/>
+                </a:rPr>
+                <a:t>資料</a:t>
+              </a:r>
+              <a:endParaRPr lang="en-US" altLang="zh-TW" sz="1600" dirty="0" smtClean="0">
+                <a:latin typeface="Times New Roman" panose="02020603050405020304" pitchFamily="18" charset="0"/>
+                <a:ea typeface="標楷體" panose="03000509000000000000" pitchFamily="65" charset="-120"/>
+                <a:cs typeface="Times New Roman" panose="02020603050405020304" pitchFamily="18" charset="0"/>
+              </a:endParaRPr>
+            </a:p>
+            <a:p>
+              <a:r>
+                <a:rPr lang="zh-TW" altLang="en-US" sz="1600" dirty="0" smtClean="0">
+                  <a:latin typeface="Times New Roman" panose="02020603050405020304" pitchFamily="18" charset="0"/>
+                  <a:ea typeface="標楷體" panose="03000509000000000000" pitchFamily="65" charset="-120"/>
+                  <a:cs typeface="Times New Roman" panose="02020603050405020304" pitchFamily="18" charset="0"/>
+                </a:rPr>
+                <a:t>選擇需要的欄位</a:t>
+              </a:r>
+              <a:endParaRPr lang="en-US" altLang="zh-TW" sz="1600" dirty="0" smtClean="0">
+                <a:latin typeface="Times New Roman" panose="02020603050405020304" pitchFamily="18" charset="0"/>
+                <a:ea typeface="標楷體" panose="03000509000000000000" pitchFamily="65" charset="-120"/>
+                <a:cs typeface="Times New Roman" panose="02020603050405020304" pitchFamily="18" charset="0"/>
+              </a:endParaRPr>
+            </a:p>
+            <a:p>
+              <a:r>
+                <a:rPr lang="zh-TW" altLang="en-US" sz="1600" dirty="0" smtClean="0">
+                  <a:latin typeface="Times New Roman" panose="02020603050405020304" pitchFamily="18" charset="0"/>
+                  <a:ea typeface="標楷體" panose="03000509000000000000" pitchFamily="65" charset="-120"/>
+                  <a:cs typeface="Times New Roman" panose="02020603050405020304" pitchFamily="18" charset="0"/>
+                </a:rPr>
+                <a:t>形成</a:t>
+              </a:r>
+              <a:r>
+                <a:rPr lang="en-US" altLang="zh-TW" sz="1600" dirty="0" smtClean="0">
+                  <a:latin typeface="Times New Roman" panose="02020603050405020304" pitchFamily="18" charset="0"/>
+                  <a:ea typeface="標楷體" panose="03000509000000000000" pitchFamily="65" charset="-120"/>
+                  <a:cs typeface="Times New Roman" panose="02020603050405020304" pitchFamily="18" charset="0"/>
+                </a:rPr>
+                <a:t>Matrix</a:t>
+              </a:r>
+              <a:endParaRPr lang="zh-TW" altLang="en-US" sz="1600" dirty="0">
+                <a:latin typeface="Times New Roman" panose="02020603050405020304" pitchFamily="18" charset="0"/>
+                <a:ea typeface="標楷體" panose="03000509000000000000" pitchFamily="65" charset="-120"/>
+                <a:cs typeface="Times New Roman" panose="02020603050405020304" pitchFamily="18" charset="0"/>
+              </a:endParaRPr>
+            </a:p>
+          </p:txBody>
+        </p:sp>
+        <p:cxnSp>
+          <p:nvCxnSpPr>
+            <p:cNvPr id="47" name="直線接點 46"/>
+            <p:cNvCxnSpPr/>
+            <p:nvPr/>
+          </p:nvCxnSpPr>
+          <p:spPr>
+            <a:xfrm>
+              <a:off x="3635896" y="2420888"/>
+              <a:ext cx="5328592" cy="0"/>
+            </a:xfrm>
+            <a:prstGeom prst="line">
+              <a:avLst/>
+            </a:prstGeom>
+            <a:ln>
+              <a:prstDash val="dash"/>
+            </a:ln>
+          </p:spPr>
+          <p:style>
+            <a:lnRef idx="1">
+              <a:schemeClr val="accent2"/>
+            </a:lnRef>
+            <a:fillRef idx="0">
+              <a:schemeClr val="accent2"/>
+            </a:fillRef>
+            <a:effectRef idx="0">
+              <a:schemeClr val="accent2"/>
+            </a:effectRef>
+            <a:fontRef idx="minor">
+              <a:schemeClr val="tx1"/>
+            </a:fontRef>
+          </p:style>
+        </p:cxnSp>
+        <p:sp>
+          <p:nvSpPr>
+            <p:cNvPr id="51" name="文字方塊 50"/>
+            <p:cNvSpPr txBox="1"/>
+            <p:nvPr/>
+          </p:nvSpPr>
+          <p:spPr>
+            <a:xfrm>
+              <a:off x="6156176" y="2420888"/>
+              <a:ext cx="2448272" cy="307777"/>
+            </a:xfrm>
+            <a:prstGeom prst="rect">
+              <a:avLst/>
+            </a:prstGeom>
+            <a:noFill/>
+          </p:spPr>
+          <p:txBody>
+            <a:bodyPr wrap="square" rtlCol="0">
+              <a:spAutoFit/>
+            </a:bodyPr>
+            <a:lstStyle/>
+            <a:p>
+              <a:r>
+                <a:rPr lang="en-US" altLang="zh-TW" sz="1400" dirty="0" smtClean="0">
+                  <a:solidFill>
+                    <a:srgbClr val="FF0000"/>
+                  </a:solidFill>
+                  <a:latin typeface="Times New Roman" panose="02020603050405020304" pitchFamily="18" charset="0"/>
+                  <a:ea typeface="標楷體" panose="03000509000000000000" pitchFamily="65" charset="-120"/>
+                  <a:cs typeface="Times New Roman" panose="02020603050405020304" pitchFamily="18" charset="0"/>
+                </a:rPr>
+                <a:t>ID1  ID2  ID3  …..</a:t>
+              </a:r>
+            </a:p>
+          </p:txBody>
+        </p:sp>
+        <p:sp>
+          <p:nvSpPr>
+            <p:cNvPr id="52" name="文字方塊 51"/>
+            <p:cNvSpPr txBox="1"/>
+            <p:nvPr/>
+          </p:nvSpPr>
+          <p:spPr>
+            <a:xfrm>
+              <a:off x="5724128" y="2708920"/>
+              <a:ext cx="576064" cy="954107"/>
+            </a:xfrm>
+            <a:prstGeom prst="rect">
+              <a:avLst/>
+            </a:prstGeom>
+            <a:noFill/>
+          </p:spPr>
+          <p:txBody>
+            <a:bodyPr wrap="square" rtlCol="0">
+              <a:spAutoFit/>
+            </a:bodyPr>
+            <a:lstStyle/>
+            <a:p>
+              <a:r>
+                <a:rPr lang="en-US" altLang="zh-TW" sz="1400" dirty="0" smtClean="0">
+                  <a:solidFill>
+                    <a:srgbClr val="FF0000"/>
+                  </a:solidFill>
+                  <a:latin typeface="Times New Roman" panose="02020603050405020304" pitchFamily="18" charset="0"/>
+                  <a:ea typeface="標楷體" panose="03000509000000000000" pitchFamily="65" charset="-120"/>
+                  <a:cs typeface="Times New Roman" panose="02020603050405020304" pitchFamily="18" charset="0"/>
+                </a:rPr>
+                <a:t>ID1</a:t>
+              </a:r>
+            </a:p>
+            <a:p>
+              <a:r>
+                <a:rPr lang="en-US" altLang="zh-TW" sz="1400" dirty="0" smtClean="0">
+                  <a:solidFill>
+                    <a:srgbClr val="FF0000"/>
+                  </a:solidFill>
+                  <a:latin typeface="Times New Roman" panose="02020603050405020304" pitchFamily="18" charset="0"/>
+                  <a:ea typeface="標楷體" panose="03000509000000000000" pitchFamily="65" charset="-120"/>
+                  <a:cs typeface="Times New Roman" panose="02020603050405020304" pitchFamily="18" charset="0"/>
+                </a:rPr>
+                <a:t>ID2</a:t>
+              </a:r>
+            </a:p>
+            <a:p>
+              <a:r>
+                <a:rPr lang="en-US" altLang="zh-TW" sz="1400" dirty="0" smtClean="0">
+                  <a:solidFill>
+                    <a:srgbClr val="FF0000"/>
+                  </a:solidFill>
+                  <a:latin typeface="Times New Roman" panose="02020603050405020304" pitchFamily="18" charset="0"/>
+                  <a:ea typeface="標楷體" panose="03000509000000000000" pitchFamily="65" charset="-120"/>
+                  <a:cs typeface="Times New Roman" panose="02020603050405020304" pitchFamily="18" charset="0"/>
+                </a:rPr>
+                <a:t>ID3</a:t>
+              </a:r>
+            </a:p>
+            <a:p>
+              <a:r>
+                <a:rPr lang="en-US" altLang="zh-TW" sz="1400" dirty="0" smtClean="0">
+                  <a:solidFill>
+                    <a:srgbClr val="FF0000"/>
+                  </a:solidFill>
+                  <a:latin typeface="Times New Roman" panose="02020603050405020304" pitchFamily="18" charset="0"/>
+                  <a:ea typeface="標楷體" panose="03000509000000000000" pitchFamily="65" charset="-120"/>
+                  <a:cs typeface="Times New Roman" panose="02020603050405020304" pitchFamily="18" charset="0"/>
+                </a:rPr>
+                <a:t>…</a:t>
+              </a:r>
+            </a:p>
+          </p:txBody>
+        </p:sp>
+        <p:pic>
+          <p:nvPicPr>
+            <p:cNvPr id="1026" name="Picture 2"/>
+            <p:cNvPicPr>
+              <a:picLocks noChangeAspect="1" noChangeArrowheads="1"/>
+            </p:cNvPicPr>
+            <p:nvPr/>
+          </p:nvPicPr>
+          <p:blipFill>
+            <a:blip r:embed="rId3">
+              <a:extLst>
+                <a:ext uri="{28A0092B-C50C-407E-A947-70E740481C1C}">
+                  <a14:useLocalDpi xmlns:a14="http://schemas.microsoft.com/office/drawing/2010/main" val="0"/>
+                </a:ext>
+              </a:extLst>
+            </a:blip>
+            <a:srcRect/>
+            <a:stretch>
+              <a:fillRect/>
+            </a:stretch>
+          </p:blipFill>
+          <p:spPr bwMode="auto">
+            <a:xfrm>
+              <a:off x="6178252" y="2681952"/>
+              <a:ext cx="1276350" cy="981075"/>
+            </a:xfrm>
+            <a:prstGeom prst="rect">
+              <a:avLst/>
+            </a:prstGeom>
+            <a:noFill/>
+            <a:ln>
+              <a:noFill/>
+            </a:ln>
+            <a:extLst>
+              <a:ext uri="{909E8E84-426E-40DD-AFC4-6F175D3DCCD1}">
+                <a14:hiddenFill xmlns:a14="http://schemas.microsoft.com/office/drawing/2010/main">
+                  <a:solidFill>
+                    <a:schemeClr val="accent1"/>
+                  </a:solidFill>
+                </a14:hiddenFill>
+              </a:ext>
+              <a:ext uri="{91240B29-F687-4F45-9708-019B960494DF}">
+                <a14:hiddenLine xmlns:a14="http://schemas.microsoft.com/office/drawing/2010/main" w="9525">
+                  <a:solidFill>
+                    <a:schemeClr val="tx1"/>
+                  </a:solidFill>
+                  <a:miter lim="800000"/>
+                  <a:headEnd/>
+                  <a:tailEnd/>
+                </a14:hiddenLine>
+              </a:ext>
+            </a:extLst>
+          </p:spPr>
+        </p:pic>
+      </p:grpSp>
+      <p:grpSp>
+        <p:nvGrpSpPr>
+          <p:cNvPr id="11" name="群組 10"/>
+          <p:cNvGrpSpPr/>
+          <p:nvPr/>
+        </p:nvGrpSpPr>
+        <p:grpSpPr>
+          <a:xfrm>
+            <a:off x="3635896" y="1124744"/>
+            <a:ext cx="5366742" cy="1080120"/>
+            <a:chOff x="3635896" y="1124744"/>
+            <a:chExt cx="5366742" cy="1080120"/>
+          </a:xfrm>
+        </p:grpSpPr>
+        <p:sp>
+          <p:nvSpPr>
+            <p:cNvPr id="36" name="文字方塊 35"/>
+            <p:cNvSpPr txBox="1"/>
+            <p:nvPr/>
+          </p:nvSpPr>
+          <p:spPr>
+            <a:xfrm>
+              <a:off x="3635896" y="1475492"/>
+              <a:ext cx="1656184" cy="584775"/>
+            </a:xfrm>
+            <a:prstGeom prst="rect">
+              <a:avLst/>
+            </a:prstGeom>
+            <a:noFill/>
+          </p:spPr>
+          <p:txBody>
+            <a:bodyPr wrap="square" rtlCol="0">
+              <a:spAutoFit/>
+            </a:bodyPr>
+            <a:lstStyle/>
+            <a:p>
+              <a:r>
+                <a:rPr lang="en-US" altLang="zh-TW" sz="1600" dirty="0" smtClean="0">
+                  <a:latin typeface="Times New Roman" panose="02020603050405020304" pitchFamily="18" charset="0"/>
+                  <a:ea typeface="標楷體" panose="03000509000000000000" pitchFamily="65" charset="-120"/>
+                  <a:cs typeface="Times New Roman" panose="02020603050405020304" pitchFamily="18" charset="0"/>
+                </a:rPr>
+                <a:t>*</a:t>
+              </a:r>
+              <a:r>
+                <a:rPr lang="zh-TW" altLang="en-US" sz="1600" dirty="0" smtClean="0">
+                  <a:latin typeface="Times New Roman" panose="02020603050405020304" pitchFamily="18" charset="0"/>
+                  <a:ea typeface="標楷體" panose="03000509000000000000" pitchFamily="65" charset="-120"/>
+                  <a:cs typeface="Times New Roman" panose="02020603050405020304" pitchFamily="18" charset="0"/>
+                </a:rPr>
+                <a:t>原本存</a:t>
+              </a:r>
+              <a:r>
+                <a:rPr lang="en-US" altLang="zh-TW" sz="1600" dirty="0" smtClean="0">
+                  <a:latin typeface="Times New Roman" panose="02020603050405020304" pitchFamily="18" charset="0"/>
+                  <a:ea typeface="標楷體" panose="03000509000000000000" pitchFamily="65" charset="-120"/>
+                  <a:cs typeface="Times New Roman" panose="02020603050405020304" pitchFamily="18" charset="0"/>
+                </a:rPr>
+                <a:t>Excel</a:t>
+              </a:r>
+            </a:p>
+            <a:p>
+              <a:r>
+                <a:rPr lang="en-US" altLang="zh-TW" sz="1600" dirty="0" smtClean="0">
+                  <a:latin typeface="Times New Roman" panose="02020603050405020304" pitchFamily="18" charset="0"/>
+                  <a:ea typeface="標楷體" panose="03000509000000000000" pitchFamily="65" charset="-120"/>
+                  <a:cs typeface="Times New Roman" panose="02020603050405020304" pitchFamily="18" charset="0"/>
+                </a:rPr>
+                <a:t>=&gt; </a:t>
+              </a:r>
+              <a:r>
+                <a:rPr lang="zh-TW" altLang="en-US" sz="1600" dirty="0" smtClean="0">
+                  <a:latin typeface="Times New Roman" panose="02020603050405020304" pitchFamily="18" charset="0"/>
+                  <a:ea typeface="標楷體" panose="03000509000000000000" pitchFamily="65" charset="-120"/>
+                  <a:cs typeface="Times New Roman" panose="02020603050405020304" pitchFamily="18" charset="0"/>
+                </a:rPr>
+                <a:t>存成</a:t>
+              </a:r>
+              <a:r>
+                <a:rPr lang="en-US" altLang="zh-TW" sz="1600" dirty="0" smtClean="0">
+                  <a:latin typeface="Times New Roman" panose="02020603050405020304" pitchFamily="18" charset="0"/>
+                  <a:ea typeface="標楷體" panose="03000509000000000000" pitchFamily="65" charset="-120"/>
+                  <a:cs typeface="Times New Roman" panose="02020603050405020304" pitchFamily="18" charset="0"/>
+                </a:rPr>
+                <a:t>Database</a:t>
+              </a:r>
+            </a:p>
+          </p:txBody>
+        </p:sp>
+        <p:sp>
+          <p:nvSpPr>
+            <p:cNvPr id="42" name="文字方塊 41"/>
+            <p:cNvSpPr txBox="1"/>
+            <p:nvPr/>
+          </p:nvSpPr>
+          <p:spPr>
+            <a:xfrm>
+              <a:off x="5364088" y="1124744"/>
+              <a:ext cx="2448272" cy="400110"/>
+            </a:xfrm>
+            <a:prstGeom prst="rect">
+              <a:avLst/>
+            </a:prstGeom>
+            <a:noFill/>
+          </p:spPr>
+          <p:txBody>
+            <a:bodyPr wrap="square" rtlCol="0">
+              <a:spAutoFit/>
+            </a:bodyPr>
+            <a:lstStyle/>
+            <a:p>
+              <a:r>
+                <a:rPr lang="en-US" altLang="zh-TW" sz="2000" dirty="0" smtClean="0">
+                  <a:solidFill>
+                    <a:srgbClr val="FF0000"/>
+                  </a:solidFill>
+                  <a:latin typeface="Times New Roman" panose="02020603050405020304" pitchFamily="18" charset="0"/>
+                  <a:ea typeface="標楷體" panose="03000509000000000000" pitchFamily="65" charset="-120"/>
+                  <a:cs typeface="Times New Roman" panose="02020603050405020304" pitchFamily="18" charset="0"/>
+                </a:rPr>
+                <a:t>Data Format Example</a:t>
+              </a:r>
+            </a:p>
+          </p:txBody>
+        </p:sp>
+        <p:sp>
+          <p:nvSpPr>
+            <p:cNvPr id="45" name="文字方塊 44"/>
+            <p:cNvSpPr txBox="1"/>
+            <p:nvPr/>
+          </p:nvSpPr>
+          <p:spPr>
+            <a:xfrm>
+              <a:off x="5364088" y="1866310"/>
+              <a:ext cx="2448272" cy="338554"/>
+            </a:xfrm>
+            <a:prstGeom prst="rect">
+              <a:avLst/>
+            </a:prstGeom>
+            <a:noFill/>
+          </p:spPr>
+          <p:txBody>
+            <a:bodyPr wrap="square" rtlCol="0">
+              <a:spAutoFit/>
+            </a:bodyPr>
+            <a:lstStyle/>
+            <a:p>
+              <a:r>
+                <a:rPr lang="en-US" altLang="zh-TW" sz="1600" dirty="0" smtClean="0">
+                  <a:solidFill>
+                    <a:srgbClr val="FF0000"/>
+                  </a:solidFill>
+                  <a:latin typeface="Times New Roman" panose="02020603050405020304" pitchFamily="18" charset="0"/>
+                  <a:ea typeface="標楷體" panose="03000509000000000000" pitchFamily="65" charset="-120"/>
+                  <a:cs typeface="Times New Roman" panose="02020603050405020304" pitchFamily="18" charset="0"/>
+                </a:rPr>
+                <a:t>* depend on DB</a:t>
+              </a:r>
+            </a:p>
+          </p:txBody>
+        </p:sp>
+        <p:pic>
+          <p:nvPicPr>
+            <p:cNvPr id="1027" name="Picture 3"/>
+            <p:cNvPicPr>
+              <a:picLocks noChangeAspect="1" noChangeArrowheads="1"/>
+            </p:cNvPicPr>
+            <p:nvPr/>
+          </p:nvPicPr>
+          <p:blipFill>
+            <a:blip r:embed="rId4">
+              <a:extLst>
+                <a:ext uri="{28A0092B-C50C-407E-A947-70E740481C1C}">
+                  <a14:useLocalDpi xmlns:a14="http://schemas.microsoft.com/office/drawing/2010/main" val="0"/>
+                </a:ext>
+              </a:extLst>
+            </a:blip>
+            <a:srcRect/>
+            <a:stretch>
+              <a:fillRect/>
+            </a:stretch>
+          </p:blipFill>
+          <p:spPr bwMode="auto">
+            <a:xfrm>
+              <a:off x="5364088" y="1513885"/>
+              <a:ext cx="3638550" cy="352425"/>
+            </a:xfrm>
+            <a:prstGeom prst="rect">
+              <a:avLst/>
+            </a:prstGeom>
+            <a:noFill/>
+            <a:ln>
+              <a:noFill/>
+            </a:ln>
+            <a:extLst>
+              <a:ext uri="{909E8E84-426E-40DD-AFC4-6F175D3DCCD1}">
+                <a14:hiddenFill xmlns:a14="http://schemas.microsoft.com/office/drawing/2010/main">
+                  <a:solidFill>
+                    <a:schemeClr val="accent1"/>
+                  </a:solidFill>
+                </a14:hiddenFill>
+              </a:ext>
+              <a:ext uri="{91240B29-F687-4F45-9708-019B960494DF}">
+                <a14:hiddenLine xmlns:a14="http://schemas.microsoft.com/office/drawing/2010/main" w="9525">
+                  <a:solidFill>
+                    <a:schemeClr val="tx1"/>
+                  </a:solidFill>
+                  <a:miter lim="800000"/>
+                  <a:headEnd/>
+                  <a:tailEnd/>
+                </a14:hiddenLine>
+              </a:ext>
+            </a:extLst>
+          </p:spPr>
+        </p:pic>
+      </p:grpSp>
     </p:spTree>
+    <p:extLst>
+      <p:ext uri="{BB962C8B-B14F-4D97-AF65-F5344CB8AC3E}">
+        <p14:creationId xmlns:p14="http://schemas.microsoft.com/office/powerpoint/2010/main" val="2082421870"/>
+      </p:ext>
+    </p:extLst>
   </p:cSld>
   <p:clrMapOvr>
     <a:masterClrMapping/>
@@ -7058,9 +6528,354 @@
   <p:timing>
     <p:tnLst>
       <p:par>
-        <p:cTn id="1" dur="indefinite" restart="never" nodeType="tmRoot"/>
+        <p:cTn id="1" dur="indefinite" restart="never" nodeType="tmRoot">
+          <p:childTnLst>
+            <p:seq concurrent="1" nextAc="seek">
+              <p:cTn id="2" dur="indefinite" nodeType="mainSeq">
+                <p:childTnLst>
+                  <p:par>
+                    <p:cTn id="3" fill="hold">
+                      <p:stCondLst>
+                        <p:cond delay="indefinite"/>
+                      </p:stCondLst>
+                      <p:childTnLst>
+                        <p:par>
+                          <p:cTn id="4" fill="hold">
+                            <p:stCondLst>
+                              <p:cond delay="0"/>
+                            </p:stCondLst>
+                            <p:childTnLst>
+                              <p:par>
+                                <p:cTn id="5" presetID="10" presetClass="entr" presetSubtype="0" fill="hold" grpId="0" nodeType="clickEffect">
+                                  <p:stCondLst>
+                                    <p:cond delay="0"/>
+                                  </p:stCondLst>
+                                  <p:childTnLst>
+                                    <p:set>
+                                      <p:cBhvr>
+                                        <p:cTn id="6" dur="1" fill="hold">
+                                          <p:stCondLst>
+                                            <p:cond delay="0"/>
+                                          </p:stCondLst>
+                                        </p:cTn>
+                                        <p:tgtEl>
+                                          <p:spTgt spid="34"/>
+                                        </p:tgtEl>
+                                        <p:attrNameLst>
+                                          <p:attrName>style.visibility</p:attrName>
+                                        </p:attrNameLst>
+                                      </p:cBhvr>
+                                      <p:to>
+                                        <p:strVal val="visible"/>
+                                      </p:to>
+                                    </p:set>
+                                    <p:animEffect transition="in" filter="fade">
+                                      <p:cBhvr>
+                                        <p:cTn id="7" dur="500"/>
+                                        <p:tgtEl>
+                                          <p:spTgt spid="34"/>
+                                        </p:tgtEl>
+                                      </p:cBhvr>
+                                    </p:animEffect>
+                                  </p:childTnLst>
+                                </p:cTn>
+                              </p:par>
+                            </p:childTnLst>
+                          </p:cTn>
+                        </p:par>
+                      </p:childTnLst>
+                    </p:cTn>
+                  </p:par>
+                  <p:par>
+                    <p:cTn id="8" fill="hold">
+                      <p:stCondLst>
+                        <p:cond delay="indefinite"/>
+                      </p:stCondLst>
+                      <p:childTnLst>
+                        <p:par>
+                          <p:cTn id="9" fill="hold">
+                            <p:stCondLst>
+                              <p:cond delay="0"/>
+                            </p:stCondLst>
+                            <p:childTnLst>
+                              <p:par>
+                                <p:cTn id="10" presetID="10" presetClass="entr" presetSubtype="0" fill="hold" grpId="0" nodeType="clickEffect">
+                                  <p:stCondLst>
+                                    <p:cond delay="0"/>
+                                  </p:stCondLst>
+                                  <p:childTnLst>
+                                    <p:set>
+                                      <p:cBhvr>
+                                        <p:cTn id="11" dur="1" fill="hold">
+                                          <p:stCondLst>
+                                            <p:cond delay="0"/>
+                                          </p:stCondLst>
+                                        </p:cTn>
+                                        <p:tgtEl>
+                                          <p:spTgt spid="41"/>
+                                        </p:tgtEl>
+                                        <p:attrNameLst>
+                                          <p:attrName>style.visibility</p:attrName>
+                                        </p:attrNameLst>
+                                      </p:cBhvr>
+                                      <p:to>
+                                        <p:strVal val="visible"/>
+                                      </p:to>
+                                    </p:set>
+                                    <p:animEffect transition="in" filter="fade">
+                                      <p:cBhvr>
+                                        <p:cTn id="12" dur="500"/>
+                                        <p:tgtEl>
+                                          <p:spTgt spid="41"/>
+                                        </p:tgtEl>
+                                      </p:cBhvr>
+                                    </p:animEffect>
+                                  </p:childTnLst>
+                                </p:cTn>
+                              </p:par>
+                            </p:childTnLst>
+                          </p:cTn>
+                        </p:par>
+                      </p:childTnLst>
+                    </p:cTn>
+                  </p:par>
+                  <p:par>
+                    <p:cTn id="13" fill="hold">
+                      <p:stCondLst>
+                        <p:cond delay="indefinite"/>
+                      </p:stCondLst>
+                      <p:childTnLst>
+                        <p:par>
+                          <p:cTn id="14" fill="hold">
+                            <p:stCondLst>
+                              <p:cond delay="0"/>
+                            </p:stCondLst>
+                            <p:childTnLst>
+                              <p:par>
+                                <p:cTn id="15" presetID="10" presetClass="entr" presetSubtype="0" fill="hold" nodeType="clickEffect">
+                                  <p:stCondLst>
+                                    <p:cond delay="0"/>
+                                  </p:stCondLst>
+                                  <p:childTnLst>
+                                    <p:set>
+                                      <p:cBhvr>
+                                        <p:cTn id="16" dur="1" fill="hold">
+                                          <p:stCondLst>
+                                            <p:cond delay="0"/>
+                                          </p:stCondLst>
+                                        </p:cTn>
+                                        <p:tgtEl>
+                                          <p:spTgt spid="11"/>
+                                        </p:tgtEl>
+                                        <p:attrNameLst>
+                                          <p:attrName>style.visibility</p:attrName>
+                                        </p:attrNameLst>
+                                      </p:cBhvr>
+                                      <p:to>
+                                        <p:strVal val="visible"/>
+                                      </p:to>
+                                    </p:set>
+                                    <p:animEffect transition="in" filter="fade">
+                                      <p:cBhvr>
+                                        <p:cTn id="17" dur="500"/>
+                                        <p:tgtEl>
+                                          <p:spTgt spid="11"/>
+                                        </p:tgtEl>
+                                      </p:cBhvr>
+                                    </p:animEffect>
+                                  </p:childTnLst>
+                                </p:cTn>
+                              </p:par>
+                            </p:childTnLst>
+                          </p:cTn>
+                        </p:par>
+                      </p:childTnLst>
+                    </p:cTn>
+                  </p:par>
+                  <p:par>
+                    <p:cTn id="18" fill="hold">
+                      <p:stCondLst>
+                        <p:cond delay="indefinite"/>
+                      </p:stCondLst>
+                      <p:childTnLst>
+                        <p:par>
+                          <p:cTn id="19" fill="hold">
+                            <p:stCondLst>
+                              <p:cond delay="0"/>
+                            </p:stCondLst>
+                            <p:childTnLst>
+                              <p:par>
+                                <p:cTn id="20" presetID="10" presetClass="entr" presetSubtype="0" fill="hold" nodeType="clickEffect">
+                                  <p:stCondLst>
+                                    <p:cond delay="0"/>
+                                  </p:stCondLst>
+                                  <p:childTnLst>
+                                    <p:set>
+                                      <p:cBhvr>
+                                        <p:cTn id="21" dur="1" fill="hold">
+                                          <p:stCondLst>
+                                            <p:cond delay="0"/>
+                                          </p:stCondLst>
+                                        </p:cTn>
+                                        <p:tgtEl>
+                                          <p:spTgt spid="10"/>
+                                        </p:tgtEl>
+                                        <p:attrNameLst>
+                                          <p:attrName>style.visibility</p:attrName>
+                                        </p:attrNameLst>
+                                      </p:cBhvr>
+                                      <p:to>
+                                        <p:strVal val="visible"/>
+                                      </p:to>
+                                    </p:set>
+                                    <p:animEffect transition="in" filter="fade">
+                                      <p:cBhvr>
+                                        <p:cTn id="22" dur="500"/>
+                                        <p:tgtEl>
+                                          <p:spTgt spid="10"/>
+                                        </p:tgtEl>
+                                      </p:cBhvr>
+                                    </p:animEffect>
+                                  </p:childTnLst>
+                                </p:cTn>
+                              </p:par>
+                            </p:childTnLst>
+                          </p:cTn>
+                        </p:par>
+                      </p:childTnLst>
+                    </p:cTn>
+                  </p:par>
+                  <p:par>
+                    <p:cTn id="23" fill="hold">
+                      <p:stCondLst>
+                        <p:cond delay="indefinite"/>
+                      </p:stCondLst>
+                      <p:childTnLst>
+                        <p:par>
+                          <p:cTn id="24" fill="hold">
+                            <p:stCondLst>
+                              <p:cond delay="0"/>
+                            </p:stCondLst>
+                            <p:childTnLst>
+                              <p:par>
+                                <p:cTn id="25" presetID="10" presetClass="entr" presetSubtype="0" fill="hold" nodeType="clickEffect">
+                                  <p:stCondLst>
+                                    <p:cond delay="0"/>
+                                  </p:stCondLst>
+                                  <p:childTnLst>
+                                    <p:set>
+                                      <p:cBhvr>
+                                        <p:cTn id="26" dur="1" fill="hold">
+                                          <p:stCondLst>
+                                            <p:cond delay="0"/>
+                                          </p:stCondLst>
+                                        </p:cTn>
+                                        <p:tgtEl>
+                                          <p:spTgt spid="9"/>
+                                        </p:tgtEl>
+                                        <p:attrNameLst>
+                                          <p:attrName>style.visibility</p:attrName>
+                                        </p:attrNameLst>
+                                      </p:cBhvr>
+                                      <p:to>
+                                        <p:strVal val="visible"/>
+                                      </p:to>
+                                    </p:set>
+                                    <p:animEffect transition="in" filter="fade">
+                                      <p:cBhvr>
+                                        <p:cTn id="27" dur="500"/>
+                                        <p:tgtEl>
+                                          <p:spTgt spid="9"/>
+                                        </p:tgtEl>
+                                      </p:cBhvr>
+                                    </p:animEffect>
+                                  </p:childTnLst>
+                                </p:cTn>
+                              </p:par>
+                            </p:childTnLst>
+                          </p:cTn>
+                        </p:par>
+                      </p:childTnLst>
+                    </p:cTn>
+                  </p:par>
+                  <p:par>
+                    <p:cTn id="28" fill="hold">
+                      <p:stCondLst>
+                        <p:cond delay="indefinite"/>
+                      </p:stCondLst>
+                      <p:childTnLst>
+                        <p:par>
+                          <p:cTn id="29" fill="hold">
+                            <p:stCondLst>
+                              <p:cond delay="0"/>
+                            </p:stCondLst>
+                            <p:childTnLst>
+                              <p:par>
+                                <p:cTn id="30" presetID="10" presetClass="entr" presetSubtype="0" fill="hold" nodeType="clickEffect">
+                                  <p:stCondLst>
+                                    <p:cond delay="0"/>
+                                  </p:stCondLst>
+                                  <p:childTnLst>
+                                    <p:set>
+                                      <p:cBhvr>
+                                        <p:cTn id="31" dur="1" fill="hold">
+                                          <p:stCondLst>
+                                            <p:cond delay="0"/>
+                                          </p:stCondLst>
+                                        </p:cTn>
+                                        <p:tgtEl>
+                                          <p:spTgt spid="8"/>
+                                        </p:tgtEl>
+                                        <p:attrNameLst>
+                                          <p:attrName>style.visibility</p:attrName>
+                                        </p:attrNameLst>
+                                      </p:cBhvr>
+                                      <p:to>
+                                        <p:strVal val="visible"/>
+                                      </p:to>
+                                    </p:set>
+                                    <p:animEffect transition="in" filter="fade">
+                                      <p:cBhvr>
+                                        <p:cTn id="32" dur="500"/>
+                                        <p:tgtEl>
+                                          <p:spTgt spid="8"/>
+                                        </p:tgtEl>
+                                      </p:cBhvr>
+                                    </p:animEffect>
+                                  </p:childTnLst>
+                                </p:cTn>
+                              </p:par>
+                            </p:childTnLst>
+                          </p:cTn>
+                        </p:par>
+                      </p:childTnLst>
+                    </p:cTn>
+                  </p:par>
+                </p:childTnLst>
+              </p:cTn>
+              <p:prevCondLst>
+                <p:cond evt="onPrev" delay="0">
+                  <p:tgtEl>
+                    <p:sldTgt/>
+                  </p:tgtEl>
+                </p:cond>
+              </p:prevCondLst>
+              <p:nextCondLst>
+                <p:cond evt="onNext" delay="0">
+                  <p:tgtEl>
+                    <p:sldTgt/>
+                  </p:tgtEl>
+                </p:cond>
+              </p:nextCondLst>
+            </p:seq>
+          </p:childTnLst>
+        </p:cTn>
       </p:par>
     </p:tnLst>
+    <p:bldLst>
+      <p:bldP spid="34" grpId="0"/>
+      <p:bldP spid="41" grpId="0"/>
+    </p:bldLst>
   </p:timing>
 </p:sld>
 </file>
@@ -7119,11 +6934,11 @@
   <p:clrMapOvr>
     <a:masterClrMapping/>
   </p:clrMapOvr>
-  <mc:AlternateContent xmlns:mc="http://schemas.openxmlformats.org/markup-compatibility/2006">
-    <mc:Choice xmlns:p14="http://schemas.microsoft.com/office/powerpoint/2010/main" Requires="p14">
+  <mc:AlternateContent xmlns:mc="http://schemas.openxmlformats.org/markup-compatibility/2006" xmlns:p14="http://schemas.microsoft.com/office/powerpoint/2010/main">
+    <mc:Choice Requires="p14">
       <p:transition spd="slow" p14:dur="2000"/>
     </mc:Choice>
-    <mc:Fallback>
+    <mc:Fallback xmlns="">
       <p:transition spd="slow"/>
     </mc:Fallback>
   </mc:AlternateContent>
@@ -7256,11 +7071,11 @@
   <p:clrMapOvr>
     <a:masterClrMapping/>
   </p:clrMapOvr>
-  <mc:AlternateContent xmlns:mc="http://schemas.openxmlformats.org/markup-compatibility/2006">
-    <mc:Choice xmlns:p14="http://schemas.microsoft.com/office/powerpoint/2010/main" Requires="p14">
+  <mc:AlternateContent xmlns:mc="http://schemas.openxmlformats.org/markup-compatibility/2006" xmlns:p14="http://schemas.microsoft.com/office/powerpoint/2010/main">
+    <mc:Choice Requires="p14">
       <p:transition spd="slow" p14:dur="2000"/>
     </mc:Choice>
-    <mc:Fallback>
+    <mc:Fallback xmlns="">
       <p:transition spd="slow"/>
     </mc:Fallback>
   </mc:AlternateContent>
@@ -7361,11 +7176,11 @@
   <p:clrMapOvr>
     <a:masterClrMapping/>
   </p:clrMapOvr>
-  <mc:AlternateContent xmlns:mc="http://schemas.openxmlformats.org/markup-compatibility/2006">
-    <mc:Choice xmlns:p14="http://schemas.microsoft.com/office/powerpoint/2010/main" Requires="p14">
+  <mc:AlternateContent xmlns:mc="http://schemas.openxmlformats.org/markup-compatibility/2006" xmlns:p14="http://schemas.microsoft.com/office/powerpoint/2010/main">
+    <mc:Choice Requires="p14">
       <p:transition spd="slow" p14:dur="2000"/>
     </mc:Choice>
-    <mc:Fallback>
+    <mc:Fallback xmlns="">
       <p:transition spd="slow"/>
     </mc:Fallback>
   </mc:AlternateContent>
@@ -7404,13 +7219,13 @@
         </p:nvSpPr>
         <p:spPr>
           <a:xfrm>
-            <a:off x="899592" y="2996952"/>
-            <a:ext cx="1296144" cy="923330"/>
+            <a:off x="1475656" y="2276872"/>
+            <a:ext cx="1296144" cy="1200329"/>
           </a:xfrm>
           <a:prstGeom prst="rect">
             <a:avLst/>
           </a:prstGeom>
-          <a:ln w="3175"/>
+          <a:ln w="28575"/>
         </p:spPr>
         <p:style>
           <a:lnRef idx="2">
@@ -7445,7 +7260,7 @@
                 <a:latin typeface="Times New Roman" panose="02020603050405020304" pitchFamily="18" charset="0"/>
                 <a:cs typeface="Times New Roman" panose="02020603050405020304" pitchFamily="18" charset="0"/>
               </a:rPr>
-              <a:t>Plug in</a:t>
+              <a:t>Data Importer</a:t>
             </a:r>
             <a:endParaRPr lang="en-US" altLang="zh-TW" dirty="0">
               <a:latin typeface="Times New Roman" panose="02020603050405020304" pitchFamily="18" charset="0"/>
@@ -7469,13 +7284,13 @@
         </p:nvSpPr>
         <p:spPr>
           <a:xfrm>
-            <a:off x="3131840" y="2852936"/>
+            <a:off x="3419872" y="2276872"/>
             <a:ext cx="1296144" cy="1200329"/>
           </a:xfrm>
           <a:prstGeom prst="rect">
             <a:avLst/>
           </a:prstGeom>
-          <a:ln w="3175"/>
+          <a:ln w="28575"/>
         </p:spPr>
         <p:style>
           <a:lnRef idx="2">
@@ -7544,13 +7359,13 @@
         </p:nvSpPr>
         <p:spPr>
           <a:xfrm>
-            <a:off x="3131840" y="908720"/>
+            <a:off x="3419872" y="633462"/>
             <a:ext cx="1296144" cy="923330"/>
           </a:xfrm>
           <a:prstGeom prst="rect">
             <a:avLst/>
           </a:prstGeom>
-          <a:ln w="3175"/>
+          <a:ln w="28575"/>
         </p:spPr>
         <p:style>
           <a:lnRef idx="2">
@@ -7609,13 +7424,13 @@
         </p:nvSpPr>
         <p:spPr>
           <a:xfrm>
-            <a:off x="3131840" y="5013176"/>
+            <a:off x="3419872" y="4077072"/>
             <a:ext cx="1296144" cy="923330"/>
           </a:xfrm>
           <a:prstGeom prst="rect">
             <a:avLst/>
           </a:prstGeom>
-          <a:ln w="3175"/>
+          <a:ln w="28575"/>
         </p:spPr>
         <p:style>
           <a:lnRef idx="2">
@@ -7674,13 +7489,13 @@
         </p:nvSpPr>
         <p:spPr>
           <a:xfrm>
-            <a:off x="5364088" y="2852936"/>
+            <a:off x="5364088" y="2276872"/>
             <a:ext cx="1296144" cy="1200329"/>
           </a:xfrm>
           <a:prstGeom prst="rect">
             <a:avLst/>
           </a:prstGeom>
-          <a:ln w="3175"/>
+          <a:ln w="28575"/>
         </p:spPr>
         <p:style>
           <a:lnRef idx="2">
@@ -7751,15 +7566,16 @@
           <p:nvPr/>
         </p:nvCxnSpPr>
         <p:spPr>
-          <a:xfrm flipV="1">
-            <a:off x="2195736" y="3453101"/>
-            <a:ext cx="936104" cy="5516"/>
+          <a:xfrm>
+            <a:off x="2771800" y="2877037"/>
+            <a:ext cx="648072" cy="0"/>
           </a:xfrm>
           <a:prstGeom prst="straightConnector1">
             <a:avLst/>
           </a:prstGeom>
-          <a:ln>
-            <a:tailEnd type="arrow"/>
+          <a:ln w="38100">
+            <a:headEnd type="none" w="med" len="med"/>
+            <a:tailEnd type="triangle" w="med" len="med"/>
           </a:ln>
         </p:spPr>
         <p:style>
@@ -7785,14 +7601,15 @@
         </p:nvCxnSpPr>
         <p:spPr>
           <a:xfrm>
-            <a:off x="4427984" y="3284984"/>
-            <a:ext cx="936104" cy="0"/>
+            <a:off x="4716016" y="2708920"/>
+            <a:ext cx="648072" cy="0"/>
           </a:xfrm>
           <a:prstGeom prst="straightConnector1">
             <a:avLst/>
           </a:prstGeom>
-          <a:ln>
-            <a:tailEnd type="arrow"/>
+          <a:ln w="38100">
+            <a:headEnd type="none" w="med" len="med"/>
+            <a:tailEnd type="triangle" w="med" len="med"/>
           </a:ln>
         </p:spPr>
         <p:style>
@@ -7818,14 +7635,15 @@
         </p:nvCxnSpPr>
         <p:spPr>
           <a:xfrm flipH="1">
-            <a:off x="4427984" y="3645024"/>
-            <a:ext cx="936104" cy="0"/>
+            <a:off x="4716016" y="3068960"/>
+            <a:ext cx="648072" cy="0"/>
           </a:xfrm>
           <a:prstGeom prst="straightConnector1">
             <a:avLst/>
           </a:prstGeom>
-          <a:ln>
-            <a:tailEnd type="arrow"/>
+          <a:ln w="38100">
+            <a:headEnd type="none" w="med" len="med"/>
+            <a:tailEnd type="triangle" w="med" len="med"/>
           </a:ln>
         </p:spPr>
         <p:style>
@@ -7854,14 +7672,15 @@
         </p:nvCxnSpPr>
         <p:spPr>
           <a:xfrm flipV="1">
-            <a:off x="3779912" y="1832050"/>
-            <a:ext cx="0" cy="1020886"/>
+            <a:off x="4067944" y="1556792"/>
+            <a:ext cx="0" cy="720080"/>
           </a:xfrm>
           <a:prstGeom prst="straightConnector1">
             <a:avLst/>
           </a:prstGeom>
-          <a:ln>
-            <a:tailEnd type="arrow"/>
+          <a:ln w="38100">
+            <a:headEnd type="none" w="med" len="med"/>
+            <a:tailEnd type="triangle" w="med" len="med"/>
           </a:ln>
         </p:spPr>
         <p:style>
@@ -7890,14 +7709,15 @@
         </p:nvCxnSpPr>
         <p:spPr>
           <a:xfrm>
-            <a:off x="3779912" y="4053265"/>
-            <a:ext cx="0" cy="959911"/>
+            <a:off x="4067944" y="3477201"/>
+            <a:ext cx="0" cy="599871"/>
           </a:xfrm>
           <a:prstGeom prst="straightConnector1">
             <a:avLst/>
           </a:prstGeom>
-          <a:ln>
-            <a:tailEnd type="arrow"/>
+          <a:ln w="38100">
+            <a:headEnd type="none" w="med" len="med"/>
+            <a:tailEnd type="triangle" w="med" len="med"/>
           </a:ln>
         </p:spPr>
         <p:style>
@@ -7923,14 +7743,15 @@
         </p:nvCxnSpPr>
         <p:spPr>
           <a:xfrm>
-            <a:off x="6660232" y="3284984"/>
+            <a:off x="6660232" y="2708920"/>
             <a:ext cx="504056" cy="0"/>
           </a:xfrm>
           <a:prstGeom prst="straightConnector1">
             <a:avLst/>
           </a:prstGeom>
-          <a:ln>
-            <a:tailEnd type="arrow"/>
+          <a:ln w="38100">
+            <a:headEnd type="none" w="med" len="med"/>
+            <a:tailEnd type="triangle" w="med" len="med"/>
           </a:ln>
         </p:spPr>
         <p:style>
@@ -7956,14 +7777,15 @@
         </p:nvCxnSpPr>
         <p:spPr>
           <a:xfrm flipH="1">
-            <a:off x="6660232" y="3645024"/>
+            <a:off x="6660232" y="3068960"/>
             <a:ext cx="504056" cy="0"/>
           </a:xfrm>
           <a:prstGeom prst="straightConnector1">
             <a:avLst/>
           </a:prstGeom>
-          <a:ln>
-            <a:tailEnd type="arrow"/>
+          <a:ln w="38100">
+            <a:headEnd type="none" w="med" len="med"/>
+            <a:tailEnd type="triangle" w="med" len="med"/>
           </a:ln>
         </p:spPr>
         <p:style>
@@ -7983,40 +7805,244 @@
       </p:cxnSp>
       <p:sp>
         <p:nvSpPr>
-          <p:cNvPr id="34" name="文字方塊 33"/>
-          <p:cNvSpPr txBox="1"/>
+          <p:cNvPr id="2" name="矩形 1"/>
+          <p:cNvSpPr/>
           <p:nvPr/>
         </p:nvSpPr>
         <p:spPr>
           <a:xfrm>
-            <a:off x="7308304" y="3132257"/>
-            <a:ext cx="1233030" cy="584775"/>
+            <a:off x="7164288" y="2276872"/>
+            <a:ext cx="1224136" cy="1200329"/>
           </a:xfrm>
           <a:prstGeom prst="rect">
             <a:avLst/>
           </a:prstGeom>
           <a:noFill/>
+          <a:ln>
+            <a:solidFill>
+              <a:schemeClr val="tx1"/>
+            </a:solidFill>
+          </a:ln>
         </p:spPr>
-        <p:txBody>
-          <a:bodyPr wrap="none" rtlCol="0">
+        <p:style>
+          <a:lnRef idx="2">
+            <a:schemeClr val="accent1">
+              <a:shade val="50000"/>
+            </a:schemeClr>
+          </a:lnRef>
+          <a:fillRef idx="1">
+            <a:schemeClr val="accent1"/>
+          </a:fillRef>
+          <a:effectRef idx="0">
+            <a:schemeClr val="accent1"/>
+          </a:effectRef>
+          <a:fontRef idx="minor">
+            <a:schemeClr val="lt1"/>
+          </a:fontRef>
+        </p:style>
+        <p:txBody>
+          <a:bodyPr rtlCol="0" anchor="ctr"/>
+          <a:lstStyle/>
+          <a:p>
+            <a:pPr algn="ctr"/>
+            <a:r>
+              <a:rPr lang="en-US" altLang="zh-TW" dirty="0" smtClean="0">
+                <a:solidFill>
+                  <a:schemeClr val="tx1"/>
+                </a:solidFill>
+              </a:rPr>
+              <a:t>SNAP</a:t>
+            </a:r>
+            <a:endParaRPr lang="zh-TW" altLang="en-US" dirty="0">
+              <a:solidFill>
+                <a:schemeClr val="tx1"/>
+              </a:solidFill>
+            </a:endParaRPr>
+          </a:p>
+        </p:txBody>
+      </p:sp>
+      <p:sp>
+        <p:nvSpPr>
+          <p:cNvPr id="3" name="矩形 2"/>
+          <p:cNvSpPr/>
+          <p:nvPr/>
+        </p:nvSpPr>
+        <p:spPr>
+          <a:xfrm>
+            <a:off x="1331640" y="404664"/>
+            <a:ext cx="7200800" cy="4752528"/>
+          </a:xfrm>
+          <a:prstGeom prst="rect">
+            <a:avLst/>
+          </a:prstGeom>
+          <a:noFill/>
+          <a:ln>
+            <a:solidFill>
+              <a:schemeClr val="tx1">
+                <a:lumMod val="95000"/>
+                <a:lumOff val="5000"/>
+              </a:schemeClr>
+            </a:solidFill>
+          </a:ln>
+        </p:spPr>
+        <p:style>
+          <a:lnRef idx="2">
+            <a:schemeClr val="accent1">
+              <a:shade val="50000"/>
+            </a:schemeClr>
+          </a:lnRef>
+          <a:fillRef idx="1">
+            <a:schemeClr val="accent1"/>
+          </a:fillRef>
+          <a:effectRef idx="0">
+            <a:schemeClr val="accent1"/>
+          </a:effectRef>
+          <a:fontRef idx="minor">
+            <a:schemeClr val="lt1"/>
+          </a:fontRef>
+        </p:style>
+        <p:txBody>
+          <a:bodyPr rtlCol="0" anchor="ctr"/>
+          <a:lstStyle/>
+          <a:p>
+            <a:pPr algn="ctr"/>
+            <a:endParaRPr lang="zh-TW" altLang="en-US"/>
+          </a:p>
+        </p:txBody>
+      </p:sp>
+      <p:sp>
+        <p:nvSpPr>
+          <p:cNvPr id="25" name="文字方塊 24"/>
+          <p:cNvSpPr txBox="1"/>
+          <p:nvPr/>
+        </p:nvSpPr>
+        <p:spPr>
+          <a:xfrm>
+            <a:off x="1331640" y="5661248"/>
+            <a:ext cx="1080120" cy="923330"/>
+          </a:xfrm>
+          <a:prstGeom prst="rect">
+            <a:avLst/>
+          </a:prstGeom>
+          <a:ln w="28575"/>
+        </p:spPr>
+        <p:style>
+          <a:lnRef idx="2">
+            <a:schemeClr val="dk1"/>
+          </a:lnRef>
+          <a:fillRef idx="1">
+            <a:schemeClr val="lt1"/>
+          </a:fillRef>
+          <a:effectRef idx="0">
+            <a:schemeClr val="dk1"/>
+          </a:effectRef>
+          <a:fontRef idx="minor">
+            <a:schemeClr val="dk1"/>
+          </a:fontRef>
+        </p:style>
+        <p:txBody>
+          <a:bodyPr wrap="square" rtlCol="0">
             <a:spAutoFit/>
           </a:bodyPr>
           <a:lstStyle/>
           <a:p>
-            <a:r>
-              <a:rPr lang="en-US" altLang="zh-TW" sz="3200" dirty="0" smtClean="0">
+            <a:pPr algn="ctr"/>
+            <a:endParaRPr lang="en-US" altLang="zh-TW" dirty="0" smtClean="0">
+              <a:latin typeface="Times New Roman" panose="02020603050405020304" pitchFamily="18" charset="0"/>
+              <a:cs typeface="Times New Roman" panose="02020603050405020304" pitchFamily="18" charset="0"/>
+            </a:endParaRPr>
+          </a:p>
+          <a:p>
+            <a:pPr algn="ctr"/>
+            <a:r>
+              <a:rPr lang="en-US" altLang="zh-TW" dirty="0" smtClean="0">
                 <a:latin typeface="Times New Roman" panose="02020603050405020304" pitchFamily="18" charset="0"/>
                 <a:cs typeface="Times New Roman" panose="02020603050405020304" pitchFamily="18" charset="0"/>
               </a:rPr>
-              <a:t>SNAP</a:t>
-            </a:r>
-            <a:endParaRPr lang="zh-TW" altLang="en-US" sz="3200" dirty="0">
+              <a:t>UI</a:t>
+            </a:r>
+            <a:endParaRPr lang="en-US" altLang="zh-TW" dirty="0">
               <a:latin typeface="Times New Roman" panose="02020603050405020304" pitchFamily="18" charset="0"/>
               <a:cs typeface="Times New Roman" panose="02020603050405020304" pitchFamily="18" charset="0"/>
             </a:endParaRPr>
           </a:p>
-        </p:txBody>
-      </p:sp>
+          <a:p>
+            <a:pPr algn="ctr"/>
+            <a:endParaRPr lang="zh-TW" altLang="en-US" dirty="0">
+              <a:latin typeface="Times New Roman" panose="02020603050405020304" pitchFamily="18" charset="0"/>
+              <a:cs typeface="Times New Roman" panose="02020603050405020304" pitchFamily="18" charset="0"/>
+            </a:endParaRPr>
+          </a:p>
+        </p:txBody>
+      </p:sp>
+      <p:cxnSp>
+        <p:nvCxnSpPr>
+          <p:cNvPr id="27" name="直線單箭頭接點 26"/>
+          <p:cNvCxnSpPr/>
+          <p:nvPr/>
+        </p:nvCxnSpPr>
+        <p:spPr>
+          <a:xfrm flipV="1">
+            <a:off x="1727684" y="5157192"/>
+            <a:ext cx="0" cy="504056"/>
+          </a:xfrm>
+          <a:prstGeom prst="straightConnector1">
+            <a:avLst/>
+          </a:prstGeom>
+          <a:ln w="38100">
+            <a:headEnd type="none" w="med" len="med"/>
+            <a:tailEnd type="triangle" w="med" len="med"/>
+          </a:ln>
+        </p:spPr>
+        <p:style>
+          <a:lnRef idx="1">
+            <a:schemeClr val="dk1"/>
+          </a:lnRef>
+          <a:fillRef idx="0">
+            <a:schemeClr val="dk1"/>
+          </a:fillRef>
+          <a:effectRef idx="0">
+            <a:schemeClr val="dk1"/>
+          </a:effectRef>
+          <a:fontRef idx="minor">
+            <a:schemeClr val="tx1"/>
+          </a:fontRef>
+        </p:style>
+      </p:cxnSp>
+      <p:cxnSp>
+        <p:nvCxnSpPr>
+          <p:cNvPr id="30" name="直線單箭頭接點 29"/>
+          <p:cNvCxnSpPr/>
+          <p:nvPr/>
+        </p:nvCxnSpPr>
+        <p:spPr>
+          <a:xfrm>
+            <a:off x="1979712" y="5157192"/>
+            <a:ext cx="0" cy="504056"/>
+          </a:xfrm>
+          <a:prstGeom prst="straightConnector1">
+            <a:avLst/>
+          </a:prstGeom>
+          <a:ln w="38100">
+            <a:headEnd type="none" w="med" len="med"/>
+            <a:tailEnd type="triangle" w="med" len="med"/>
+          </a:ln>
+        </p:spPr>
+        <p:style>
+          <a:lnRef idx="1">
+            <a:schemeClr val="dk1"/>
+          </a:lnRef>
+          <a:fillRef idx="0">
+            <a:schemeClr val="dk1"/>
+          </a:fillRef>
+          <a:effectRef idx="0">
+            <a:schemeClr val="dk1"/>
+          </a:effectRef>
+          <a:fontRef idx="minor">
+            <a:schemeClr val="tx1"/>
+          </a:fontRef>
+        </p:style>
+      </p:cxnSp>
     </p:spTree>
   </p:cSld>
   <p:clrMapOvr>

</xml_diff>

<commit_message>
modify the architecture and some items which we discussed today
</commit_message>
<xml_diff>
--- a/project/slides/NodeXL_system_architecture.pptx
+++ b/project/slides/NodeXL_system_architecture.pptx
@@ -5,15 +5,16 @@
     <p:sldMasterId id="2147483684" r:id="rId1"/>
   </p:sldMasterIdLst>
   <p:notesMasterIdLst>
-    <p:notesMasterId r:id="rId8"/>
+    <p:notesMasterId r:id="rId9"/>
   </p:notesMasterIdLst>
   <p:sldIdLst>
     <p:sldId id="272" r:id="rId2"/>
-    <p:sldId id="257" r:id="rId3"/>
-    <p:sldId id="279" r:id="rId4"/>
+    <p:sldId id="280" r:id="rId3"/>
+    <p:sldId id="281" r:id="rId4"/>
     <p:sldId id="259" r:id="rId5"/>
     <p:sldId id="273" r:id="rId6"/>
     <p:sldId id="274" r:id="rId7"/>
+    <p:sldId id="282" r:id="rId8"/>
   </p:sldIdLst>
   <p:sldSz cx="9144000" cy="6858000" type="screen4x3"/>
   <p:notesSz cx="6858000" cy="9144000"/>
@@ -197,7 +198,7 @@
           <a:p>
             <a:fld id="{CC729DA5-2D78-4A47-97CC-B030F74B2B94}" type="datetimeFigureOut">
               <a:rPr lang="zh-TW" altLang="en-US" smtClean="0"/>
-              <a:t>2014/4/20</a:t>
+              <a:t>2014/4/21</a:t>
             </a:fld>
             <a:endParaRPr lang="zh-TW" altLang="en-US"/>
           </a:p>
@@ -534,168 +535,6 @@
           <a:p>
             <a:fld id="{C961C07C-67F3-4413-BE6F-D257A48FF8A9}" type="slidenum">
               <a:rPr lang="zh-TW" altLang="en-US" smtClean="0"/>
-              <a:t>2</a:t>
-            </a:fld>
-            <a:endParaRPr lang="zh-TW" altLang="en-US"/>
-          </a:p>
-        </p:txBody>
-      </p:sp>
-    </p:spTree>
-  </p:cSld>
-  <p:clrMapOvr>
-    <a:masterClrMapping/>
-  </p:clrMapOvr>
-</p:notes>
-</file>
-
-<file path=ppt/notesSlides/notesSlide2.xml><?xml version="1.0" encoding="utf-8"?>
-<p:notes xmlns:a="http://schemas.openxmlformats.org/drawingml/2006/main" xmlns:r="http://schemas.openxmlformats.org/officeDocument/2006/relationships" xmlns:p="http://schemas.openxmlformats.org/presentationml/2006/main">
-  <p:cSld>
-    <p:spTree>
-      <p:nvGrpSpPr>
-        <p:cNvPr id="1" name=""/>
-        <p:cNvGrpSpPr/>
-        <p:nvPr/>
-      </p:nvGrpSpPr>
-      <p:grpSpPr>
-        <a:xfrm>
-          <a:off x="0" y="0"/>
-          <a:ext cx="0" cy="0"/>
-          <a:chOff x="0" y="0"/>
-          <a:chExt cx="0" cy="0"/>
-        </a:xfrm>
-      </p:grpSpPr>
-      <p:sp>
-        <p:nvSpPr>
-          <p:cNvPr id="2" name="投影片圖像版面配置區 1"/>
-          <p:cNvSpPr>
-            <a:spLocks noGrp="1" noRot="1" noChangeAspect="1"/>
-          </p:cNvSpPr>
-          <p:nvPr>
-            <p:ph type="sldImg"/>
-          </p:nvPr>
-        </p:nvSpPr>
-        <p:spPr/>
-      </p:sp>
-      <p:sp>
-        <p:nvSpPr>
-          <p:cNvPr id="3" name="備忘稿版面配置區 2"/>
-          <p:cNvSpPr>
-            <a:spLocks noGrp="1"/>
-          </p:cNvSpPr>
-          <p:nvPr>
-            <p:ph type="body" idx="1"/>
-          </p:nvPr>
-        </p:nvSpPr>
-        <p:spPr/>
-        <p:txBody>
-          <a:bodyPr>
-            <a:normAutofit/>
-          </a:bodyPr>
-          <a:lstStyle/>
-          <a:p>
-            <a:endParaRPr lang="zh-TW" altLang="en-US"/>
-          </a:p>
-        </p:txBody>
-      </p:sp>
-      <p:sp>
-        <p:nvSpPr>
-          <p:cNvPr id="4" name="投影片編號版面配置區 3"/>
-          <p:cNvSpPr>
-            <a:spLocks noGrp="1"/>
-          </p:cNvSpPr>
-          <p:nvPr>
-            <p:ph type="sldNum" sz="quarter" idx="10"/>
-          </p:nvPr>
-        </p:nvSpPr>
-        <p:spPr/>
-        <p:txBody>
-          <a:bodyPr/>
-          <a:lstStyle/>
-          <a:p>
-            <a:fld id="{C961C07C-67F3-4413-BE6F-D257A48FF8A9}" type="slidenum">
-              <a:rPr lang="zh-TW" altLang="en-US" smtClean="0"/>
-              <a:t>3</a:t>
-            </a:fld>
-            <a:endParaRPr lang="zh-TW" altLang="en-US"/>
-          </a:p>
-        </p:txBody>
-      </p:sp>
-    </p:spTree>
-  </p:cSld>
-  <p:clrMapOvr>
-    <a:masterClrMapping/>
-  </p:clrMapOvr>
-</p:notes>
-</file>
-
-<file path=ppt/notesSlides/notesSlide3.xml><?xml version="1.0" encoding="utf-8"?>
-<p:notes xmlns:a="http://schemas.openxmlformats.org/drawingml/2006/main" xmlns:r="http://schemas.openxmlformats.org/officeDocument/2006/relationships" xmlns:p="http://schemas.openxmlformats.org/presentationml/2006/main">
-  <p:cSld>
-    <p:spTree>
-      <p:nvGrpSpPr>
-        <p:cNvPr id="1" name=""/>
-        <p:cNvGrpSpPr/>
-        <p:nvPr/>
-      </p:nvGrpSpPr>
-      <p:grpSpPr>
-        <a:xfrm>
-          <a:off x="0" y="0"/>
-          <a:ext cx="0" cy="0"/>
-          <a:chOff x="0" y="0"/>
-          <a:chExt cx="0" cy="0"/>
-        </a:xfrm>
-      </p:grpSpPr>
-      <p:sp>
-        <p:nvSpPr>
-          <p:cNvPr id="2" name="投影片圖像版面配置區 1"/>
-          <p:cNvSpPr>
-            <a:spLocks noGrp="1" noRot="1" noChangeAspect="1"/>
-          </p:cNvSpPr>
-          <p:nvPr>
-            <p:ph type="sldImg"/>
-          </p:nvPr>
-        </p:nvSpPr>
-        <p:spPr/>
-      </p:sp>
-      <p:sp>
-        <p:nvSpPr>
-          <p:cNvPr id="3" name="備忘稿版面配置區 2"/>
-          <p:cNvSpPr>
-            <a:spLocks noGrp="1"/>
-          </p:cNvSpPr>
-          <p:nvPr>
-            <p:ph type="body" idx="1"/>
-          </p:nvPr>
-        </p:nvSpPr>
-        <p:spPr/>
-        <p:txBody>
-          <a:bodyPr>
-            <a:normAutofit/>
-          </a:bodyPr>
-          <a:lstStyle/>
-          <a:p>
-            <a:endParaRPr lang="zh-TW" altLang="en-US"/>
-          </a:p>
-        </p:txBody>
-      </p:sp>
-      <p:sp>
-        <p:nvSpPr>
-          <p:cNvPr id="4" name="投影片編號版面配置區 3"/>
-          <p:cNvSpPr>
-            <a:spLocks noGrp="1"/>
-          </p:cNvSpPr>
-          <p:nvPr>
-            <p:ph type="sldNum" sz="quarter" idx="10"/>
-          </p:nvPr>
-        </p:nvSpPr>
-        <p:spPr/>
-        <p:txBody>
-          <a:bodyPr/>
-          <a:lstStyle/>
-          <a:p>
-            <a:fld id="{C961C07C-67F3-4413-BE6F-D257A48FF8A9}" type="slidenum">
-              <a:rPr lang="zh-TW" altLang="en-US" smtClean="0"/>
               <a:t>4</a:t>
             </a:fld>
             <a:endParaRPr lang="zh-TW" altLang="en-US"/>
@@ -844,7 +683,7 @@
           <a:p>
             <a:fld id="{AA48FDDF-DFFB-4099-A1BD-D3F248BA1021}" type="datetimeFigureOut">
               <a:rPr lang="zh-TW" altLang="en-US" smtClean="0"/>
-              <a:t>2014/4/20</a:t>
+              <a:t>2014/4/21</a:t>
             </a:fld>
             <a:endParaRPr lang="zh-TW" altLang="en-US"/>
           </a:p>
@@ -1157,7 +996,7 @@
           <a:p>
             <a:fld id="{AA48FDDF-DFFB-4099-A1BD-D3F248BA1021}" type="datetimeFigureOut">
               <a:rPr lang="zh-TW" altLang="en-US" smtClean="0"/>
-              <a:t>2014/4/20</a:t>
+              <a:t>2014/4/21</a:t>
             </a:fld>
             <a:endParaRPr lang="zh-TW" altLang="en-US"/>
           </a:p>
@@ -1342,7 +1181,7 @@
           <a:p>
             <a:fld id="{AA48FDDF-DFFB-4099-A1BD-D3F248BA1021}" type="datetimeFigureOut">
               <a:rPr lang="zh-TW" altLang="en-US" smtClean="0"/>
-              <a:t>2014/4/20</a:t>
+              <a:t>2014/4/21</a:t>
             </a:fld>
             <a:endParaRPr lang="zh-TW" altLang="en-US"/>
           </a:p>
@@ -1517,7 +1356,7 @@
           <a:p>
             <a:fld id="{AA48FDDF-DFFB-4099-A1BD-D3F248BA1021}" type="datetimeFigureOut">
               <a:rPr lang="zh-TW" altLang="en-US" smtClean="0"/>
-              <a:t>2014/4/20</a:t>
+              <a:t>2014/4/21</a:t>
             </a:fld>
             <a:endParaRPr lang="zh-TW" altLang="en-US"/>
           </a:p>
@@ -1785,7 +1624,7 @@
           <a:p>
             <a:fld id="{AA48FDDF-DFFB-4099-A1BD-D3F248BA1021}" type="datetimeFigureOut">
               <a:rPr lang="zh-TW" altLang="en-US" smtClean="0"/>
-              <a:t>2014/4/20</a:t>
+              <a:t>2014/4/21</a:t>
             </a:fld>
             <a:endParaRPr lang="zh-TW" altLang="en-US"/>
           </a:p>
@@ -2253,7 +2092,7 @@
           <a:p>
             <a:fld id="{AA48FDDF-DFFB-4099-A1BD-D3F248BA1021}" type="datetimeFigureOut">
               <a:rPr lang="zh-TW" altLang="en-US" smtClean="0"/>
-              <a:t>2014/4/20</a:t>
+              <a:t>2014/4/21</a:t>
             </a:fld>
             <a:endParaRPr lang="zh-TW" altLang="en-US"/>
           </a:p>
@@ -2742,7 +2581,7 @@
           <a:p>
             <a:fld id="{AA48FDDF-DFFB-4099-A1BD-D3F248BA1021}" type="datetimeFigureOut">
               <a:rPr lang="zh-TW" altLang="en-US" smtClean="0"/>
-              <a:t>2014/4/20</a:t>
+              <a:t>2014/4/21</a:t>
             </a:fld>
             <a:endParaRPr lang="zh-TW" altLang="en-US"/>
           </a:p>
@@ -2868,7 +2707,7 @@
           <a:p>
             <a:fld id="{AA48FDDF-DFFB-4099-A1BD-D3F248BA1021}" type="datetimeFigureOut">
               <a:rPr lang="zh-TW" altLang="en-US" smtClean="0"/>
-              <a:t>2014/4/20</a:t>
+              <a:t>2014/4/21</a:t>
             </a:fld>
             <a:endParaRPr lang="zh-TW" altLang="en-US"/>
           </a:p>
@@ -3012,7 +2851,7 @@
           <a:p>
             <a:fld id="{AA48FDDF-DFFB-4099-A1BD-D3F248BA1021}" type="datetimeFigureOut">
               <a:rPr lang="zh-TW" altLang="en-US" smtClean="0"/>
-              <a:t>2014/4/20</a:t>
+              <a:t>2014/4/21</a:t>
             </a:fld>
             <a:endParaRPr lang="zh-TW" altLang="en-US"/>
           </a:p>
@@ -3334,7 +3173,7 @@
           <a:p>
             <a:fld id="{AA48FDDF-DFFB-4099-A1BD-D3F248BA1021}" type="datetimeFigureOut">
               <a:rPr lang="zh-TW" altLang="en-US" smtClean="0"/>
-              <a:t>2014/4/20</a:t>
+              <a:t>2014/4/21</a:t>
             </a:fld>
             <a:endParaRPr lang="zh-TW" altLang="en-US"/>
           </a:p>
@@ -3468,7 +3307,7 @@
           <a:p>
             <a:fld id="{AA48FDDF-DFFB-4099-A1BD-D3F248BA1021}" type="datetimeFigureOut">
               <a:rPr lang="zh-TW" altLang="en-US" smtClean="0"/>
-              <a:t>2014/4/20</a:t>
+              <a:t>2014/4/21</a:t>
             </a:fld>
             <a:endParaRPr lang="zh-TW" altLang="en-US"/>
           </a:p>
@@ -4249,7 +4088,7 @@
           <a:p>
             <a:fld id="{AA48FDDF-DFFB-4099-A1BD-D3F248BA1021}" type="datetimeFigureOut">
               <a:rPr lang="zh-TW" altLang="en-US" smtClean="0"/>
-              <a:t>2014/4/20</a:t>
+              <a:t>2014/4/21</a:t>
             </a:fld>
             <a:endParaRPr lang="zh-TW" altLang="en-US"/>
           </a:p>
@@ -5100,13 +4939,40 @@
       </p:grpSpPr>
       <p:sp>
         <p:nvSpPr>
+          <p:cNvPr id="2" name="標題 1"/>
+          <p:cNvSpPr>
+            <a:spLocks noGrp="1"/>
+          </p:cNvSpPr>
+          <p:nvPr>
+            <p:ph type="title"/>
+          </p:nvPr>
+        </p:nvSpPr>
+        <p:spPr/>
+        <p:txBody>
+          <a:bodyPr/>
+          <a:lstStyle/>
+          <a:p>
+            <a:r>
+              <a:rPr lang="en-US" altLang="zh-TW" dirty="0" smtClean="0"/>
+              <a:t>Architecture of </a:t>
+            </a:r>
+            <a:r>
+              <a:rPr lang="en-US" altLang="zh-TW" dirty="0" err="1" smtClean="0"/>
+              <a:t>NodeXL</a:t>
+            </a:r>
+            <a:endParaRPr lang="zh-TW" altLang="en-US" dirty="0"/>
+          </a:p>
+        </p:txBody>
+      </p:sp>
+      <p:sp>
+        <p:nvSpPr>
           <p:cNvPr id="4" name="文字方塊 3"/>
           <p:cNvSpPr txBox="1"/>
           <p:nvPr/>
         </p:nvSpPr>
         <p:spPr>
           <a:xfrm>
-            <a:off x="1475656" y="2276872"/>
+            <a:off x="1475656" y="1772816"/>
             <a:ext cx="1296144" cy="1200329"/>
           </a:xfrm>
           <a:prstGeom prst="rect">
@@ -5171,7 +5037,7 @@
         </p:nvSpPr>
         <p:spPr>
           <a:xfrm>
-            <a:off x="3419872" y="2276872"/>
+            <a:off x="3419872" y="1772816"/>
             <a:ext cx="1296144" cy="1200329"/>
           </a:xfrm>
           <a:prstGeom prst="rect">
@@ -5246,7 +5112,7 @@
         </p:nvSpPr>
         <p:spPr>
           <a:xfrm>
-            <a:off x="3419872" y="633462"/>
+            <a:off x="3419872" y="3573016"/>
             <a:ext cx="1296144" cy="923330"/>
           </a:xfrm>
           <a:prstGeom prst="rect">
@@ -5287,7 +5153,7 @@
                 <a:latin typeface="Times New Roman" panose="02020603050405020304" pitchFamily="18" charset="0"/>
                 <a:cs typeface="Times New Roman" panose="02020603050405020304" pitchFamily="18" charset="0"/>
               </a:rPr>
-              <a:t>Algorithm</a:t>
+              <a:t>Layout</a:t>
             </a:r>
             <a:endParaRPr lang="en-US" altLang="zh-TW" dirty="0">
               <a:latin typeface="Times New Roman" panose="02020603050405020304" pitchFamily="18" charset="0"/>
@@ -5311,8 +5177,8 @@
         </p:nvSpPr>
         <p:spPr>
           <a:xfrm>
-            <a:off x="3419872" y="4077072"/>
-            <a:ext cx="1296144" cy="923330"/>
+            <a:off x="5364088" y="1772816"/>
+            <a:ext cx="1296144" cy="1138773"/>
           </a:xfrm>
           <a:prstGeom prst="rect">
             <a:avLst/>
@@ -5348,13 +5214,23 @@
           <a:p>
             <a:pPr algn="ctr"/>
             <a:r>
-              <a:rPr lang="en-US" altLang="zh-TW" dirty="0" smtClean="0">
+              <a:rPr lang="en-US" altLang="zh-TW" sz="1600" dirty="0" smtClean="0">
                 <a:latin typeface="Times New Roman" panose="02020603050405020304" pitchFamily="18" charset="0"/>
                 <a:cs typeface="Times New Roman" panose="02020603050405020304" pitchFamily="18" charset="0"/>
               </a:rPr>
-              <a:t>Layout</a:t>
-            </a:r>
-            <a:endParaRPr lang="en-US" altLang="zh-TW" dirty="0">
+              <a:t>Metric</a:t>
+            </a:r>
+          </a:p>
+          <a:p>
+            <a:pPr algn="ctr"/>
+            <a:r>
+              <a:rPr lang="en-US" altLang="zh-TW" sz="1600" dirty="0" smtClean="0">
+                <a:latin typeface="Times New Roman" panose="02020603050405020304" pitchFamily="18" charset="0"/>
+                <a:cs typeface="Times New Roman" panose="02020603050405020304" pitchFamily="18" charset="0"/>
+              </a:rPr>
+              <a:t>Computation</a:t>
+            </a:r>
+            <a:endParaRPr lang="en-US" altLang="zh-TW" sz="1600" dirty="0">
               <a:latin typeface="Times New Roman" panose="02020603050405020304" pitchFamily="18" charset="0"/>
               <a:cs typeface="Times New Roman" panose="02020603050405020304" pitchFamily="18" charset="0"/>
             </a:endParaRPr>
@@ -5368,84 +5244,9 @@
           </a:p>
         </p:txBody>
       </p:sp>
-      <p:sp>
-        <p:nvSpPr>
-          <p:cNvPr id="8" name="文字方塊 7"/>
-          <p:cNvSpPr txBox="1"/>
-          <p:nvPr/>
-        </p:nvSpPr>
-        <p:spPr>
-          <a:xfrm>
-            <a:off x="5364088" y="2276872"/>
-            <a:ext cx="1296144" cy="1200329"/>
-          </a:xfrm>
-          <a:prstGeom prst="rect">
-            <a:avLst/>
-          </a:prstGeom>
-          <a:ln w="28575"/>
-        </p:spPr>
-        <p:style>
-          <a:lnRef idx="2">
-            <a:schemeClr val="dk1"/>
-          </a:lnRef>
-          <a:fillRef idx="1">
-            <a:schemeClr val="lt1"/>
-          </a:fillRef>
-          <a:effectRef idx="0">
-            <a:schemeClr val="dk1"/>
-          </a:effectRef>
-          <a:fontRef idx="minor">
-            <a:schemeClr val="dk1"/>
-          </a:fontRef>
-        </p:style>
-        <p:txBody>
-          <a:bodyPr wrap="square" rtlCol="0">
-            <a:spAutoFit/>
-          </a:bodyPr>
-          <a:lstStyle/>
-          <a:p>
-            <a:pPr algn="ctr"/>
-            <a:endParaRPr lang="en-US" altLang="zh-TW" dirty="0" smtClean="0">
-              <a:latin typeface="Times New Roman" panose="02020603050405020304" pitchFamily="18" charset="0"/>
-              <a:cs typeface="Times New Roman" panose="02020603050405020304" pitchFamily="18" charset="0"/>
-            </a:endParaRPr>
-          </a:p>
-          <a:p>
-            <a:pPr algn="ctr"/>
-            <a:r>
-              <a:rPr lang="en-US" altLang="zh-TW" dirty="0" smtClean="0">
-                <a:latin typeface="Times New Roman" panose="02020603050405020304" pitchFamily="18" charset="0"/>
-                <a:cs typeface="Times New Roman" panose="02020603050405020304" pitchFamily="18" charset="0"/>
-              </a:rPr>
-              <a:t>Graph</a:t>
-            </a:r>
-          </a:p>
-          <a:p>
-            <a:pPr algn="ctr"/>
-            <a:r>
-              <a:rPr lang="en-US" altLang="zh-TW" dirty="0" smtClean="0">
-                <a:latin typeface="Times New Roman" panose="02020603050405020304" pitchFamily="18" charset="0"/>
-                <a:cs typeface="Times New Roman" panose="02020603050405020304" pitchFamily="18" charset="0"/>
-              </a:rPr>
-              <a:t>matrix</a:t>
-            </a:r>
-            <a:endParaRPr lang="en-US" altLang="zh-TW" dirty="0">
-              <a:latin typeface="Times New Roman" panose="02020603050405020304" pitchFamily="18" charset="0"/>
-              <a:cs typeface="Times New Roman" panose="02020603050405020304" pitchFamily="18" charset="0"/>
-            </a:endParaRPr>
-          </a:p>
-          <a:p>
-            <a:pPr algn="ctr"/>
-            <a:endParaRPr lang="zh-TW" altLang="en-US" dirty="0">
-              <a:latin typeface="Times New Roman" panose="02020603050405020304" pitchFamily="18" charset="0"/>
-              <a:cs typeface="Times New Roman" panose="02020603050405020304" pitchFamily="18" charset="0"/>
-            </a:endParaRPr>
-          </a:p>
-        </p:txBody>
-      </p:sp>
       <p:cxnSp>
         <p:nvCxnSpPr>
-          <p:cNvPr id="10" name="直線單箭頭接點 9"/>
+          <p:cNvPr id="8" name="直線單箭頭接點 7"/>
           <p:cNvCxnSpPr>
             <a:stCxn id="4" idx="3"/>
             <a:endCxn id="5" idx="1"/>
@@ -5454,7 +5255,75 @@
         </p:nvCxnSpPr>
         <p:spPr>
           <a:xfrm>
-            <a:off x="2771800" y="2877037"/>
+            <a:off x="2771800" y="2372981"/>
+            <a:ext cx="648072" cy="0"/>
+          </a:xfrm>
+          <a:prstGeom prst="straightConnector1">
+            <a:avLst/>
+          </a:prstGeom>
+          <a:ln w="38100">
+            <a:headEnd type="none" w="med" len="med"/>
+            <a:tailEnd type="triangle" w="med" len="med"/>
+          </a:ln>
+        </p:spPr>
+        <p:style>
+          <a:lnRef idx="1">
+            <a:schemeClr val="dk1"/>
+          </a:lnRef>
+          <a:fillRef idx="0">
+            <a:schemeClr val="dk1"/>
+          </a:fillRef>
+          <a:effectRef idx="0">
+            <a:schemeClr val="dk1"/>
+          </a:effectRef>
+          <a:fontRef idx="minor">
+            <a:schemeClr val="tx1"/>
+          </a:fontRef>
+        </p:style>
+      </p:cxnSp>
+      <p:cxnSp>
+        <p:nvCxnSpPr>
+          <p:cNvPr id="9" name="直線單箭頭接點 8"/>
+          <p:cNvCxnSpPr/>
+          <p:nvPr/>
+        </p:nvCxnSpPr>
+        <p:spPr>
+          <a:xfrm>
+            <a:off x="4716016" y="2204864"/>
+            <a:ext cx="648072" cy="0"/>
+          </a:xfrm>
+          <a:prstGeom prst="straightConnector1">
+            <a:avLst/>
+          </a:prstGeom>
+          <a:ln w="38100">
+            <a:headEnd type="none" w="med" len="med"/>
+            <a:tailEnd type="triangle" w="med" len="med"/>
+          </a:ln>
+        </p:spPr>
+        <p:style>
+          <a:lnRef idx="1">
+            <a:schemeClr val="dk1"/>
+          </a:lnRef>
+          <a:fillRef idx="0">
+            <a:schemeClr val="dk1"/>
+          </a:fillRef>
+          <a:effectRef idx="0">
+            <a:schemeClr val="dk1"/>
+          </a:effectRef>
+          <a:fontRef idx="minor">
+            <a:schemeClr val="tx1"/>
+          </a:fontRef>
+        </p:style>
+      </p:cxnSp>
+      <p:cxnSp>
+        <p:nvCxnSpPr>
+          <p:cNvPr id="10" name="直線單箭頭接點 9"/>
+          <p:cNvCxnSpPr/>
+          <p:nvPr/>
+        </p:nvCxnSpPr>
+        <p:spPr>
+          <a:xfrm flipH="1">
+            <a:off x="4716016" y="2564904"/>
             <a:ext cx="648072" cy="0"/>
           </a:xfrm>
           <a:prstGeom prst="straightConnector1">
@@ -5483,120 +5352,15 @@
       <p:cxnSp>
         <p:nvCxnSpPr>
           <p:cNvPr id="11" name="直線單箭頭接點 10"/>
-          <p:cNvCxnSpPr/>
-          <p:nvPr/>
-        </p:nvCxnSpPr>
-        <p:spPr>
-          <a:xfrm>
-            <a:off x="4716016" y="2708920"/>
-            <a:ext cx="648072" cy="0"/>
-          </a:xfrm>
-          <a:prstGeom prst="straightConnector1">
-            <a:avLst/>
-          </a:prstGeom>
-          <a:ln w="38100">
-            <a:headEnd type="none" w="med" len="med"/>
-            <a:tailEnd type="triangle" w="med" len="med"/>
-          </a:ln>
-        </p:spPr>
-        <p:style>
-          <a:lnRef idx="1">
-            <a:schemeClr val="dk1"/>
-          </a:lnRef>
-          <a:fillRef idx="0">
-            <a:schemeClr val="dk1"/>
-          </a:fillRef>
-          <a:effectRef idx="0">
-            <a:schemeClr val="dk1"/>
-          </a:effectRef>
-          <a:fontRef idx="minor">
-            <a:schemeClr val="tx1"/>
-          </a:fontRef>
-        </p:style>
-      </p:cxnSp>
-      <p:cxnSp>
-        <p:nvCxnSpPr>
-          <p:cNvPr id="17" name="直線單箭頭接點 16"/>
-          <p:cNvCxnSpPr/>
-          <p:nvPr/>
-        </p:nvCxnSpPr>
-        <p:spPr>
-          <a:xfrm flipH="1">
-            <a:off x="4716016" y="3068960"/>
-            <a:ext cx="648072" cy="0"/>
-          </a:xfrm>
-          <a:prstGeom prst="straightConnector1">
-            <a:avLst/>
-          </a:prstGeom>
-          <a:ln w="38100">
-            <a:headEnd type="none" w="med" len="med"/>
-            <a:tailEnd type="triangle" w="med" len="med"/>
-          </a:ln>
-        </p:spPr>
-        <p:style>
-          <a:lnRef idx="1">
-            <a:schemeClr val="dk1"/>
-          </a:lnRef>
-          <a:fillRef idx="0">
-            <a:schemeClr val="dk1"/>
-          </a:fillRef>
-          <a:effectRef idx="0">
-            <a:schemeClr val="dk1"/>
-          </a:effectRef>
-          <a:fontRef idx="minor">
-            <a:schemeClr val="tx1"/>
-          </a:fontRef>
-        </p:style>
-      </p:cxnSp>
-      <p:cxnSp>
-        <p:nvCxnSpPr>
-          <p:cNvPr id="20" name="直線單箭頭接點 19"/>
-          <p:cNvCxnSpPr>
-            <a:stCxn id="5" idx="0"/>
-            <a:endCxn id="6" idx="2"/>
-          </p:cNvCxnSpPr>
-          <p:nvPr/>
-        </p:nvCxnSpPr>
-        <p:spPr>
-          <a:xfrm flipV="1">
-            <a:off x="4067944" y="1556792"/>
-            <a:ext cx="0" cy="720080"/>
-          </a:xfrm>
-          <a:prstGeom prst="straightConnector1">
-            <a:avLst/>
-          </a:prstGeom>
-          <a:ln w="38100">
-            <a:headEnd type="none" w="med" len="med"/>
-            <a:tailEnd type="triangle" w="med" len="med"/>
-          </a:ln>
-        </p:spPr>
-        <p:style>
-          <a:lnRef idx="1">
-            <a:schemeClr val="dk1"/>
-          </a:lnRef>
-          <a:fillRef idx="0">
-            <a:schemeClr val="dk1"/>
-          </a:fillRef>
-          <a:effectRef idx="0">
-            <a:schemeClr val="dk1"/>
-          </a:effectRef>
-          <a:fontRef idx="minor">
-            <a:schemeClr val="tx1"/>
-          </a:fontRef>
-        </p:style>
-      </p:cxnSp>
-      <p:cxnSp>
-        <p:nvCxnSpPr>
-          <p:cNvPr id="23" name="直線單箭頭接點 22"/>
           <p:cNvCxnSpPr>
             <a:stCxn id="5" idx="2"/>
-            <a:endCxn id="7" idx="0"/>
+            <a:endCxn id="6" idx="0"/>
           </p:cNvCxnSpPr>
           <p:nvPr/>
         </p:nvCxnSpPr>
         <p:spPr>
           <a:xfrm>
-            <a:off x="4067944" y="3477201"/>
+            <a:off x="4067944" y="2973145"/>
             <a:ext cx="0" cy="599871"/>
           </a:xfrm>
           <a:prstGeom prst="straightConnector1">
@@ -5624,13 +5388,13 @@
       </p:cxnSp>
       <p:cxnSp>
         <p:nvCxnSpPr>
-          <p:cNvPr id="26" name="直線單箭頭接點 25"/>
+          <p:cNvPr id="12" name="直線單箭頭接點 11"/>
           <p:cNvCxnSpPr/>
           <p:nvPr/>
         </p:nvCxnSpPr>
         <p:spPr>
           <a:xfrm>
-            <a:off x="6660232" y="2708920"/>
+            <a:off x="6660232" y="2204864"/>
             <a:ext cx="504056" cy="0"/>
           </a:xfrm>
           <a:prstGeom prst="straightConnector1">
@@ -5658,13 +5422,13 @@
       </p:cxnSp>
       <p:cxnSp>
         <p:nvCxnSpPr>
-          <p:cNvPr id="29" name="直線單箭頭接點 28"/>
+          <p:cNvPr id="13" name="直線單箭頭接點 12"/>
           <p:cNvCxnSpPr/>
           <p:nvPr/>
         </p:nvCxnSpPr>
         <p:spPr>
           <a:xfrm flipH="1">
-            <a:off x="6660232" y="3068960"/>
+            <a:off x="6660232" y="2564904"/>
             <a:ext cx="504056" cy="0"/>
           </a:xfrm>
           <a:prstGeom prst="straightConnector1">
@@ -5692,13 +5456,13 @@
       </p:cxnSp>
       <p:sp>
         <p:nvSpPr>
-          <p:cNvPr id="2" name="矩形 1"/>
+          <p:cNvPr id="14" name="矩形 13"/>
           <p:cNvSpPr/>
           <p:nvPr/>
         </p:nvSpPr>
         <p:spPr>
           <a:xfrm>
-            <a:off x="7164288" y="2276872"/>
+            <a:off x="7164288" y="1772816"/>
             <a:ext cx="1224136" cy="1200329"/>
           </a:xfrm>
           <a:prstGeom prst="rect">
@@ -5750,14 +5514,14 @@
       </p:sp>
       <p:sp>
         <p:nvSpPr>
-          <p:cNvPr id="3" name="矩形 2"/>
+          <p:cNvPr id="15" name="矩形 14"/>
           <p:cNvSpPr/>
           <p:nvPr/>
         </p:nvSpPr>
         <p:spPr>
           <a:xfrm>
-            <a:off x="1331640" y="404664"/>
-            <a:ext cx="7200800" cy="4752528"/>
+            <a:off x="1331640" y="1484784"/>
+            <a:ext cx="7200800" cy="3168352"/>
           </a:xfrm>
           <a:prstGeom prst="rect">
             <a:avLst/>
@@ -5793,19 +5557,19 @@
           <a:lstStyle/>
           <a:p>
             <a:pPr algn="ctr"/>
-            <a:endParaRPr lang="zh-TW" altLang="en-US"/>
-          </a:p>
-        </p:txBody>
-      </p:sp>
-      <p:sp>
-        <p:nvSpPr>
-          <p:cNvPr id="25" name="文字方塊 24"/>
+            <a:endParaRPr lang="zh-TW" altLang="en-US" dirty="0"/>
+          </a:p>
+        </p:txBody>
+      </p:sp>
+      <p:sp>
+        <p:nvSpPr>
+          <p:cNvPr id="16" name="文字方塊 15"/>
           <p:cNvSpPr txBox="1"/>
           <p:nvPr/>
         </p:nvSpPr>
         <p:spPr>
           <a:xfrm>
-            <a:off x="1331640" y="5661248"/>
+            <a:off x="1331640" y="5157192"/>
             <a:ext cx="1080120" cy="923330"/>
           </a:xfrm>
           <a:prstGeom prst="rect">
@@ -5864,13 +5628,13 @@
       </p:sp>
       <p:cxnSp>
         <p:nvCxnSpPr>
-          <p:cNvPr id="27" name="直線單箭頭接點 26"/>
+          <p:cNvPr id="17" name="直線單箭頭接點 16"/>
           <p:cNvCxnSpPr/>
           <p:nvPr/>
         </p:nvCxnSpPr>
         <p:spPr>
           <a:xfrm flipV="1">
-            <a:off x="1727684" y="5157192"/>
+            <a:off x="1727684" y="4653136"/>
             <a:ext cx="0" cy="504056"/>
           </a:xfrm>
           <a:prstGeom prst="straightConnector1">
@@ -5898,13 +5662,13 @@
       </p:cxnSp>
       <p:cxnSp>
         <p:nvCxnSpPr>
-          <p:cNvPr id="30" name="直線單箭頭接點 29"/>
+          <p:cNvPr id="18" name="直線單箭頭接點 17"/>
           <p:cNvCxnSpPr/>
           <p:nvPr/>
         </p:nvCxnSpPr>
         <p:spPr>
           <a:xfrm>
-            <a:off x="1979712" y="5157192"/>
+            <a:off x="1979712" y="4653136"/>
             <a:ext cx="0" cy="504056"/>
           </a:xfrm>
           <a:prstGeom prst="straightConnector1">
@@ -5931,6 +5695,11 @@
         </p:style>
       </p:cxnSp>
     </p:spTree>
+    <p:extLst>
+      <p:ext uri="{BB962C8B-B14F-4D97-AF65-F5344CB8AC3E}">
+        <p14:creationId xmlns:p14="http://schemas.microsoft.com/office/powerpoint/2010/main" val="149517533"/>
+      </p:ext>
+    </p:extLst>
   </p:cSld>
   <p:clrMapOvr>
     <a:masterClrMapping/>
@@ -5964,13 +5733,36 @@
       </p:grpSpPr>
       <p:sp>
         <p:nvSpPr>
-          <p:cNvPr id="2" name="文字方塊 1"/>
+          <p:cNvPr id="2" name="標題 1"/>
+          <p:cNvSpPr>
+            <a:spLocks noGrp="1"/>
+          </p:cNvSpPr>
+          <p:nvPr>
+            <p:ph type="title"/>
+          </p:nvPr>
+        </p:nvSpPr>
+        <p:spPr/>
+        <p:txBody>
+          <a:bodyPr/>
+          <a:lstStyle/>
+          <a:p>
+            <a:r>
+              <a:rPr lang="en-US" altLang="zh-TW" dirty="0" smtClean="0"/>
+              <a:t>Data Flow </a:t>
+            </a:r>
+            <a:endParaRPr lang="zh-TW" altLang="en-US" dirty="0"/>
+          </a:p>
+        </p:txBody>
+      </p:sp>
+      <p:sp>
+        <p:nvSpPr>
+          <p:cNvPr id="4" name="文字方塊 3"/>
           <p:cNvSpPr txBox="1"/>
           <p:nvPr/>
         </p:nvSpPr>
         <p:spPr>
           <a:xfrm>
-            <a:off x="323528" y="1547500"/>
+            <a:off x="323528" y="2123564"/>
             <a:ext cx="1080120" cy="369332"/>
           </a:xfrm>
           <a:prstGeom prst="rect">
@@ -6012,13 +5804,13 @@
       </p:sp>
       <p:sp>
         <p:nvSpPr>
-          <p:cNvPr id="3" name="文字方塊 2"/>
+          <p:cNvPr id="5" name="文字方塊 4"/>
           <p:cNvSpPr txBox="1"/>
           <p:nvPr/>
         </p:nvSpPr>
         <p:spPr>
           <a:xfrm>
-            <a:off x="2195736" y="1547500"/>
+            <a:off x="2195736" y="2123564"/>
             <a:ext cx="1440160" cy="369332"/>
           </a:xfrm>
           <a:prstGeom prst="rect">
@@ -6060,13 +5852,13 @@
       </p:sp>
       <p:sp>
         <p:nvSpPr>
-          <p:cNvPr id="4" name="文字方塊 3"/>
+          <p:cNvPr id="6" name="文字方塊 5"/>
           <p:cNvSpPr txBox="1"/>
           <p:nvPr/>
         </p:nvSpPr>
         <p:spPr>
           <a:xfrm>
-            <a:off x="2195736" y="2627620"/>
+            <a:off x="2195736" y="3203684"/>
             <a:ext cx="1440160" cy="646331"/>
           </a:xfrm>
           <a:prstGeom prst="rect">
@@ -6101,31 +5893,36 @@
                 <a:ea typeface="標楷體" panose="03000509000000000000" pitchFamily="65" charset="-120"/>
                 <a:cs typeface="Times New Roman" panose="02020603050405020304" pitchFamily="18" charset="0"/>
               </a:rPr>
-              <a:t>Data</a:t>
+              <a:t>Graph </a:t>
             </a:r>
           </a:p>
           <a:p>
             <a:pPr algn="ctr"/>
             <a:r>
-              <a:rPr lang="en-US" altLang="zh-TW" dirty="0" smtClean="0">
+              <a:rPr lang="en-US" altLang="zh-TW" dirty="0" err="1" smtClean="0">
                 <a:latin typeface="Times New Roman" panose="02020603050405020304" pitchFamily="18" charset="0"/>
                 <a:ea typeface="標楷體" panose="03000509000000000000" pitchFamily="65" charset="-120"/>
                 <a:cs typeface="Times New Roman" panose="02020603050405020304" pitchFamily="18" charset="0"/>
               </a:rPr>
-              <a:t>Chosen</a:t>
-            </a:r>
-          </a:p>
-        </p:txBody>
-      </p:sp>
-      <p:sp>
-        <p:nvSpPr>
-          <p:cNvPr id="5" name="文字方塊 4"/>
+              <a:t>Gerneration</a:t>
+            </a:r>
+            <a:endParaRPr lang="en-US" altLang="zh-TW" dirty="0" smtClean="0">
+              <a:latin typeface="Times New Roman" panose="02020603050405020304" pitchFamily="18" charset="0"/>
+              <a:ea typeface="標楷體" panose="03000509000000000000" pitchFamily="65" charset="-120"/>
+              <a:cs typeface="Times New Roman" panose="02020603050405020304" pitchFamily="18" charset="0"/>
+            </a:endParaRPr>
+          </a:p>
+        </p:txBody>
+      </p:sp>
+      <p:sp>
+        <p:nvSpPr>
+          <p:cNvPr id="7" name="文字方塊 6"/>
           <p:cNvSpPr txBox="1"/>
           <p:nvPr/>
         </p:nvSpPr>
         <p:spPr>
           <a:xfrm>
-            <a:off x="2195736" y="3851756"/>
+            <a:off x="2195736" y="4427820"/>
             <a:ext cx="1440160" cy="646331"/>
           </a:xfrm>
           <a:prstGeom prst="rect">
@@ -6178,13 +5975,13 @@
       </p:sp>
       <p:sp>
         <p:nvSpPr>
-          <p:cNvPr id="6" name="文字方塊 5"/>
+          <p:cNvPr id="8" name="文字方塊 7"/>
           <p:cNvSpPr txBox="1"/>
           <p:nvPr/>
         </p:nvSpPr>
         <p:spPr>
           <a:xfrm>
-            <a:off x="2195736" y="5219908"/>
+            <a:off x="2195736" y="5795972"/>
             <a:ext cx="1440160" cy="369332"/>
           </a:xfrm>
           <a:prstGeom prst="rect">
@@ -6226,13 +6023,13 @@
       </p:sp>
       <p:sp>
         <p:nvSpPr>
-          <p:cNvPr id="7" name="文字方塊 6"/>
+          <p:cNvPr id="9" name="文字方塊 8"/>
           <p:cNvSpPr txBox="1"/>
           <p:nvPr/>
         </p:nvSpPr>
         <p:spPr>
           <a:xfrm>
-            <a:off x="323528" y="2915652"/>
+            <a:off x="323528" y="3491716"/>
             <a:ext cx="1080120" cy="369332"/>
           </a:xfrm>
           <a:prstGeom prst="rect">
@@ -6277,13 +6074,13 @@
       </p:sp>
       <p:sp>
         <p:nvSpPr>
-          <p:cNvPr id="34" name="文字方塊 33"/>
+          <p:cNvPr id="10" name="文字方塊 9"/>
           <p:cNvSpPr txBox="1"/>
           <p:nvPr/>
         </p:nvSpPr>
         <p:spPr>
           <a:xfrm>
-            <a:off x="899592" y="2123564"/>
+            <a:off x="899592" y="2699628"/>
             <a:ext cx="1008112" cy="584775"/>
           </a:xfrm>
           <a:prstGeom prst="rect">
@@ -6303,15 +6100,7 @@
                 <a:ea typeface="標楷體" panose="03000509000000000000" pitchFamily="65" charset="-120"/>
                 <a:cs typeface="Times New Roman" panose="02020603050405020304" pitchFamily="18" charset="0"/>
               </a:rPr>
-              <a:t>選擇</a:t>
-            </a:r>
-            <a:r>
-              <a:rPr lang="zh-TW" altLang="en-US" sz="1600" dirty="0" smtClean="0">
-                <a:latin typeface="Times New Roman" panose="02020603050405020304" pitchFamily="18" charset="0"/>
-                <a:ea typeface="標楷體" panose="03000509000000000000" pitchFamily="65" charset="-120"/>
-                <a:cs typeface="Times New Roman" panose="02020603050405020304" pitchFamily="18" charset="0"/>
-              </a:rPr>
-              <a:t>下載內容</a:t>
+              <a:t>選擇下載內容</a:t>
             </a:r>
             <a:endParaRPr lang="zh-TW" altLang="en-US" sz="1600" dirty="0">
               <a:latin typeface="Times New Roman" panose="02020603050405020304" pitchFamily="18" charset="0"/>
@@ -6323,13 +6112,13 @@
       </p:sp>
       <p:sp>
         <p:nvSpPr>
-          <p:cNvPr id="41" name="文字方塊 40"/>
+          <p:cNvPr id="11" name="文字方塊 10"/>
           <p:cNvSpPr txBox="1"/>
           <p:nvPr/>
         </p:nvSpPr>
         <p:spPr>
           <a:xfrm>
-            <a:off x="35496" y="899428"/>
+            <a:off x="35496" y="1475492"/>
             <a:ext cx="2232248" cy="584775"/>
           </a:xfrm>
           <a:prstGeom prst="rect">
@@ -6390,13 +6179,13 @@
       </p:sp>
       <p:grpSp>
         <p:nvGrpSpPr>
-          <p:cNvPr id="8" name="群組 7"/>
+          <p:cNvPr id="12" name="群組 11"/>
           <p:cNvGrpSpPr/>
           <p:nvPr/>
         </p:nvGrpSpPr>
         <p:grpSpPr>
           <a:xfrm>
-            <a:off x="3635896" y="5013176"/>
+            <a:off x="3635896" y="5589240"/>
             <a:ext cx="5328592" cy="473278"/>
             <a:chOff x="3635896" y="5013176"/>
             <a:chExt cx="5328592" cy="473278"/>
@@ -6404,7 +6193,7 @@
         </p:grpSpPr>
         <p:sp>
           <p:nvSpPr>
-            <p:cNvPr id="40" name="文字方塊 39"/>
+            <p:cNvPr id="13" name="文字方塊 12"/>
             <p:cNvSpPr txBox="1"/>
             <p:nvPr/>
           </p:nvSpPr>
@@ -6450,7 +6239,7 @@
         </p:sp>
         <p:cxnSp>
           <p:nvCxnSpPr>
-            <p:cNvPr id="49" name="直線接點 48"/>
+            <p:cNvPr id="14" name="直線接點 13"/>
             <p:cNvCxnSpPr/>
             <p:nvPr/>
           </p:nvCxnSpPr>
@@ -6484,13 +6273,13 @@
       </p:grpSp>
       <p:grpSp>
         <p:nvGrpSpPr>
-          <p:cNvPr id="9" name="群組 8"/>
+          <p:cNvPr id="15" name="群組 14"/>
           <p:cNvGrpSpPr/>
           <p:nvPr/>
         </p:nvGrpSpPr>
         <p:grpSpPr>
           <a:xfrm>
-            <a:off x="3635896" y="3717032"/>
+            <a:off x="3635896" y="4293096"/>
             <a:ext cx="5328592" cy="792088"/>
             <a:chOff x="3635896" y="3717032"/>
             <a:chExt cx="5328592" cy="792088"/>
@@ -6498,14 +6287,14 @@
         </p:grpSpPr>
         <p:sp>
           <p:nvSpPr>
-            <p:cNvPr id="39" name="文字方塊 38"/>
+            <p:cNvPr id="16" name="文字方塊 15"/>
             <p:cNvSpPr txBox="1"/>
             <p:nvPr/>
           </p:nvSpPr>
           <p:spPr>
             <a:xfrm>
               <a:off x="3635896" y="3851756"/>
-              <a:ext cx="1584176" cy="584775"/>
+              <a:ext cx="1944216" cy="584775"/>
             </a:xfrm>
             <a:prstGeom prst="rect">
               <a:avLst/>
@@ -6527,12 +6316,12 @@
                 <a:t>*</a:t>
               </a:r>
               <a:r>
-                <a:rPr lang="zh-TW" altLang="en-US" sz="1600" dirty="0" smtClean="0">
+                <a:rPr lang="zh-TW" altLang="en-US" sz="1600" dirty="0">
                   <a:latin typeface="Times New Roman" panose="02020603050405020304" pitchFamily="18" charset="0"/>
                   <a:ea typeface="標楷體" panose="03000509000000000000" pitchFamily="65" charset="-120"/>
                   <a:cs typeface="Times New Roman" panose="02020603050405020304" pitchFamily="18" charset="0"/>
                 </a:rPr>
-                <a:t>做</a:t>
+                <a:t>加速</a:t>
               </a:r>
               <a:r>
                 <a:rPr lang="en-US" altLang="zh-TW" sz="1600" dirty="0" smtClean="0">
@@ -6548,7 +6337,38 @@
                   <a:ea typeface="標楷體" panose="03000509000000000000" pitchFamily="65" charset="-120"/>
                   <a:cs typeface="Times New Roman" panose="02020603050405020304" pitchFamily="18" charset="0"/>
                 </a:rPr>
-                <a:t>加速運算</a:t>
+                <a:t>運算</a:t>
+              </a:r>
+              <a:endParaRPr lang="en-US" altLang="zh-TW" sz="1600" dirty="0" smtClean="0">
+                <a:latin typeface="Times New Roman" panose="02020603050405020304" pitchFamily="18" charset="0"/>
+                <a:ea typeface="標楷體" panose="03000509000000000000" pitchFamily="65" charset="-120"/>
+                <a:cs typeface="Times New Roman" panose="02020603050405020304" pitchFamily="18" charset="0"/>
+              </a:endParaRPr>
+            </a:p>
+            <a:p>
+              <a:r>
+                <a:rPr lang="en-US" altLang="zh-TW" sz="1600" dirty="0" smtClean="0">
+                  <a:latin typeface="Times New Roman" panose="02020603050405020304" pitchFamily="18" charset="0"/>
+                  <a:ea typeface="標楷體" panose="03000509000000000000" pitchFamily="65" charset="-120"/>
+                  <a:cs typeface="Times New Roman" panose="02020603050405020304" pitchFamily="18" charset="0"/>
+                </a:rPr>
+                <a:t>*</a:t>
+              </a:r>
+              <a:r>
+                <a:rPr lang="zh-TW" altLang="en-US" sz="1600" dirty="0" smtClean="0">
+                  <a:latin typeface="Times New Roman" panose="02020603050405020304" pitchFamily="18" charset="0"/>
+                  <a:ea typeface="標楷體" panose="03000509000000000000" pitchFamily="65" charset="-120"/>
+                  <a:cs typeface="Times New Roman" panose="02020603050405020304" pitchFamily="18" charset="0"/>
+                </a:rPr>
+                <a:t>計算</a:t>
+              </a:r>
+              <a:r>
+                <a:rPr lang="en-US" altLang="zh-TW" sz="1600" dirty="0" smtClean="0">
+                  <a:latin typeface="Times New Roman" panose="02020603050405020304" pitchFamily="18" charset="0"/>
+                  <a:ea typeface="標楷體" panose="03000509000000000000" pitchFamily="65" charset="-120"/>
+                  <a:cs typeface="Times New Roman" panose="02020603050405020304" pitchFamily="18" charset="0"/>
+                </a:rPr>
+                <a:t>weight, edge </a:t>
               </a:r>
               <a:endParaRPr lang="zh-TW" altLang="en-US" sz="1600" dirty="0">
                 <a:latin typeface="Times New Roman" panose="02020603050405020304" pitchFamily="18" charset="0"/>
@@ -6560,7 +6380,7 @@
         </p:sp>
         <p:cxnSp>
           <p:nvCxnSpPr>
-            <p:cNvPr id="48" name="直線接點 47"/>
+            <p:cNvPr id="17" name="直線接點 16"/>
             <p:cNvCxnSpPr/>
             <p:nvPr/>
           </p:nvCxnSpPr>
@@ -6593,7 +6413,7 @@
         </p:cxnSp>
         <p:sp>
           <p:nvSpPr>
-            <p:cNvPr id="73" name="文字方塊 72"/>
+            <p:cNvPr id="18" name="文字方塊 17"/>
             <p:cNvSpPr txBox="1"/>
             <p:nvPr/>
           </p:nvSpPr>
@@ -6638,16 +6458,16 @@
       </p:grpSp>
       <p:cxnSp>
         <p:nvCxnSpPr>
-          <p:cNvPr id="12" name="直線單箭頭接點 11"/>
+          <p:cNvPr id="19" name="直線單箭頭接點 18"/>
           <p:cNvCxnSpPr>
-            <a:stCxn id="3" idx="2"/>
-            <a:endCxn id="4" idx="0"/>
+            <a:stCxn id="5" idx="2"/>
+            <a:endCxn id="6" idx="0"/>
           </p:cNvCxnSpPr>
           <p:nvPr/>
         </p:nvCxnSpPr>
         <p:spPr>
           <a:xfrm>
-            <a:off x="2915816" y="1916832"/>
+            <a:off x="2915816" y="2492896"/>
             <a:ext cx="0" cy="710788"/>
           </a:xfrm>
           <a:prstGeom prst="straightConnector1">
@@ -6675,16 +6495,16 @@
       </p:cxnSp>
       <p:cxnSp>
         <p:nvCxnSpPr>
-          <p:cNvPr id="44" name="直線單箭頭接點 43"/>
+          <p:cNvPr id="20" name="直線單箭頭接點 19"/>
           <p:cNvCxnSpPr>
-            <a:stCxn id="4" idx="2"/>
-            <a:endCxn id="5" idx="0"/>
+            <a:stCxn id="6" idx="2"/>
+            <a:endCxn id="7" idx="0"/>
           </p:cNvCxnSpPr>
           <p:nvPr/>
         </p:nvCxnSpPr>
         <p:spPr>
           <a:xfrm>
-            <a:off x="2915816" y="3273951"/>
+            <a:off x="2915816" y="3850015"/>
             <a:ext cx="0" cy="577805"/>
           </a:xfrm>
           <a:prstGeom prst="straightConnector1">
@@ -6712,16 +6532,16 @@
       </p:cxnSp>
       <p:cxnSp>
         <p:nvCxnSpPr>
-          <p:cNvPr id="46" name="直線單箭頭接點 45"/>
+          <p:cNvPr id="21" name="直線單箭頭接點 20"/>
           <p:cNvCxnSpPr>
-            <a:stCxn id="5" idx="2"/>
-            <a:endCxn id="6" idx="0"/>
+            <a:stCxn id="7" idx="2"/>
+            <a:endCxn id="8" idx="0"/>
           </p:cNvCxnSpPr>
           <p:nvPr/>
         </p:nvCxnSpPr>
         <p:spPr>
           <a:xfrm>
-            <a:off x="2915816" y="4498087"/>
+            <a:off x="2915816" y="5074151"/>
             <a:ext cx="0" cy="721821"/>
           </a:xfrm>
           <a:prstGeom prst="straightConnector1">
@@ -6749,16 +6569,16 @@
       </p:cxnSp>
       <p:cxnSp>
         <p:nvCxnSpPr>
-          <p:cNvPr id="54" name="直線單箭頭接點 53"/>
+          <p:cNvPr id="22" name="直線單箭頭接點 21"/>
           <p:cNvCxnSpPr>
-            <a:stCxn id="2" idx="3"/>
-            <a:endCxn id="3" idx="1"/>
+            <a:stCxn id="4" idx="3"/>
+            <a:endCxn id="5" idx="1"/>
           </p:cNvCxnSpPr>
           <p:nvPr/>
         </p:nvCxnSpPr>
         <p:spPr>
           <a:xfrm>
-            <a:off x="1403648" y="1732166"/>
+            <a:off x="1403648" y="2308230"/>
             <a:ext cx="792088" cy="0"/>
           </a:xfrm>
           <a:prstGeom prst="straightConnector1">
@@ -6786,16 +6606,16 @@
       </p:cxnSp>
       <p:cxnSp>
         <p:nvCxnSpPr>
-          <p:cNvPr id="55" name="直線單箭頭接點 54"/>
+          <p:cNvPr id="23" name="直線單箭頭接點 22"/>
           <p:cNvCxnSpPr>
-            <a:stCxn id="7" idx="0"/>
-            <a:endCxn id="2" idx="2"/>
+            <a:stCxn id="9" idx="0"/>
+            <a:endCxn id="4" idx="2"/>
           </p:cNvCxnSpPr>
           <p:nvPr/>
         </p:nvCxnSpPr>
         <p:spPr>
           <a:xfrm flipV="1">
-            <a:off x="863588" y="1916832"/>
+            <a:off x="863588" y="2492896"/>
             <a:ext cx="0" cy="998820"/>
           </a:xfrm>
           <a:prstGeom prst="straightConnector1">
@@ -6825,14 +6645,14 @@
         <p:nvCxnSpPr>
           <p:cNvPr id="24" name="肘形接點 23"/>
           <p:cNvCxnSpPr>
-            <a:stCxn id="6" idx="1"/>
-            <a:endCxn id="7" idx="2"/>
+            <a:stCxn id="8" idx="1"/>
+            <a:endCxn id="9" idx="2"/>
           </p:cNvCxnSpPr>
           <p:nvPr/>
         </p:nvCxnSpPr>
         <p:spPr>
           <a:xfrm rot="10800000">
-            <a:off x="863588" y="3284984"/>
+            <a:off x="863588" y="3861048"/>
             <a:ext cx="1332148" cy="2119590"/>
           </a:xfrm>
           <a:prstGeom prst="bentConnector2">
@@ -6860,28 +6680,28 @@
       </p:cxnSp>
       <p:grpSp>
         <p:nvGrpSpPr>
-          <p:cNvPr id="10" name="群組 9"/>
+          <p:cNvPr id="25" name="群組 24"/>
           <p:cNvGrpSpPr/>
           <p:nvPr/>
         </p:nvGrpSpPr>
         <p:grpSpPr>
           <a:xfrm>
-            <a:off x="3635896" y="2402885"/>
-            <a:ext cx="5328592" cy="1242139"/>
+            <a:off x="3635896" y="2978949"/>
+            <a:ext cx="5328592" cy="1283950"/>
             <a:chOff x="3635896" y="2420888"/>
-            <a:chExt cx="5328592" cy="1242139"/>
+            <a:chExt cx="5328592" cy="1283950"/>
           </a:xfrm>
         </p:grpSpPr>
         <p:sp>
           <p:nvSpPr>
-            <p:cNvPr id="38" name="文字方塊 37"/>
+            <p:cNvPr id="26" name="文字方塊 25"/>
             <p:cNvSpPr txBox="1"/>
             <p:nvPr/>
           </p:nvSpPr>
           <p:spPr>
             <a:xfrm>
               <a:off x="3635896" y="2627620"/>
-              <a:ext cx="1728192" cy="830997"/>
+              <a:ext cx="1728192" cy="1077218"/>
             </a:xfrm>
             <a:prstGeom prst="rect">
               <a:avLst/>
@@ -6954,15 +6774,7 @@
                   <a:ea typeface="標楷體" panose="03000509000000000000" pitchFamily="65" charset="-120"/>
                   <a:cs typeface="Times New Roman" panose="02020603050405020304" pitchFamily="18" charset="0"/>
                 </a:rPr>
-                <a:t>形成</a:t>
-              </a:r>
-              <a:r>
-                <a:rPr lang="en-US" altLang="zh-TW" sz="1600" dirty="0" smtClean="0">
-                  <a:latin typeface="Times New Roman" panose="02020603050405020304" pitchFamily="18" charset="0"/>
-                  <a:ea typeface="標楷體" panose="03000509000000000000" pitchFamily="65" charset="-120"/>
-                  <a:cs typeface="Times New Roman" panose="02020603050405020304" pitchFamily="18" charset="0"/>
-                </a:rPr>
-                <a:t>Matrix</a:t>
+                <a:t>形成要計算的資料格式</a:t>
               </a:r>
               <a:endParaRPr lang="zh-TW" altLang="en-US" sz="1600" dirty="0">
                 <a:latin typeface="Times New Roman" panose="02020603050405020304" pitchFamily="18" charset="0"/>
@@ -6974,7 +6786,7 @@
         </p:sp>
         <p:cxnSp>
           <p:nvCxnSpPr>
-            <p:cNvPr id="47" name="直線接點 46"/>
+            <p:cNvPr id="27" name="直線接點 26"/>
             <p:cNvCxnSpPr/>
             <p:nvPr/>
           </p:nvCxnSpPr>
@@ -7007,7 +6819,7 @@
         </p:cxnSp>
         <p:sp>
           <p:nvSpPr>
-            <p:cNvPr id="51" name="文字方塊 50"/>
+            <p:cNvPr id="28" name="文字方塊 27"/>
             <p:cNvSpPr txBox="1"/>
             <p:nvPr/>
           </p:nvSpPr>
@@ -7043,7 +6855,7 @@
         </p:sp>
         <p:sp>
           <p:nvSpPr>
-            <p:cNvPr id="52" name="文字方塊 51"/>
+            <p:cNvPr id="29" name="文字方塊 28"/>
             <p:cNvSpPr txBox="1"/>
             <p:nvPr/>
           </p:nvSpPr>
@@ -7118,14 +6930,14 @@
         </p:sp>
         <p:pic>
           <p:nvPicPr>
-            <p:cNvPr id="1026" name="Picture 2"/>
+            <p:cNvPr id="30" name="Picture 2"/>
             <p:cNvPicPr>
               <a:picLocks noChangeAspect="1" noChangeArrowheads="1"/>
             </p:cNvPicPr>
             <p:nvPr/>
           </p:nvPicPr>
           <p:blipFill>
-            <a:blip r:embed="rId3">
+            <a:blip r:embed="rId2">
               <a:extLst>
                 <a:ext uri="{28A0092B-C50C-407E-A947-70E740481C1C}">
                   <a14:useLocalDpi xmlns:a14="http://schemas.microsoft.com/office/drawing/2010/main" val="0"/>
@@ -7173,13 +6985,13 @@
       </p:grpSp>
       <p:grpSp>
         <p:nvGrpSpPr>
-          <p:cNvPr id="11" name="群組 10"/>
+          <p:cNvPr id="31" name="群組 30"/>
           <p:cNvGrpSpPr/>
           <p:nvPr/>
         </p:nvGrpSpPr>
         <p:grpSpPr>
           <a:xfrm>
-            <a:off x="3635896" y="1124744"/>
+            <a:off x="3635896" y="1700808"/>
             <a:ext cx="5366742" cy="1080120"/>
             <a:chOff x="3635896" y="1124744"/>
             <a:chExt cx="5366742" cy="1080120"/>
@@ -7187,7 +6999,7 @@
         </p:grpSpPr>
         <p:sp>
           <p:nvSpPr>
-            <p:cNvPr id="36" name="文字方塊 35"/>
+            <p:cNvPr id="32" name="文字方塊 31"/>
             <p:cNvSpPr txBox="1"/>
             <p:nvPr/>
           </p:nvSpPr>
@@ -7262,7 +7074,7 @@
         </p:sp>
         <p:sp>
           <p:nvSpPr>
-            <p:cNvPr id="42" name="文字方塊 41"/>
+            <p:cNvPr id="33" name="文字方塊 32"/>
             <p:cNvSpPr txBox="1"/>
             <p:nvPr/>
           </p:nvSpPr>
@@ -7298,7 +7110,7 @@
         </p:sp>
         <p:sp>
           <p:nvSpPr>
-            <p:cNvPr id="45" name="文字方塊 44"/>
+            <p:cNvPr id="34" name="文字方塊 33"/>
             <p:cNvSpPr txBox="1"/>
             <p:nvPr/>
           </p:nvSpPr>
@@ -7334,14 +7146,14 @@
         </p:sp>
         <p:pic>
           <p:nvPicPr>
-            <p:cNvPr id="1027" name="Picture 3"/>
+            <p:cNvPr id="35" name="Picture 3"/>
             <p:cNvPicPr>
               <a:picLocks noChangeAspect="1" noChangeArrowheads="1"/>
             </p:cNvPicPr>
             <p:nvPr/>
           </p:nvPicPr>
           <p:blipFill>
-            <a:blip r:embed="rId4">
+            <a:blip r:embed="rId3">
               <a:extLst>
                 <a:ext uri="{28A0092B-C50C-407E-A947-70E740481C1C}">
                   <a14:useLocalDpi xmlns:a14="http://schemas.microsoft.com/office/drawing/2010/main" val="0"/>
@@ -7390,7 +7202,7 @@
     </p:spTree>
     <p:extLst>
       <p:ext uri="{BB962C8B-B14F-4D97-AF65-F5344CB8AC3E}">
-        <p14:creationId xmlns:p14="http://schemas.microsoft.com/office/powerpoint/2010/main" val="2082421870"/>
+        <p14:creationId xmlns:p14="http://schemas.microsoft.com/office/powerpoint/2010/main" val="3042831759"/>
       </p:ext>
     </p:extLst>
   </p:cSld>
@@ -7431,7 +7243,7 @@
                                           </p:stCondLst>
                                         </p:cTn>
                                         <p:tgtEl>
-                                          <p:spTgt spid="34"/>
+                                          <p:spTgt spid="10"/>
                                         </p:tgtEl>
                                         <p:attrNameLst>
                                           <p:attrName>style.visibility</p:attrName>
@@ -7445,7 +7257,7 @@
                                       <p:cBhvr>
                                         <p:cTn id="7" dur="500"/>
                                         <p:tgtEl>
-                                          <p:spTgt spid="34"/>
+                                          <p:spTgt spid="10"/>
                                         </p:tgtEl>
                                       </p:cBhvr>
                                     </p:animEffect>
@@ -7484,7 +7296,7 @@
                                           </p:stCondLst>
                                         </p:cTn>
                                         <p:tgtEl>
-                                          <p:spTgt spid="41"/>
+                                          <p:spTgt spid="11"/>
                                         </p:tgtEl>
                                         <p:attrNameLst>
                                           <p:attrName>style.visibility</p:attrName>
@@ -7498,7 +7310,7 @@
                                       <p:cBhvr>
                                         <p:cTn id="12" dur="500"/>
                                         <p:tgtEl>
-                                          <p:spTgt spid="41"/>
+                                          <p:spTgt spid="11"/>
                                         </p:tgtEl>
                                       </p:cBhvr>
                                     </p:animEffect>
@@ -7537,7 +7349,7 @@
                                           </p:stCondLst>
                                         </p:cTn>
                                         <p:tgtEl>
-                                          <p:spTgt spid="11"/>
+                                          <p:spTgt spid="31"/>
                                         </p:tgtEl>
                                         <p:attrNameLst>
                                           <p:attrName>style.visibility</p:attrName>
@@ -7551,7 +7363,7 @@
                                       <p:cBhvr>
                                         <p:cTn id="17" dur="500"/>
                                         <p:tgtEl>
-                                          <p:spTgt spid="11"/>
+                                          <p:spTgt spid="31"/>
                                         </p:tgtEl>
                                       </p:cBhvr>
                                     </p:animEffect>
@@ -7590,7 +7402,7 @@
                                           </p:stCondLst>
                                         </p:cTn>
                                         <p:tgtEl>
-                                          <p:spTgt spid="10"/>
+                                          <p:spTgt spid="25"/>
                                         </p:tgtEl>
                                         <p:attrNameLst>
                                           <p:attrName>style.visibility</p:attrName>
@@ -7604,7 +7416,7 @@
                                       <p:cBhvr>
                                         <p:cTn id="22" dur="500"/>
                                         <p:tgtEl>
-                                          <p:spTgt spid="10"/>
+                                          <p:spTgt spid="25"/>
                                         </p:tgtEl>
                                       </p:cBhvr>
                                     </p:animEffect>
@@ -7643,7 +7455,7 @@
                                           </p:stCondLst>
                                         </p:cTn>
                                         <p:tgtEl>
-                                          <p:spTgt spid="9"/>
+                                          <p:spTgt spid="15"/>
                                         </p:tgtEl>
                                         <p:attrNameLst>
                                           <p:attrName>style.visibility</p:attrName>
@@ -7657,7 +7469,7 @@
                                       <p:cBhvr>
                                         <p:cTn id="27" dur="500"/>
                                         <p:tgtEl>
-                                          <p:spTgt spid="9"/>
+                                          <p:spTgt spid="15"/>
                                         </p:tgtEl>
                                       </p:cBhvr>
                                     </p:animEffect>
@@ -7696,7 +7508,7 @@
                                           </p:stCondLst>
                                         </p:cTn>
                                         <p:tgtEl>
-                                          <p:spTgt spid="8"/>
+                                          <p:spTgt spid="12"/>
                                         </p:tgtEl>
                                         <p:attrNameLst>
                                           <p:attrName>style.visibility</p:attrName>
@@ -7710,7 +7522,7 @@
                                       <p:cBhvr>
                                         <p:cTn id="32" dur="500"/>
                                         <p:tgtEl>
-                                          <p:spTgt spid="8"/>
+                                          <p:spTgt spid="12"/>
                                         </p:tgtEl>
                                       </p:cBhvr>
                                     </p:animEffect>
@@ -7745,8 +7557,8 @@
       </p:par>
     </p:tnLst>
     <p:bldLst>
-      <p:bldP spid="34" grpId="0"/>
-      <p:bldP spid="41" grpId="0"/>
+      <p:bldP spid="10" grpId="0"/>
+      <p:bldP spid="11" grpId="0"/>
     </p:bldLst>
   </p:timing>
 </p:sld>
@@ -8056,6 +7868,85 @@
       <p:transition spd="slow"/>
     </mc:Fallback>
   </mc:AlternateContent>
+  <p:timing>
+    <p:tnLst>
+      <p:par>
+        <p:cTn id="1" dur="indefinite" restart="never" nodeType="tmRoot"/>
+      </p:par>
+    </p:tnLst>
+  </p:timing>
+</p:sld>
+</file>
+
+<file path=ppt/slides/slide7.xml><?xml version="1.0" encoding="utf-8"?>
+<p:sld xmlns:a="http://schemas.openxmlformats.org/drawingml/2006/main" xmlns:r="http://schemas.openxmlformats.org/officeDocument/2006/relationships" xmlns:p="http://schemas.openxmlformats.org/presentationml/2006/main">
+  <p:cSld>
+    <p:spTree>
+      <p:nvGrpSpPr>
+        <p:cNvPr id="1" name=""/>
+        <p:cNvGrpSpPr/>
+        <p:nvPr/>
+      </p:nvGrpSpPr>
+      <p:grpSpPr>
+        <a:xfrm>
+          <a:off x="0" y="0"/>
+          <a:ext cx="0" cy="0"/>
+          <a:chOff x="0" y="0"/>
+          <a:chExt cx="0" cy="0"/>
+        </a:xfrm>
+      </p:grpSpPr>
+      <p:sp>
+        <p:nvSpPr>
+          <p:cNvPr id="2" name="標題 1"/>
+          <p:cNvSpPr>
+            <a:spLocks noGrp="1"/>
+          </p:cNvSpPr>
+          <p:nvPr>
+            <p:ph type="title"/>
+          </p:nvPr>
+        </p:nvSpPr>
+        <p:spPr/>
+        <p:txBody>
+          <a:bodyPr/>
+          <a:lstStyle/>
+          <a:p>
+            <a:endParaRPr lang="zh-TW" altLang="en-US"/>
+          </a:p>
+        </p:txBody>
+      </p:sp>
+      <p:sp>
+        <p:nvSpPr>
+          <p:cNvPr id="3" name="內容版面配置區 2"/>
+          <p:cNvSpPr>
+            <a:spLocks noGrp="1"/>
+          </p:cNvSpPr>
+          <p:nvPr>
+            <p:ph idx="1"/>
+          </p:nvPr>
+        </p:nvSpPr>
+        <p:spPr/>
+        <p:txBody>
+          <a:bodyPr/>
+          <a:lstStyle/>
+          <a:p>
+            <a:r>
+              <a:rPr lang="en-US" altLang="zh-TW" dirty="0" smtClean="0"/>
+              <a:t>Thanks</a:t>
+            </a:r>
+            <a:endParaRPr lang="zh-TW" altLang="en-US" dirty="0"/>
+          </a:p>
+        </p:txBody>
+      </p:sp>
+    </p:spTree>
+    <p:extLst>
+      <p:ext uri="{BB962C8B-B14F-4D97-AF65-F5344CB8AC3E}">
+        <p14:creationId xmlns:p14="http://schemas.microsoft.com/office/powerpoint/2010/main" val="2023561588"/>
+      </p:ext>
+    </p:extLst>
+  </p:cSld>
+  <p:clrMapOvr>
+    <a:masterClrMapping/>
+  </p:clrMapOvr>
   <p:timing>
     <p:tnLst>
       <p:par>

</xml_diff>